<commit_message>
Revision control, updated UI, and updated data
</commit_message>
<xml_diff>
--- a/Documentation/Archive/Sprint 1/Release Plan Presentation.pptx
+++ b/Documentation/Archive/Sprint 1/Release Plan Presentation.pptx
@@ -45,7 +45,10 @@
       <a:spcAft>
         <a:spcPts val="0"/>
       </a:spcAft>
-      <a:buNone/>
+      <a:buClr>
+        <a:srgbClr val="000000"/>
+      </a:buClr>
+      <a:buFont typeface="Arial"/>
       <a:defRPr b="0" i="0" sz="1400" u="none" cap="none" strike="noStrike">
         <a:solidFill>
           <a:srgbClr val="000000"/>
@@ -66,7 +69,10 @@
       <a:spcAft>
         <a:spcPts val="0"/>
       </a:spcAft>
-      <a:buNone/>
+      <a:buClr>
+        <a:srgbClr val="000000"/>
+      </a:buClr>
+      <a:buFont typeface="Arial"/>
       <a:defRPr b="0" i="0" sz="1400" u="none" cap="none" strike="noStrike">
         <a:solidFill>
           <a:srgbClr val="000000"/>
@@ -87,7 +93,10 @@
       <a:spcAft>
         <a:spcPts val="0"/>
       </a:spcAft>
-      <a:buNone/>
+      <a:buClr>
+        <a:srgbClr val="000000"/>
+      </a:buClr>
+      <a:buFont typeface="Arial"/>
       <a:defRPr b="0" i="0" sz="1400" u="none" cap="none" strike="noStrike">
         <a:solidFill>
           <a:srgbClr val="000000"/>
@@ -108,7 +117,10 @@
       <a:spcAft>
         <a:spcPts val="0"/>
       </a:spcAft>
-      <a:buNone/>
+      <a:buClr>
+        <a:srgbClr val="000000"/>
+      </a:buClr>
+      <a:buFont typeface="Arial"/>
       <a:defRPr b="0" i="0" sz="1400" u="none" cap="none" strike="noStrike">
         <a:solidFill>
           <a:srgbClr val="000000"/>
@@ -129,7 +141,10 @@
       <a:spcAft>
         <a:spcPts val="0"/>
       </a:spcAft>
-      <a:buNone/>
+      <a:buClr>
+        <a:srgbClr val="000000"/>
+      </a:buClr>
+      <a:buFont typeface="Arial"/>
       <a:defRPr b="0" i="0" sz="1400" u="none" cap="none" strike="noStrike">
         <a:solidFill>
           <a:srgbClr val="000000"/>
@@ -150,7 +165,10 @@
       <a:spcAft>
         <a:spcPts val="0"/>
       </a:spcAft>
-      <a:buNone/>
+      <a:buClr>
+        <a:srgbClr val="000000"/>
+      </a:buClr>
+      <a:buFont typeface="Arial"/>
       <a:defRPr b="0" i="0" sz="1400" u="none" cap="none" strike="noStrike">
         <a:solidFill>
           <a:srgbClr val="000000"/>
@@ -171,7 +189,10 @@
       <a:spcAft>
         <a:spcPts val="0"/>
       </a:spcAft>
-      <a:buNone/>
+      <a:buClr>
+        <a:srgbClr val="000000"/>
+      </a:buClr>
+      <a:buFont typeface="Arial"/>
       <a:defRPr b="0" i="0" sz="1400" u="none" cap="none" strike="noStrike">
         <a:solidFill>
           <a:srgbClr val="000000"/>
@@ -192,7 +213,10 @@
       <a:spcAft>
         <a:spcPts val="0"/>
       </a:spcAft>
-      <a:buNone/>
+      <a:buClr>
+        <a:srgbClr val="000000"/>
+      </a:buClr>
+      <a:buFont typeface="Arial"/>
       <a:defRPr b="0" i="0" sz="1400" u="none" cap="none" strike="noStrike">
         <a:solidFill>
           <a:srgbClr val="000000"/>
@@ -213,7 +237,10 @@
       <a:spcAft>
         <a:spcPts val="0"/>
       </a:spcAft>
-      <a:buNone/>
+      <a:buClr>
+        <a:srgbClr val="000000"/>
+      </a:buClr>
+      <a:buFont typeface="Arial"/>
       <a:defRPr b="0" i="0" sz="1400" u="none" cap="none" strike="noStrike">
         <a:solidFill>
           <a:srgbClr val="000000"/>
@@ -428,6 +455,235 @@
     </p:spTree>
   </p:cSld>
   <p:clrMap accent1="accent1" accent2="accent2" accent3="accent3" accent4="accent4" accent5="accent5" accent6="accent6" bg1="lt1" bg2="dk2" tx1="dk1" tx2="lt2" folHlink="folHlink" hlink="hlink"/>
+  <p:notesStyle>
+    <a:defPPr lvl="0" marR="0" rtl="0" algn="l">
+      <a:lnSpc>
+        <a:spcPct val="100000"/>
+      </a:lnSpc>
+      <a:spcBef>
+        <a:spcPts val="0"/>
+      </a:spcBef>
+      <a:spcAft>
+        <a:spcPts val="0"/>
+      </a:spcAft>
+    </a:defPPr>
+    <a:lvl1pPr lvl="0" marR="0" rtl="0" algn="l">
+      <a:lnSpc>
+        <a:spcPct val="100000"/>
+      </a:lnSpc>
+      <a:spcBef>
+        <a:spcPts val="0"/>
+      </a:spcBef>
+      <a:spcAft>
+        <a:spcPts val="0"/>
+      </a:spcAft>
+      <a:buClr>
+        <a:srgbClr val="000000"/>
+      </a:buClr>
+      <a:buFont typeface="Arial"/>
+      <a:defRPr b="0" i="0" sz="1400" u="none" cap="none" strike="noStrike">
+        <a:solidFill>
+          <a:srgbClr val="000000"/>
+        </a:solidFill>
+        <a:latin typeface="Arial"/>
+        <a:ea typeface="Arial"/>
+        <a:cs typeface="Arial"/>
+        <a:sym typeface="Arial"/>
+      </a:defRPr>
+    </a:lvl1pPr>
+    <a:lvl2pPr lvl="1" marR="0" rtl="0" algn="l">
+      <a:lnSpc>
+        <a:spcPct val="100000"/>
+      </a:lnSpc>
+      <a:spcBef>
+        <a:spcPts val="0"/>
+      </a:spcBef>
+      <a:spcAft>
+        <a:spcPts val="0"/>
+      </a:spcAft>
+      <a:buClr>
+        <a:srgbClr val="000000"/>
+      </a:buClr>
+      <a:buFont typeface="Arial"/>
+      <a:defRPr b="0" i="0" sz="1400" u="none" cap="none" strike="noStrike">
+        <a:solidFill>
+          <a:srgbClr val="000000"/>
+        </a:solidFill>
+        <a:latin typeface="Arial"/>
+        <a:ea typeface="Arial"/>
+        <a:cs typeface="Arial"/>
+        <a:sym typeface="Arial"/>
+      </a:defRPr>
+    </a:lvl2pPr>
+    <a:lvl3pPr lvl="2" marR="0" rtl="0" algn="l">
+      <a:lnSpc>
+        <a:spcPct val="100000"/>
+      </a:lnSpc>
+      <a:spcBef>
+        <a:spcPts val="0"/>
+      </a:spcBef>
+      <a:spcAft>
+        <a:spcPts val="0"/>
+      </a:spcAft>
+      <a:buClr>
+        <a:srgbClr val="000000"/>
+      </a:buClr>
+      <a:buFont typeface="Arial"/>
+      <a:defRPr b="0" i="0" sz="1400" u="none" cap="none" strike="noStrike">
+        <a:solidFill>
+          <a:srgbClr val="000000"/>
+        </a:solidFill>
+        <a:latin typeface="Arial"/>
+        <a:ea typeface="Arial"/>
+        <a:cs typeface="Arial"/>
+        <a:sym typeface="Arial"/>
+      </a:defRPr>
+    </a:lvl3pPr>
+    <a:lvl4pPr lvl="3" marR="0" rtl="0" algn="l">
+      <a:lnSpc>
+        <a:spcPct val="100000"/>
+      </a:lnSpc>
+      <a:spcBef>
+        <a:spcPts val="0"/>
+      </a:spcBef>
+      <a:spcAft>
+        <a:spcPts val="0"/>
+      </a:spcAft>
+      <a:buClr>
+        <a:srgbClr val="000000"/>
+      </a:buClr>
+      <a:buFont typeface="Arial"/>
+      <a:defRPr b="0" i="0" sz="1400" u="none" cap="none" strike="noStrike">
+        <a:solidFill>
+          <a:srgbClr val="000000"/>
+        </a:solidFill>
+        <a:latin typeface="Arial"/>
+        <a:ea typeface="Arial"/>
+        <a:cs typeface="Arial"/>
+        <a:sym typeface="Arial"/>
+      </a:defRPr>
+    </a:lvl4pPr>
+    <a:lvl5pPr lvl="4" marR="0" rtl="0" algn="l">
+      <a:lnSpc>
+        <a:spcPct val="100000"/>
+      </a:lnSpc>
+      <a:spcBef>
+        <a:spcPts val="0"/>
+      </a:spcBef>
+      <a:spcAft>
+        <a:spcPts val="0"/>
+      </a:spcAft>
+      <a:buClr>
+        <a:srgbClr val="000000"/>
+      </a:buClr>
+      <a:buFont typeface="Arial"/>
+      <a:defRPr b="0" i="0" sz="1400" u="none" cap="none" strike="noStrike">
+        <a:solidFill>
+          <a:srgbClr val="000000"/>
+        </a:solidFill>
+        <a:latin typeface="Arial"/>
+        <a:ea typeface="Arial"/>
+        <a:cs typeface="Arial"/>
+        <a:sym typeface="Arial"/>
+      </a:defRPr>
+    </a:lvl5pPr>
+    <a:lvl6pPr lvl="5" marR="0" rtl="0" algn="l">
+      <a:lnSpc>
+        <a:spcPct val="100000"/>
+      </a:lnSpc>
+      <a:spcBef>
+        <a:spcPts val="0"/>
+      </a:spcBef>
+      <a:spcAft>
+        <a:spcPts val="0"/>
+      </a:spcAft>
+      <a:buClr>
+        <a:srgbClr val="000000"/>
+      </a:buClr>
+      <a:buFont typeface="Arial"/>
+      <a:defRPr b="0" i="0" sz="1400" u="none" cap="none" strike="noStrike">
+        <a:solidFill>
+          <a:srgbClr val="000000"/>
+        </a:solidFill>
+        <a:latin typeface="Arial"/>
+        <a:ea typeface="Arial"/>
+        <a:cs typeface="Arial"/>
+        <a:sym typeface="Arial"/>
+      </a:defRPr>
+    </a:lvl6pPr>
+    <a:lvl7pPr lvl="6" marR="0" rtl="0" algn="l">
+      <a:lnSpc>
+        <a:spcPct val="100000"/>
+      </a:lnSpc>
+      <a:spcBef>
+        <a:spcPts val="0"/>
+      </a:spcBef>
+      <a:spcAft>
+        <a:spcPts val="0"/>
+      </a:spcAft>
+      <a:buClr>
+        <a:srgbClr val="000000"/>
+      </a:buClr>
+      <a:buFont typeface="Arial"/>
+      <a:defRPr b="0" i="0" sz="1400" u="none" cap="none" strike="noStrike">
+        <a:solidFill>
+          <a:srgbClr val="000000"/>
+        </a:solidFill>
+        <a:latin typeface="Arial"/>
+        <a:ea typeface="Arial"/>
+        <a:cs typeface="Arial"/>
+        <a:sym typeface="Arial"/>
+      </a:defRPr>
+    </a:lvl7pPr>
+    <a:lvl8pPr lvl="7" marR="0" rtl="0" algn="l">
+      <a:lnSpc>
+        <a:spcPct val="100000"/>
+      </a:lnSpc>
+      <a:spcBef>
+        <a:spcPts val="0"/>
+      </a:spcBef>
+      <a:spcAft>
+        <a:spcPts val="0"/>
+      </a:spcAft>
+      <a:buClr>
+        <a:srgbClr val="000000"/>
+      </a:buClr>
+      <a:buFont typeface="Arial"/>
+      <a:defRPr b="0" i="0" sz="1400" u="none" cap="none" strike="noStrike">
+        <a:solidFill>
+          <a:srgbClr val="000000"/>
+        </a:solidFill>
+        <a:latin typeface="Arial"/>
+        <a:ea typeface="Arial"/>
+        <a:cs typeface="Arial"/>
+        <a:sym typeface="Arial"/>
+      </a:defRPr>
+    </a:lvl8pPr>
+    <a:lvl9pPr lvl="8" marR="0" rtl="0" algn="l">
+      <a:lnSpc>
+        <a:spcPct val="100000"/>
+      </a:lnSpc>
+      <a:spcBef>
+        <a:spcPts val="0"/>
+      </a:spcBef>
+      <a:spcAft>
+        <a:spcPts val="0"/>
+      </a:spcAft>
+      <a:buClr>
+        <a:srgbClr val="000000"/>
+      </a:buClr>
+      <a:buFont typeface="Arial"/>
+      <a:defRPr b="0" i="0" sz="1400" u="none" cap="none" strike="noStrike">
+        <a:solidFill>
+          <a:srgbClr val="000000"/>
+        </a:solidFill>
+        <a:latin typeface="Arial"/>
+        <a:ea typeface="Arial"/>
+        <a:cs typeface="Arial"/>
+        <a:sym typeface="Arial"/>
+      </a:defRPr>
+    </a:lvl9pPr>
+  </p:notesStyle>
 </p:notesMaster>
 </file>
 
@@ -1800,8 +2056,8 @@
 </file>
 
 <file path=ppt/slideLayouts/slideLayout1.xml><?xml version="1.0" encoding="utf-8"?>
-<p:sldLayout xmlns:a="http://schemas.openxmlformats.org/drawingml/2006/main" xmlns:r="http://schemas.openxmlformats.org/officeDocument/2006/relationships" xmlns:mc="http://schemas.openxmlformats.org/markup-compatibility/2006" xmlns:mv="urn:schemas-microsoft-com:mac:vml" xmlns:p="http://schemas.openxmlformats.org/presentationml/2006/main" xmlns:c="http://schemas.openxmlformats.org/drawingml/2006/chart" xmlns:dgm="http://schemas.openxmlformats.org/drawingml/2006/diagram" xmlns:o="urn:schemas-microsoft-com:office:office" xmlns:v="urn:schemas-microsoft-com:vml" xmlns:pvml="urn:schemas-microsoft-com:office:powerpoint" xmlns:com="http://schemas.openxmlformats.org/drawingml/2006/compatibility" xmlns:p14="http://schemas.microsoft.com/office/powerpoint/2010/main" xmlns:p15="http://schemas.microsoft.com/office/powerpoint/2012/main" type="obj">
-  <p:cSld name="Title and Content">
+<p:sldLayout xmlns:a="http://schemas.openxmlformats.org/drawingml/2006/main" xmlns:r="http://schemas.openxmlformats.org/officeDocument/2006/relationships" xmlns:mc="http://schemas.openxmlformats.org/markup-compatibility/2006" xmlns:mv="urn:schemas-microsoft-com:mac:vml" xmlns:p="http://schemas.openxmlformats.org/presentationml/2006/main" xmlns:c="http://schemas.openxmlformats.org/drawingml/2006/chart" xmlns:dgm="http://schemas.openxmlformats.org/drawingml/2006/diagram" xmlns:o="urn:schemas-microsoft-com:office:office" xmlns:v="urn:schemas-microsoft-com:vml" xmlns:pvml="urn:schemas-microsoft-com:office:powerpoint" xmlns:com="http://schemas.openxmlformats.org/drawingml/2006/compatibility" xmlns:p14="http://schemas.microsoft.com/office/powerpoint/2010/main" xmlns:p15="http://schemas.microsoft.com/office/powerpoint/2012/main" matchingName="Title and Content" type="obj">
+  <p:cSld name="OBJECT">
     <p:spTree>
       <p:nvGrpSpPr>
         <p:cNvPr id="11" name="Shape 11"/>
@@ -2865,9 +3121,8 @@
           <a:bodyPr anchorCtr="0" anchor="ctr" bIns="45675" lIns="91375" spcFirstLastPara="1" rIns="91375" wrap="square" tIns="45675">
             <a:noAutofit/>
           </a:bodyPr>
-          <a:lstStyle/>
-          <a:p>
-            <a:pPr indent="0" lvl="0" marL="0" marR="0" rtl="0" algn="r">
+          <a:lstStyle>
+            <a:lvl1pPr indent="0" lvl="0" marL="0" marR="0" rtl="0" algn="r">
               <a:lnSpc>
                 <a:spcPct val="100000"/>
               </a:lnSpc>
@@ -2883,20 +3138,240 @@
               <a:buSzPts val="1200"/>
               <a:buFont typeface="Calibri"/>
               <a:buNone/>
+              <a:defRPr b="0" i="0" sz="1200" u="none" cap="none" strike="noStrike">
+                <a:solidFill>
+                  <a:srgbClr val="898989"/>
+                </a:solidFill>
+                <a:latin typeface="Calibri"/>
+                <a:ea typeface="Calibri"/>
+                <a:cs typeface="Calibri"/>
+                <a:sym typeface="Calibri"/>
+              </a:defRPr>
+            </a:lvl1pPr>
+            <a:lvl2pPr indent="0" lvl="1" marL="0" marR="0" rtl="0" algn="r">
+              <a:lnSpc>
+                <a:spcPct val="100000"/>
+              </a:lnSpc>
+              <a:spcBef>
+                <a:spcPts val="0"/>
+              </a:spcBef>
+              <a:spcAft>
+                <a:spcPts val="0"/>
+              </a:spcAft>
+              <a:buClr>
+                <a:srgbClr val="898989"/>
+              </a:buClr>
+              <a:buSzPts val="1200"/>
+              <a:buFont typeface="Calibri"/>
+              <a:buNone/>
+              <a:defRPr b="0" i="0" sz="1200" u="none" cap="none" strike="noStrike">
+                <a:solidFill>
+                  <a:srgbClr val="898989"/>
+                </a:solidFill>
+                <a:latin typeface="Calibri"/>
+                <a:ea typeface="Calibri"/>
+                <a:cs typeface="Calibri"/>
+                <a:sym typeface="Calibri"/>
+              </a:defRPr>
+            </a:lvl2pPr>
+            <a:lvl3pPr indent="0" lvl="2" marL="0" marR="0" rtl="0" algn="r">
+              <a:lnSpc>
+                <a:spcPct val="100000"/>
+              </a:lnSpc>
+              <a:spcBef>
+                <a:spcPts val="0"/>
+              </a:spcBef>
+              <a:spcAft>
+                <a:spcPts val="0"/>
+              </a:spcAft>
+              <a:buClr>
+                <a:srgbClr val="898989"/>
+              </a:buClr>
+              <a:buSzPts val="1200"/>
+              <a:buFont typeface="Calibri"/>
+              <a:buNone/>
+              <a:defRPr b="0" i="0" sz="1200" u="none" cap="none" strike="noStrike">
+                <a:solidFill>
+                  <a:srgbClr val="898989"/>
+                </a:solidFill>
+                <a:latin typeface="Calibri"/>
+                <a:ea typeface="Calibri"/>
+                <a:cs typeface="Calibri"/>
+                <a:sym typeface="Calibri"/>
+              </a:defRPr>
+            </a:lvl3pPr>
+            <a:lvl4pPr indent="0" lvl="3" marL="0" marR="0" rtl="0" algn="r">
+              <a:lnSpc>
+                <a:spcPct val="100000"/>
+              </a:lnSpc>
+              <a:spcBef>
+                <a:spcPts val="0"/>
+              </a:spcBef>
+              <a:spcAft>
+                <a:spcPts val="0"/>
+              </a:spcAft>
+              <a:buClr>
+                <a:srgbClr val="898989"/>
+              </a:buClr>
+              <a:buSzPts val="1200"/>
+              <a:buFont typeface="Calibri"/>
+              <a:buNone/>
+              <a:defRPr b="0" i="0" sz="1200" u="none" cap="none" strike="noStrike">
+                <a:solidFill>
+                  <a:srgbClr val="898989"/>
+                </a:solidFill>
+                <a:latin typeface="Calibri"/>
+                <a:ea typeface="Calibri"/>
+                <a:cs typeface="Calibri"/>
+                <a:sym typeface="Calibri"/>
+              </a:defRPr>
+            </a:lvl4pPr>
+            <a:lvl5pPr indent="0" lvl="4" marL="0" marR="0" rtl="0" algn="r">
+              <a:lnSpc>
+                <a:spcPct val="100000"/>
+              </a:lnSpc>
+              <a:spcBef>
+                <a:spcPts val="0"/>
+              </a:spcBef>
+              <a:spcAft>
+                <a:spcPts val="0"/>
+              </a:spcAft>
+              <a:buClr>
+                <a:srgbClr val="898989"/>
+              </a:buClr>
+              <a:buSzPts val="1200"/>
+              <a:buFont typeface="Calibri"/>
+              <a:buNone/>
+              <a:defRPr b="0" i="0" sz="1200" u="none" cap="none" strike="noStrike">
+                <a:solidFill>
+                  <a:srgbClr val="898989"/>
+                </a:solidFill>
+                <a:latin typeface="Calibri"/>
+                <a:ea typeface="Calibri"/>
+                <a:cs typeface="Calibri"/>
+                <a:sym typeface="Calibri"/>
+              </a:defRPr>
+            </a:lvl5pPr>
+            <a:lvl6pPr indent="0" lvl="5" marL="0" marR="0" rtl="0" algn="r">
+              <a:lnSpc>
+                <a:spcPct val="100000"/>
+              </a:lnSpc>
+              <a:spcBef>
+                <a:spcPts val="0"/>
+              </a:spcBef>
+              <a:spcAft>
+                <a:spcPts val="0"/>
+              </a:spcAft>
+              <a:buClr>
+                <a:srgbClr val="898989"/>
+              </a:buClr>
+              <a:buSzPts val="1200"/>
+              <a:buFont typeface="Calibri"/>
+              <a:buNone/>
+              <a:defRPr b="0" i="0" sz="1200" u="none" cap="none" strike="noStrike">
+                <a:solidFill>
+                  <a:srgbClr val="898989"/>
+                </a:solidFill>
+                <a:latin typeface="Calibri"/>
+                <a:ea typeface="Calibri"/>
+                <a:cs typeface="Calibri"/>
+                <a:sym typeface="Calibri"/>
+              </a:defRPr>
+            </a:lvl6pPr>
+            <a:lvl7pPr indent="0" lvl="6" marL="0" marR="0" rtl="0" algn="r">
+              <a:lnSpc>
+                <a:spcPct val="100000"/>
+              </a:lnSpc>
+              <a:spcBef>
+                <a:spcPts val="0"/>
+              </a:spcBef>
+              <a:spcAft>
+                <a:spcPts val="0"/>
+              </a:spcAft>
+              <a:buClr>
+                <a:srgbClr val="898989"/>
+              </a:buClr>
+              <a:buSzPts val="1200"/>
+              <a:buFont typeface="Calibri"/>
+              <a:buNone/>
+              <a:defRPr b="0" i="0" sz="1200" u="none" cap="none" strike="noStrike">
+                <a:solidFill>
+                  <a:srgbClr val="898989"/>
+                </a:solidFill>
+                <a:latin typeface="Calibri"/>
+                <a:ea typeface="Calibri"/>
+                <a:cs typeface="Calibri"/>
+                <a:sym typeface="Calibri"/>
+              </a:defRPr>
+            </a:lvl7pPr>
+            <a:lvl8pPr indent="0" lvl="7" marL="0" marR="0" rtl="0" algn="r">
+              <a:lnSpc>
+                <a:spcPct val="100000"/>
+              </a:lnSpc>
+              <a:spcBef>
+                <a:spcPts val="0"/>
+              </a:spcBef>
+              <a:spcAft>
+                <a:spcPts val="0"/>
+              </a:spcAft>
+              <a:buClr>
+                <a:srgbClr val="898989"/>
+              </a:buClr>
+              <a:buSzPts val="1200"/>
+              <a:buFont typeface="Calibri"/>
+              <a:buNone/>
+              <a:defRPr b="0" i="0" sz="1200" u="none" cap="none" strike="noStrike">
+                <a:solidFill>
+                  <a:srgbClr val="898989"/>
+                </a:solidFill>
+                <a:latin typeface="Calibri"/>
+                <a:ea typeface="Calibri"/>
+                <a:cs typeface="Calibri"/>
+                <a:sym typeface="Calibri"/>
+              </a:defRPr>
+            </a:lvl8pPr>
+            <a:lvl9pPr indent="0" lvl="8" marL="0" marR="0" rtl="0" algn="r">
+              <a:lnSpc>
+                <a:spcPct val="100000"/>
+              </a:lnSpc>
+              <a:spcBef>
+                <a:spcPts val="0"/>
+              </a:spcBef>
+              <a:spcAft>
+                <a:spcPts val="0"/>
+              </a:spcAft>
+              <a:buClr>
+                <a:srgbClr val="898989"/>
+              </a:buClr>
+              <a:buSzPts val="1200"/>
+              <a:buFont typeface="Calibri"/>
+              <a:buNone/>
+              <a:defRPr b="0" i="0" sz="1200" u="none" cap="none" strike="noStrike">
+                <a:solidFill>
+                  <a:srgbClr val="898989"/>
+                </a:solidFill>
+                <a:latin typeface="Calibri"/>
+                <a:ea typeface="Calibri"/>
+                <a:cs typeface="Calibri"/>
+                <a:sym typeface="Calibri"/>
+              </a:defRPr>
+            </a:lvl9pPr>
+          </a:lstStyle>
+          <a:p>
+            <a:pPr indent="0" lvl="0" marL="0">
+              <a:spcBef>
+                <a:spcPts val="0"/>
+              </a:spcBef>
+              <a:spcAft>
+                <a:spcPts val="0"/>
+              </a:spcAft>
+              <a:buNone/>
             </a:pPr>
             <a:fld id="{00000000-1234-1234-1234-123412341234}" type="slidenum">
-              <a:rPr b="0" i="0" lang="en-US" sz="1200" u="none" cap="none" strike="noStrike">
-                <a:solidFill>
-                  <a:srgbClr val="898989"/>
-                </a:solidFill>
-                <a:latin typeface="Calibri"/>
-                <a:ea typeface="Calibri"/>
-                <a:cs typeface="Calibri"/>
-                <a:sym typeface="Calibri"/>
-              </a:rPr>
+              <a:rPr lang="en-US"/>
               <a:t>‹#›</a:t>
             </a:fld>
-            <a:endParaRPr b="0" i="0" sz="1400" u="none" cap="none" strike="noStrike">
+            <a:endParaRPr sz="1400">
               <a:solidFill>
                 <a:srgbClr val="000000"/>
               </a:solidFill>
@@ -2917,8 +3392,8 @@
 </file>
 
 <file path=ppt/slideLayouts/slideLayout10.xml><?xml version="1.0" encoding="utf-8"?>
-<p:sldLayout xmlns:a="http://schemas.openxmlformats.org/drawingml/2006/main" xmlns:r="http://schemas.openxmlformats.org/officeDocument/2006/relationships" xmlns:mc="http://schemas.openxmlformats.org/markup-compatibility/2006" xmlns:mv="urn:schemas-microsoft-com:mac:vml" xmlns:p="http://schemas.openxmlformats.org/presentationml/2006/main" xmlns:c="http://schemas.openxmlformats.org/drawingml/2006/chart" xmlns:dgm="http://schemas.openxmlformats.org/drawingml/2006/diagram" xmlns:o="urn:schemas-microsoft-com:office:office" xmlns:v="urn:schemas-microsoft-com:vml" xmlns:pvml="urn:schemas-microsoft-com:office:powerpoint" xmlns:com="http://schemas.openxmlformats.org/drawingml/2006/compatibility" xmlns:p14="http://schemas.microsoft.com/office/powerpoint/2010/main" xmlns:p15="http://schemas.microsoft.com/office/powerpoint/2012/main" type="secHead">
-  <p:cSld name="Section Header">
+<p:sldLayout xmlns:a="http://schemas.openxmlformats.org/drawingml/2006/main" xmlns:r="http://schemas.openxmlformats.org/officeDocument/2006/relationships" xmlns:mc="http://schemas.openxmlformats.org/markup-compatibility/2006" xmlns:mv="urn:schemas-microsoft-com:mac:vml" xmlns:p="http://schemas.openxmlformats.org/presentationml/2006/main" xmlns:c="http://schemas.openxmlformats.org/drawingml/2006/chart" xmlns:dgm="http://schemas.openxmlformats.org/drawingml/2006/diagram" xmlns:o="urn:schemas-microsoft-com:office:office" xmlns:v="urn:schemas-microsoft-com:vml" xmlns:pvml="urn:schemas-microsoft-com:office:powerpoint" xmlns:com="http://schemas.openxmlformats.org/drawingml/2006/compatibility" xmlns:p14="http://schemas.microsoft.com/office/powerpoint/2010/main" xmlns:p15="http://schemas.microsoft.com/office/powerpoint/2012/main" matchingName="Section Header" type="secHead">
+  <p:cSld name="SECTION_HEADER">
     <p:spTree>
       <p:nvGrpSpPr>
         <p:cNvPr id="68" name="Shape 68"/>
@@ -3982,9 +4457,8 @@
           <a:bodyPr anchorCtr="0" anchor="ctr" bIns="45675" lIns="91375" spcFirstLastPara="1" rIns="91375" wrap="square" tIns="45675">
             <a:noAutofit/>
           </a:bodyPr>
-          <a:lstStyle/>
-          <a:p>
-            <a:pPr indent="0" lvl="0" marL="0" marR="0" rtl="0" algn="r">
+          <a:lstStyle>
+            <a:lvl1pPr indent="0" lvl="0" marL="0" marR="0" rtl="0" algn="r">
               <a:lnSpc>
                 <a:spcPct val="100000"/>
               </a:lnSpc>
@@ -4000,20 +4474,240 @@
               <a:buSzPts val="1200"/>
               <a:buFont typeface="Calibri"/>
               <a:buNone/>
+              <a:defRPr b="0" i="0" sz="1200" u="none" cap="none" strike="noStrike">
+                <a:solidFill>
+                  <a:srgbClr val="898989"/>
+                </a:solidFill>
+                <a:latin typeface="Calibri"/>
+                <a:ea typeface="Calibri"/>
+                <a:cs typeface="Calibri"/>
+                <a:sym typeface="Calibri"/>
+              </a:defRPr>
+            </a:lvl1pPr>
+            <a:lvl2pPr indent="0" lvl="1" marL="0" marR="0" rtl="0" algn="r">
+              <a:lnSpc>
+                <a:spcPct val="100000"/>
+              </a:lnSpc>
+              <a:spcBef>
+                <a:spcPts val="0"/>
+              </a:spcBef>
+              <a:spcAft>
+                <a:spcPts val="0"/>
+              </a:spcAft>
+              <a:buClr>
+                <a:srgbClr val="898989"/>
+              </a:buClr>
+              <a:buSzPts val="1200"/>
+              <a:buFont typeface="Calibri"/>
+              <a:buNone/>
+              <a:defRPr b="0" i="0" sz="1200" u="none" cap="none" strike="noStrike">
+                <a:solidFill>
+                  <a:srgbClr val="898989"/>
+                </a:solidFill>
+                <a:latin typeface="Calibri"/>
+                <a:ea typeface="Calibri"/>
+                <a:cs typeface="Calibri"/>
+                <a:sym typeface="Calibri"/>
+              </a:defRPr>
+            </a:lvl2pPr>
+            <a:lvl3pPr indent="0" lvl="2" marL="0" marR="0" rtl="0" algn="r">
+              <a:lnSpc>
+                <a:spcPct val="100000"/>
+              </a:lnSpc>
+              <a:spcBef>
+                <a:spcPts val="0"/>
+              </a:spcBef>
+              <a:spcAft>
+                <a:spcPts val="0"/>
+              </a:spcAft>
+              <a:buClr>
+                <a:srgbClr val="898989"/>
+              </a:buClr>
+              <a:buSzPts val="1200"/>
+              <a:buFont typeface="Calibri"/>
+              <a:buNone/>
+              <a:defRPr b="0" i="0" sz="1200" u="none" cap="none" strike="noStrike">
+                <a:solidFill>
+                  <a:srgbClr val="898989"/>
+                </a:solidFill>
+                <a:latin typeface="Calibri"/>
+                <a:ea typeface="Calibri"/>
+                <a:cs typeface="Calibri"/>
+                <a:sym typeface="Calibri"/>
+              </a:defRPr>
+            </a:lvl3pPr>
+            <a:lvl4pPr indent="0" lvl="3" marL="0" marR="0" rtl="0" algn="r">
+              <a:lnSpc>
+                <a:spcPct val="100000"/>
+              </a:lnSpc>
+              <a:spcBef>
+                <a:spcPts val="0"/>
+              </a:spcBef>
+              <a:spcAft>
+                <a:spcPts val="0"/>
+              </a:spcAft>
+              <a:buClr>
+                <a:srgbClr val="898989"/>
+              </a:buClr>
+              <a:buSzPts val="1200"/>
+              <a:buFont typeface="Calibri"/>
+              <a:buNone/>
+              <a:defRPr b="0" i="0" sz="1200" u="none" cap="none" strike="noStrike">
+                <a:solidFill>
+                  <a:srgbClr val="898989"/>
+                </a:solidFill>
+                <a:latin typeface="Calibri"/>
+                <a:ea typeface="Calibri"/>
+                <a:cs typeface="Calibri"/>
+                <a:sym typeface="Calibri"/>
+              </a:defRPr>
+            </a:lvl4pPr>
+            <a:lvl5pPr indent="0" lvl="4" marL="0" marR="0" rtl="0" algn="r">
+              <a:lnSpc>
+                <a:spcPct val="100000"/>
+              </a:lnSpc>
+              <a:spcBef>
+                <a:spcPts val="0"/>
+              </a:spcBef>
+              <a:spcAft>
+                <a:spcPts val="0"/>
+              </a:spcAft>
+              <a:buClr>
+                <a:srgbClr val="898989"/>
+              </a:buClr>
+              <a:buSzPts val="1200"/>
+              <a:buFont typeface="Calibri"/>
+              <a:buNone/>
+              <a:defRPr b="0" i="0" sz="1200" u="none" cap="none" strike="noStrike">
+                <a:solidFill>
+                  <a:srgbClr val="898989"/>
+                </a:solidFill>
+                <a:latin typeface="Calibri"/>
+                <a:ea typeface="Calibri"/>
+                <a:cs typeface="Calibri"/>
+                <a:sym typeface="Calibri"/>
+              </a:defRPr>
+            </a:lvl5pPr>
+            <a:lvl6pPr indent="0" lvl="5" marL="0" marR="0" rtl="0" algn="r">
+              <a:lnSpc>
+                <a:spcPct val="100000"/>
+              </a:lnSpc>
+              <a:spcBef>
+                <a:spcPts val="0"/>
+              </a:spcBef>
+              <a:spcAft>
+                <a:spcPts val="0"/>
+              </a:spcAft>
+              <a:buClr>
+                <a:srgbClr val="898989"/>
+              </a:buClr>
+              <a:buSzPts val="1200"/>
+              <a:buFont typeface="Calibri"/>
+              <a:buNone/>
+              <a:defRPr b="0" i="0" sz="1200" u="none" cap="none" strike="noStrike">
+                <a:solidFill>
+                  <a:srgbClr val="898989"/>
+                </a:solidFill>
+                <a:latin typeface="Calibri"/>
+                <a:ea typeface="Calibri"/>
+                <a:cs typeface="Calibri"/>
+                <a:sym typeface="Calibri"/>
+              </a:defRPr>
+            </a:lvl6pPr>
+            <a:lvl7pPr indent="0" lvl="6" marL="0" marR="0" rtl="0" algn="r">
+              <a:lnSpc>
+                <a:spcPct val="100000"/>
+              </a:lnSpc>
+              <a:spcBef>
+                <a:spcPts val="0"/>
+              </a:spcBef>
+              <a:spcAft>
+                <a:spcPts val="0"/>
+              </a:spcAft>
+              <a:buClr>
+                <a:srgbClr val="898989"/>
+              </a:buClr>
+              <a:buSzPts val="1200"/>
+              <a:buFont typeface="Calibri"/>
+              <a:buNone/>
+              <a:defRPr b="0" i="0" sz="1200" u="none" cap="none" strike="noStrike">
+                <a:solidFill>
+                  <a:srgbClr val="898989"/>
+                </a:solidFill>
+                <a:latin typeface="Calibri"/>
+                <a:ea typeface="Calibri"/>
+                <a:cs typeface="Calibri"/>
+                <a:sym typeface="Calibri"/>
+              </a:defRPr>
+            </a:lvl7pPr>
+            <a:lvl8pPr indent="0" lvl="7" marL="0" marR="0" rtl="0" algn="r">
+              <a:lnSpc>
+                <a:spcPct val="100000"/>
+              </a:lnSpc>
+              <a:spcBef>
+                <a:spcPts val="0"/>
+              </a:spcBef>
+              <a:spcAft>
+                <a:spcPts val="0"/>
+              </a:spcAft>
+              <a:buClr>
+                <a:srgbClr val="898989"/>
+              </a:buClr>
+              <a:buSzPts val="1200"/>
+              <a:buFont typeface="Calibri"/>
+              <a:buNone/>
+              <a:defRPr b="0" i="0" sz="1200" u="none" cap="none" strike="noStrike">
+                <a:solidFill>
+                  <a:srgbClr val="898989"/>
+                </a:solidFill>
+                <a:latin typeface="Calibri"/>
+                <a:ea typeface="Calibri"/>
+                <a:cs typeface="Calibri"/>
+                <a:sym typeface="Calibri"/>
+              </a:defRPr>
+            </a:lvl8pPr>
+            <a:lvl9pPr indent="0" lvl="8" marL="0" marR="0" rtl="0" algn="r">
+              <a:lnSpc>
+                <a:spcPct val="100000"/>
+              </a:lnSpc>
+              <a:spcBef>
+                <a:spcPts val="0"/>
+              </a:spcBef>
+              <a:spcAft>
+                <a:spcPts val="0"/>
+              </a:spcAft>
+              <a:buClr>
+                <a:srgbClr val="898989"/>
+              </a:buClr>
+              <a:buSzPts val="1200"/>
+              <a:buFont typeface="Calibri"/>
+              <a:buNone/>
+              <a:defRPr b="0" i="0" sz="1200" u="none" cap="none" strike="noStrike">
+                <a:solidFill>
+                  <a:srgbClr val="898989"/>
+                </a:solidFill>
+                <a:latin typeface="Calibri"/>
+                <a:ea typeface="Calibri"/>
+                <a:cs typeface="Calibri"/>
+                <a:sym typeface="Calibri"/>
+              </a:defRPr>
+            </a:lvl9pPr>
+          </a:lstStyle>
+          <a:p>
+            <a:pPr indent="0" lvl="0" marL="0">
+              <a:spcBef>
+                <a:spcPts val="0"/>
+              </a:spcBef>
+              <a:spcAft>
+                <a:spcPts val="0"/>
+              </a:spcAft>
+              <a:buNone/>
             </a:pPr>
             <a:fld id="{00000000-1234-1234-1234-123412341234}" type="slidenum">
-              <a:rPr b="0" i="0" lang="en-US" sz="1200" u="none" cap="none" strike="noStrike">
-                <a:solidFill>
-                  <a:srgbClr val="898989"/>
-                </a:solidFill>
-                <a:latin typeface="Calibri"/>
-                <a:ea typeface="Calibri"/>
-                <a:cs typeface="Calibri"/>
-                <a:sym typeface="Calibri"/>
-              </a:rPr>
+              <a:rPr lang="en-US"/>
               <a:t>‹#›</a:t>
             </a:fld>
-            <a:endParaRPr b="0" i="0" sz="1400" u="none" cap="none" strike="noStrike">
+            <a:endParaRPr sz="1400">
               <a:solidFill>
                 <a:srgbClr val="000000"/>
               </a:solidFill>
@@ -4034,8 +4728,8 @@
 </file>
 
 <file path=ppt/slideLayouts/slideLayout11.xml><?xml version="1.0" encoding="utf-8"?>
-<p:sldLayout xmlns:a="http://schemas.openxmlformats.org/drawingml/2006/main" xmlns:r="http://schemas.openxmlformats.org/officeDocument/2006/relationships" xmlns:mc="http://schemas.openxmlformats.org/markup-compatibility/2006" xmlns:mv="urn:schemas-microsoft-com:mac:vml" xmlns:p="http://schemas.openxmlformats.org/presentationml/2006/main" xmlns:c="http://schemas.openxmlformats.org/drawingml/2006/chart" xmlns:dgm="http://schemas.openxmlformats.org/drawingml/2006/diagram" xmlns:o="urn:schemas-microsoft-com:office:office" xmlns:v="urn:schemas-microsoft-com:vml" xmlns:pvml="urn:schemas-microsoft-com:office:powerpoint" xmlns:com="http://schemas.openxmlformats.org/drawingml/2006/compatibility" xmlns:p14="http://schemas.microsoft.com/office/powerpoint/2010/main" xmlns:p15="http://schemas.microsoft.com/office/powerpoint/2012/main" type="title">
-  <p:cSld name="Title Slide">
+<p:sldLayout xmlns:a="http://schemas.openxmlformats.org/drawingml/2006/main" xmlns:r="http://schemas.openxmlformats.org/officeDocument/2006/relationships" xmlns:mc="http://schemas.openxmlformats.org/markup-compatibility/2006" xmlns:mv="urn:schemas-microsoft-com:mac:vml" xmlns:p="http://schemas.openxmlformats.org/presentationml/2006/main" xmlns:c="http://schemas.openxmlformats.org/drawingml/2006/chart" xmlns:dgm="http://schemas.openxmlformats.org/drawingml/2006/diagram" xmlns:o="urn:schemas-microsoft-com:office:office" xmlns:v="urn:schemas-microsoft-com:vml" xmlns:pvml="urn:schemas-microsoft-com:office:powerpoint" xmlns:com="http://schemas.openxmlformats.org/drawingml/2006/compatibility" xmlns:p14="http://schemas.microsoft.com/office/powerpoint/2010/main" xmlns:p15="http://schemas.microsoft.com/office/powerpoint/2012/main" matchingName="Title Slide" type="title">
+  <p:cSld name="TITLE">
     <p:spTree>
       <p:nvGrpSpPr>
         <p:cNvPr id="74" name="Shape 74"/>
@@ -5099,9 +5793,8 @@
           <a:bodyPr anchorCtr="0" anchor="ctr" bIns="45675" lIns="91375" spcFirstLastPara="1" rIns="91375" wrap="square" tIns="45675">
             <a:noAutofit/>
           </a:bodyPr>
-          <a:lstStyle/>
-          <a:p>
-            <a:pPr indent="0" lvl="0" marL="0" marR="0" rtl="0" algn="r">
+          <a:lstStyle>
+            <a:lvl1pPr indent="0" lvl="0" marL="0" marR="0" rtl="0" algn="r">
               <a:lnSpc>
                 <a:spcPct val="100000"/>
               </a:lnSpc>
@@ -5117,20 +5810,240 @@
               <a:buSzPts val="1200"/>
               <a:buFont typeface="Calibri"/>
               <a:buNone/>
+              <a:defRPr b="0" i="0" sz="1200" u="none" cap="none" strike="noStrike">
+                <a:solidFill>
+                  <a:srgbClr val="898989"/>
+                </a:solidFill>
+                <a:latin typeface="Calibri"/>
+                <a:ea typeface="Calibri"/>
+                <a:cs typeface="Calibri"/>
+                <a:sym typeface="Calibri"/>
+              </a:defRPr>
+            </a:lvl1pPr>
+            <a:lvl2pPr indent="0" lvl="1" marL="0" marR="0" rtl="0" algn="r">
+              <a:lnSpc>
+                <a:spcPct val="100000"/>
+              </a:lnSpc>
+              <a:spcBef>
+                <a:spcPts val="0"/>
+              </a:spcBef>
+              <a:spcAft>
+                <a:spcPts val="0"/>
+              </a:spcAft>
+              <a:buClr>
+                <a:srgbClr val="898989"/>
+              </a:buClr>
+              <a:buSzPts val="1200"/>
+              <a:buFont typeface="Calibri"/>
+              <a:buNone/>
+              <a:defRPr b="0" i="0" sz="1200" u="none" cap="none" strike="noStrike">
+                <a:solidFill>
+                  <a:srgbClr val="898989"/>
+                </a:solidFill>
+                <a:latin typeface="Calibri"/>
+                <a:ea typeface="Calibri"/>
+                <a:cs typeface="Calibri"/>
+                <a:sym typeface="Calibri"/>
+              </a:defRPr>
+            </a:lvl2pPr>
+            <a:lvl3pPr indent="0" lvl="2" marL="0" marR="0" rtl="0" algn="r">
+              <a:lnSpc>
+                <a:spcPct val="100000"/>
+              </a:lnSpc>
+              <a:spcBef>
+                <a:spcPts val="0"/>
+              </a:spcBef>
+              <a:spcAft>
+                <a:spcPts val="0"/>
+              </a:spcAft>
+              <a:buClr>
+                <a:srgbClr val="898989"/>
+              </a:buClr>
+              <a:buSzPts val="1200"/>
+              <a:buFont typeface="Calibri"/>
+              <a:buNone/>
+              <a:defRPr b="0" i="0" sz="1200" u="none" cap="none" strike="noStrike">
+                <a:solidFill>
+                  <a:srgbClr val="898989"/>
+                </a:solidFill>
+                <a:latin typeface="Calibri"/>
+                <a:ea typeface="Calibri"/>
+                <a:cs typeface="Calibri"/>
+                <a:sym typeface="Calibri"/>
+              </a:defRPr>
+            </a:lvl3pPr>
+            <a:lvl4pPr indent="0" lvl="3" marL="0" marR="0" rtl="0" algn="r">
+              <a:lnSpc>
+                <a:spcPct val="100000"/>
+              </a:lnSpc>
+              <a:spcBef>
+                <a:spcPts val="0"/>
+              </a:spcBef>
+              <a:spcAft>
+                <a:spcPts val="0"/>
+              </a:spcAft>
+              <a:buClr>
+                <a:srgbClr val="898989"/>
+              </a:buClr>
+              <a:buSzPts val="1200"/>
+              <a:buFont typeface="Calibri"/>
+              <a:buNone/>
+              <a:defRPr b="0" i="0" sz="1200" u="none" cap="none" strike="noStrike">
+                <a:solidFill>
+                  <a:srgbClr val="898989"/>
+                </a:solidFill>
+                <a:latin typeface="Calibri"/>
+                <a:ea typeface="Calibri"/>
+                <a:cs typeface="Calibri"/>
+                <a:sym typeface="Calibri"/>
+              </a:defRPr>
+            </a:lvl4pPr>
+            <a:lvl5pPr indent="0" lvl="4" marL="0" marR="0" rtl="0" algn="r">
+              <a:lnSpc>
+                <a:spcPct val="100000"/>
+              </a:lnSpc>
+              <a:spcBef>
+                <a:spcPts val="0"/>
+              </a:spcBef>
+              <a:spcAft>
+                <a:spcPts val="0"/>
+              </a:spcAft>
+              <a:buClr>
+                <a:srgbClr val="898989"/>
+              </a:buClr>
+              <a:buSzPts val="1200"/>
+              <a:buFont typeface="Calibri"/>
+              <a:buNone/>
+              <a:defRPr b="0" i="0" sz="1200" u="none" cap="none" strike="noStrike">
+                <a:solidFill>
+                  <a:srgbClr val="898989"/>
+                </a:solidFill>
+                <a:latin typeface="Calibri"/>
+                <a:ea typeface="Calibri"/>
+                <a:cs typeface="Calibri"/>
+                <a:sym typeface="Calibri"/>
+              </a:defRPr>
+            </a:lvl5pPr>
+            <a:lvl6pPr indent="0" lvl="5" marL="0" marR="0" rtl="0" algn="r">
+              <a:lnSpc>
+                <a:spcPct val="100000"/>
+              </a:lnSpc>
+              <a:spcBef>
+                <a:spcPts val="0"/>
+              </a:spcBef>
+              <a:spcAft>
+                <a:spcPts val="0"/>
+              </a:spcAft>
+              <a:buClr>
+                <a:srgbClr val="898989"/>
+              </a:buClr>
+              <a:buSzPts val="1200"/>
+              <a:buFont typeface="Calibri"/>
+              <a:buNone/>
+              <a:defRPr b="0" i="0" sz="1200" u="none" cap="none" strike="noStrike">
+                <a:solidFill>
+                  <a:srgbClr val="898989"/>
+                </a:solidFill>
+                <a:latin typeface="Calibri"/>
+                <a:ea typeface="Calibri"/>
+                <a:cs typeface="Calibri"/>
+                <a:sym typeface="Calibri"/>
+              </a:defRPr>
+            </a:lvl6pPr>
+            <a:lvl7pPr indent="0" lvl="6" marL="0" marR="0" rtl="0" algn="r">
+              <a:lnSpc>
+                <a:spcPct val="100000"/>
+              </a:lnSpc>
+              <a:spcBef>
+                <a:spcPts val="0"/>
+              </a:spcBef>
+              <a:spcAft>
+                <a:spcPts val="0"/>
+              </a:spcAft>
+              <a:buClr>
+                <a:srgbClr val="898989"/>
+              </a:buClr>
+              <a:buSzPts val="1200"/>
+              <a:buFont typeface="Calibri"/>
+              <a:buNone/>
+              <a:defRPr b="0" i="0" sz="1200" u="none" cap="none" strike="noStrike">
+                <a:solidFill>
+                  <a:srgbClr val="898989"/>
+                </a:solidFill>
+                <a:latin typeface="Calibri"/>
+                <a:ea typeface="Calibri"/>
+                <a:cs typeface="Calibri"/>
+                <a:sym typeface="Calibri"/>
+              </a:defRPr>
+            </a:lvl7pPr>
+            <a:lvl8pPr indent="0" lvl="7" marL="0" marR="0" rtl="0" algn="r">
+              <a:lnSpc>
+                <a:spcPct val="100000"/>
+              </a:lnSpc>
+              <a:spcBef>
+                <a:spcPts val="0"/>
+              </a:spcBef>
+              <a:spcAft>
+                <a:spcPts val="0"/>
+              </a:spcAft>
+              <a:buClr>
+                <a:srgbClr val="898989"/>
+              </a:buClr>
+              <a:buSzPts val="1200"/>
+              <a:buFont typeface="Calibri"/>
+              <a:buNone/>
+              <a:defRPr b="0" i="0" sz="1200" u="none" cap="none" strike="noStrike">
+                <a:solidFill>
+                  <a:srgbClr val="898989"/>
+                </a:solidFill>
+                <a:latin typeface="Calibri"/>
+                <a:ea typeface="Calibri"/>
+                <a:cs typeface="Calibri"/>
+                <a:sym typeface="Calibri"/>
+              </a:defRPr>
+            </a:lvl8pPr>
+            <a:lvl9pPr indent="0" lvl="8" marL="0" marR="0" rtl="0" algn="r">
+              <a:lnSpc>
+                <a:spcPct val="100000"/>
+              </a:lnSpc>
+              <a:spcBef>
+                <a:spcPts val="0"/>
+              </a:spcBef>
+              <a:spcAft>
+                <a:spcPts val="0"/>
+              </a:spcAft>
+              <a:buClr>
+                <a:srgbClr val="898989"/>
+              </a:buClr>
+              <a:buSzPts val="1200"/>
+              <a:buFont typeface="Calibri"/>
+              <a:buNone/>
+              <a:defRPr b="0" i="0" sz="1200" u="none" cap="none" strike="noStrike">
+                <a:solidFill>
+                  <a:srgbClr val="898989"/>
+                </a:solidFill>
+                <a:latin typeface="Calibri"/>
+                <a:ea typeface="Calibri"/>
+                <a:cs typeface="Calibri"/>
+                <a:sym typeface="Calibri"/>
+              </a:defRPr>
+            </a:lvl9pPr>
+          </a:lstStyle>
+          <a:p>
+            <a:pPr indent="0" lvl="0" marL="0">
+              <a:spcBef>
+                <a:spcPts val="0"/>
+              </a:spcBef>
+              <a:spcAft>
+                <a:spcPts val="0"/>
+              </a:spcAft>
+              <a:buNone/>
             </a:pPr>
             <a:fld id="{00000000-1234-1234-1234-123412341234}" type="slidenum">
-              <a:rPr b="0" i="0" lang="en-US" sz="1200" u="none" cap="none" strike="noStrike">
-                <a:solidFill>
-                  <a:srgbClr val="898989"/>
-                </a:solidFill>
-                <a:latin typeface="Calibri"/>
-                <a:ea typeface="Calibri"/>
-                <a:cs typeface="Calibri"/>
-                <a:sym typeface="Calibri"/>
-              </a:rPr>
+              <a:rPr lang="en-US"/>
               <a:t>‹#›</a:t>
             </a:fld>
-            <a:endParaRPr b="0" i="0" sz="1400" u="none" cap="none" strike="noStrike">
+            <a:endParaRPr sz="1400">
               <a:solidFill>
                 <a:srgbClr val="000000"/>
               </a:solidFill>
@@ -5151,8 +6064,8 @@
 </file>
 
 <file path=ppt/slideLayouts/slideLayout2.xml><?xml version="1.0" encoding="utf-8"?>
-<p:sldLayout xmlns:a="http://schemas.openxmlformats.org/drawingml/2006/main" xmlns:r="http://schemas.openxmlformats.org/officeDocument/2006/relationships" xmlns:mc="http://schemas.openxmlformats.org/markup-compatibility/2006" xmlns:mv="urn:schemas-microsoft-com:mac:vml" xmlns:p="http://schemas.openxmlformats.org/presentationml/2006/main" xmlns:c="http://schemas.openxmlformats.org/drawingml/2006/chart" xmlns:dgm="http://schemas.openxmlformats.org/drawingml/2006/diagram" xmlns:o="urn:schemas-microsoft-com:office:office" xmlns:v="urn:schemas-microsoft-com:vml" xmlns:pvml="urn:schemas-microsoft-com:office:powerpoint" xmlns:com="http://schemas.openxmlformats.org/drawingml/2006/compatibility" xmlns:p14="http://schemas.microsoft.com/office/powerpoint/2010/main" xmlns:p15="http://schemas.microsoft.com/office/powerpoint/2012/main" type="vertTitleAndTx">
-  <p:cSld name="Vertical Title and Text">
+<p:sldLayout xmlns:a="http://schemas.openxmlformats.org/drawingml/2006/main" xmlns:r="http://schemas.openxmlformats.org/officeDocument/2006/relationships" xmlns:mc="http://schemas.openxmlformats.org/markup-compatibility/2006" xmlns:mv="urn:schemas-microsoft-com:mac:vml" xmlns:p="http://schemas.openxmlformats.org/presentationml/2006/main" xmlns:c="http://schemas.openxmlformats.org/drawingml/2006/chart" xmlns:dgm="http://schemas.openxmlformats.org/drawingml/2006/diagram" xmlns:o="urn:schemas-microsoft-com:office:office" xmlns:v="urn:schemas-microsoft-com:vml" xmlns:pvml="urn:schemas-microsoft-com:office:powerpoint" xmlns:com="http://schemas.openxmlformats.org/drawingml/2006/compatibility" xmlns:p14="http://schemas.microsoft.com/office/powerpoint/2010/main" xmlns:p15="http://schemas.microsoft.com/office/powerpoint/2012/main" matchingName="Vertical Title and Text" type="vertTitleAndTx">
+  <p:cSld name="VERTICAL_TITLE_AND_VERTICAL_TEXT">
     <p:spTree>
       <p:nvGrpSpPr>
         <p:cNvPr id="17" name="Shape 17"/>
@@ -6216,9 +7129,8 @@
           <a:bodyPr anchorCtr="0" anchor="ctr" bIns="45675" lIns="91375" spcFirstLastPara="1" rIns="91375" wrap="square" tIns="45675">
             <a:noAutofit/>
           </a:bodyPr>
-          <a:lstStyle/>
-          <a:p>
-            <a:pPr indent="0" lvl="0" marL="0" marR="0" rtl="0" algn="r">
+          <a:lstStyle>
+            <a:lvl1pPr indent="0" lvl="0" marL="0" marR="0" rtl="0" algn="r">
               <a:lnSpc>
                 <a:spcPct val="100000"/>
               </a:lnSpc>
@@ -6234,20 +7146,240 @@
               <a:buSzPts val="1200"/>
               <a:buFont typeface="Calibri"/>
               <a:buNone/>
+              <a:defRPr b="0" i="0" sz="1200" u="none" cap="none" strike="noStrike">
+                <a:solidFill>
+                  <a:srgbClr val="898989"/>
+                </a:solidFill>
+                <a:latin typeface="Calibri"/>
+                <a:ea typeface="Calibri"/>
+                <a:cs typeface="Calibri"/>
+                <a:sym typeface="Calibri"/>
+              </a:defRPr>
+            </a:lvl1pPr>
+            <a:lvl2pPr indent="0" lvl="1" marL="0" marR="0" rtl="0" algn="r">
+              <a:lnSpc>
+                <a:spcPct val="100000"/>
+              </a:lnSpc>
+              <a:spcBef>
+                <a:spcPts val="0"/>
+              </a:spcBef>
+              <a:spcAft>
+                <a:spcPts val="0"/>
+              </a:spcAft>
+              <a:buClr>
+                <a:srgbClr val="898989"/>
+              </a:buClr>
+              <a:buSzPts val="1200"/>
+              <a:buFont typeface="Calibri"/>
+              <a:buNone/>
+              <a:defRPr b="0" i="0" sz="1200" u="none" cap="none" strike="noStrike">
+                <a:solidFill>
+                  <a:srgbClr val="898989"/>
+                </a:solidFill>
+                <a:latin typeface="Calibri"/>
+                <a:ea typeface="Calibri"/>
+                <a:cs typeface="Calibri"/>
+                <a:sym typeface="Calibri"/>
+              </a:defRPr>
+            </a:lvl2pPr>
+            <a:lvl3pPr indent="0" lvl="2" marL="0" marR="0" rtl="0" algn="r">
+              <a:lnSpc>
+                <a:spcPct val="100000"/>
+              </a:lnSpc>
+              <a:spcBef>
+                <a:spcPts val="0"/>
+              </a:spcBef>
+              <a:spcAft>
+                <a:spcPts val="0"/>
+              </a:spcAft>
+              <a:buClr>
+                <a:srgbClr val="898989"/>
+              </a:buClr>
+              <a:buSzPts val="1200"/>
+              <a:buFont typeface="Calibri"/>
+              <a:buNone/>
+              <a:defRPr b="0" i="0" sz="1200" u="none" cap="none" strike="noStrike">
+                <a:solidFill>
+                  <a:srgbClr val="898989"/>
+                </a:solidFill>
+                <a:latin typeface="Calibri"/>
+                <a:ea typeface="Calibri"/>
+                <a:cs typeface="Calibri"/>
+                <a:sym typeface="Calibri"/>
+              </a:defRPr>
+            </a:lvl3pPr>
+            <a:lvl4pPr indent="0" lvl="3" marL="0" marR="0" rtl="0" algn="r">
+              <a:lnSpc>
+                <a:spcPct val="100000"/>
+              </a:lnSpc>
+              <a:spcBef>
+                <a:spcPts val="0"/>
+              </a:spcBef>
+              <a:spcAft>
+                <a:spcPts val="0"/>
+              </a:spcAft>
+              <a:buClr>
+                <a:srgbClr val="898989"/>
+              </a:buClr>
+              <a:buSzPts val="1200"/>
+              <a:buFont typeface="Calibri"/>
+              <a:buNone/>
+              <a:defRPr b="0" i="0" sz="1200" u="none" cap="none" strike="noStrike">
+                <a:solidFill>
+                  <a:srgbClr val="898989"/>
+                </a:solidFill>
+                <a:latin typeface="Calibri"/>
+                <a:ea typeface="Calibri"/>
+                <a:cs typeface="Calibri"/>
+                <a:sym typeface="Calibri"/>
+              </a:defRPr>
+            </a:lvl4pPr>
+            <a:lvl5pPr indent="0" lvl="4" marL="0" marR="0" rtl="0" algn="r">
+              <a:lnSpc>
+                <a:spcPct val="100000"/>
+              </a:lnSpc>
+              <a:spcBef>
+                <a:spcPts val="0"/>
+              </a:spcBef>
+              <a:spcAft>
+                <a:spcPts val="0"/>
+              </a:spcAft>
+              <a:buClr>
+                <a:srgbClr val="898989"/>
+              </a:buClr>
+              <a:buSzPts val="1200"/>
+              <a:buFont typeface="Calibri"/>
+              <a:buNone/>
+              <a:defRPr b="0" i="0" sz="1200" u="none" cap="none" strike="noStrike">
+                <a:solidFill>
+                  <a:srgbClr val="898989"/>
+                </a:solidFill>
+                <a:latin typeface="Calibri"/>
+                <a:ea typeface="Calibri"/>
+                <a:cs typeface="Calibri"/>
+                <a:sym typeface="Calibri"/>
+              </a:defRPr>
+            </a:lvl5pPr>
+            <a:lvl6pPr indent="0" lvl="5" marL="0" marR="0" rtl="0" algn="r">
+              <a:lnSpc>
+                <a:spcPct val="100000"/>
+              </a:lnSpc>
+              <a:spcBef>
+                <a:spcPts val="0"/>
+              </a:spcBef>
+              <a:spcAft>
+                <a:spcPts val="0"/>
+              </a:spcAft>
+              <a:buClr>
+                <a:srgbClr val="898989"/>
+              </a:buClr>
+              <a:buSzPts val="1200"/>
+              <a:buFont typeface="Calibri"/>
+              <a:buNone/>
+              <a:defRPr b="0" i="0" sz="1200" u="none" cap="none" strike="noStrike">
+                <a:solidFill>
+                  <a:srgbClr val="898989"/>
+                </a:solidFill>
+                <a:latin typeface="Calibri"/>
+                <a:ea typeface="Calibri"/>
+                <a:cs typeface="Calibri"/>
+                <a:sym typeface="Calibri"/>
+              </a:defRPr>
+            </a:lvl6pPr>
+            <a:lvl7pPr indent="0" lvl="6" marL="0" marR="0" rtl="0" algn="r">
+              <a:lnSpc>
+                <a:spcPct val="100000"/>
+              </a:lnSpc>
+              <a:spcBef>
+                <a:spcPts val="0"/>
+              </a:spcBef>
+              <a:spcAft>
+                <a:spcPts val="0"/>
+              </a:spcAft>
+              <a:buClr>
+                <a:srgbClr val="898989"/>
+              </a:buClr>
+              <a:buSzPts val="1200"/>
+              <a:buFont typeface="Calibri"/>
+              <a:buNone/>
+              <a:defRPr b="0" i="0" sz="1200" u="none" cap="none" strike="noStrike">
+                <a:solidFill>
+                  <a:srgbClr val="898989"/>
+                </a:solidFill>
+                <a:latin typeface="Calibri"/>
+                <a:ea typeface="Calibri"/>
+                <a:cs typeface="Calibri"/>
+                <a:sym typeface="Calibri"/>
+              </a:defRPr>
+            </a:lvl7pPr>
+            <a:lvl8pPr indent="0" lvl="7" marL="0" marR="0" rtl="0" algn="r">
+              <a:lnSpc>
+                <a:spcPct val="100000"/>
+              </a:lnSpc>
+              <a:spcBef>
+                <a:spcPts val="0"/>
+              </a:spcBef>
+              <a:spcAft>
+                <a:spcPts val="0"/>
+              </a:spcAft>
+              <a:buClr>
+                <a:srgbClr val="898989"/>
+              </a:buClr>
+              <a:buSzPts val="1200"/>
+              <a:buFont typeface="Calibri"/>
+              <a:buNone/>
+              <a:defRPr b="0" i="0" sz="1200" u="none" cap="none" strike="noStrike">
+                <a:solidFill>
+                  <a:srgbClr val="898989"/>
+                </a:solidFill>
+                <a:latin typeface="Calibri"/>
+                <a:ea typeface="Calibri"/>
+                <a:cs typeface="Calibri"/>
+                <a:sym typeface="Calibri"/>
+              </a:defRPr>
+            </a:lvl8pPr>
+            <a:lvl9pPr indent="0" lvl="8" marL="0" marR="0" rtl="0" algn="r">
+              <a:lnSpc>
+                <a:spcPct val="100000"/>
+              </a:lnSpc>
+              <a:spcBef>
+                <a:spcPts val="0"/>
+              </a:spcBef>
+              <a:spcAft>
+                <a:spcPts val="0"/>
+              </a:spcAft>
+              <a:buClr>
+                <a:srgbClr val="898989"/>
+              </a:buClr>
+              <a:buSzPts val="1200"/>
+              <a:buFont typeface="Calibri"/>
+              <a:buNone/>
+              <a:defRPr b="0" i="0" sz="1200" u="none" cap="none" strike="noStrike">
+                <a:solidFill>
+                  <a:srgbClr val="898989"/>
+                </a:solidFill>
+                <a:latin typeface="Calibri"/>
+                <a:ea typeface="Calibri"/>
+                <a:cs typeface="Calibri"/>
+                <a:sym typeface="Calibri"/>
+              </a:defRPr>
+            </a:lvl9pPr>
+          </a:lstStyle>
+          <a:p>
+            <a:pPr indent="0" lvl="0" marL="0">
+              <a:spcBef>
+                <a:spcPts val="0"/>
+              </a:spcBef>
+              <a:spcAft>
+                <a:spcPts val="0"/>
+              </a:spcAft>
+              <a:buNone/>
             </a:pPr>
             <a:fld id="{00000000-1234-1234-1234-123412341234}" type="slidenum">
-              <a:rPr b="0" i="0" lang="en-US" sz="1200" u="none" cap="none" strike="noStrike">
-                <a:solidFill>
-                  <a:srgbClr val="898989"/>
-                </a:solidFill>
-                <a:latin typeface="Calibri"/>
-                <a:ea typeface="Calibri"/>
-                <a:cs typeface="Calibri"/>
-                <a:sym typeface="Calibri"/>
-              </a:rPr>
+              <a:rPr lang="en-US"/>
               <a:t>‹#›</a:t>
             </a:fld>
-            <a:endParaRPr b="0" i="0" sz="1400" u="none" cap="none" strike="noStrike">
+            <a:endParaRPr sz="1400">
               <a:solidFill>
                 <a:srgbClr val="000000"/>
               </a:solidFill>
@@ -6268,8 +7400,8 @@
 </file>
 
 <file path=ppt/slideLayouts/slideLayout3.xml><?xml version="1.0" encoding="utf-8"?>
-<p:sldLayout xmlns:a="http://schemas.openxmlformats.org/drawingml/2006/main" xmlns:r="http://schemas.openxmlformats.org/officeDocument/2006/relationships" xmlns:mc="http://schemas.openxmlformats.org/markup-compatibility/2006" xmlns:mv="urn:schemas-microsoft-com:mac:vml" xmlns:p="http://schemas.openxmlformats.org/presentationml/2006/main" xmlns:c="http://schemas.openxmlformats.org/drawingml/2006/chart" xmlns:dgm="http://schemas.openxmlformats.org/drawingml/2006/diagram" xmlns:o="urn:schemas-microsoft-com:office:office" xmlns:v="urn:schemas-microsoft-com:vml" xmlns:pvml="urn:schemas-microsoft-com:office:powerpoint" xmlns:com="http://schemas.openxmlformats.org/drawingml/2006/compatibility" xmlns:p14="http://schemas.microsoft.com/office/powerpoint/2010/main" xmlns:p15="http://schemas.microsoft.com/office/powerpoint/2012/main" type="vertTx">
-  <p:cSld name="Title and Vertical Text">
+<p:sldLayout xmlns:a="http://schemas.openxmlformats.org/drawingml/2006/main" xmlns:r="http://schemas.openxmlformats.org/officeDocument/2006/relationships" xmlns:mc="http://schemas.openxmlformats.org/markup-compatibility/2006" xmlns:mv="urn:schemas-microsoft-com:mac:vml" xmlns:p="http://schemas.openxmlformats.org/presentationml/2006/main" xmlns:c="http://schemas.openxmlformats.org/drawingml/2006/chart" xmlns:dgm="http://schemas.openxmlformats.org/drawingml/2006/diagram" xmlns:o="urn:schemas-microsoft-com:office:office" xmlns:v="urn:schemas-microsoft-com:vml" xmlns:pvml="urn:schemas-microsoft-com:office:powerpoint" xmlns:com="http://schemas.openxmlformats.org/drawingml/2006/compatibility" xmlns:p14="http://schemas.microsoft.com/office/powerpoint/2010/main" xmlns:p15="http://schemas.microsoft.com/office/powerpoint/2012/main" matchingName="Title and Vertical Text" type="vertTx">
+  <p:cSld name="VERTICAL_TEXT">
     <p:spTree>
       <p:nvGrpSpPr>
         <p:cNvPr id="23" name="Shape 23"/>
@@ -7333,9 +8465,8 @@
           <a:bodyPr anchorCtr="0" anchor="ctr" bIns="45675" lIns="91375" spcFirstLastPara="1" rIns="91375" wrap="square" tIns="45675">
             <a:noAutofit/>
           </a:bodyPr>
-          <a:lstStyle/>
-          <a:p>
-            <a:pPr indent="0" lvl="0" marL="0" marR="0" rtl="0" algn="r">
+          <a:lstStyle>
+            <a:lvl1pPr indent="0" lvl="0" marL="0" marR="0" rtl="0" algn="r">
               <a:lnSpc>
                 <a:spcPct val="100000"/>
               </a:lnSpc>
@@ -7351,20 +8482,240 @@
               <a:buSzPts val="1200"/>
               <a:buFont typeface="Calibri"/>
               <a:buNone/>
+              <a:defRPr b="0" i="0" sz="1200" u="none" cap="none" strike="noStrike">
+                <a:solidFill>
+                  <a:srgbClr val="898989"/>
+                </a:solidFill>
+                <a:latin typeface="Calibri"/>
+                <a:ea typeface="Calibri"/>
+                <a:cs typeface="Calibri"/>
+                <a:sym typeface="Calibri"/>
+              </a:defRPr>
+            </a:lvl1pPr>
+            <a:lvl2pPr indent="0" lvl="1" marL="0" marR="0" rtl="0" algn="r">
+              <a:lnSpc>
+                <a:spcPct val="100000"/>
+              </a:lnSpc>
+              <a:spcBef>
+                <a:spcPts val="0"/>
+              </a:spcBef>
+              <a:spcAft>
+                <a:spcPts val="0"/>
+              </a:spcAft>
+              <a:buClr>
+                <a:srgbClr val="898989"/>
+              </a:buClr>
+              <a:buSzPts val="1200"/>
+              <a:buFont typeface="Calibri"/>
+              <a:buNone/>
+              <a:defRPr b="0" i="0" sz="1200" u="none" cap="none" strike="noStrike">
+                <a:solidFill>
+                  <a:srgbClr val="898989"/>
+                </a:solidFill>
+                <a:latin typeface="Calibri"/>
+                <a:ea typeface="Calibri"/>
+                <a:cs typeface="Calibri"/>
+                <a:sym typeface="Calibri"/>
+              </a:defRPr>
+            </a:lvl2pPr>
+            <a:lvl3pPr indent="0" lvl="2" marL="0" marR="0" rtl="0" algn="r">
+              <a:lnSpc>
+                <a:spcPct val="100000"/>
+              </a:lnSpc>
+              <a:spcBef>
+                <a:spcPts val="0"/>
+              </a:spcBef>
+              <a:spcAft>
+                <a:spcPts val="0"/>
+              </a:spcAft>
+              <a:buClr>
+                <a:srgbClr val="898989"/>
+              </a:buClr>
+              <a:buSzPts val="1200"/>
+              <a:buFont typeface="Calibri"/>
+              <a:buNone/>
+              <a:defRPr b="0" i="0" sz="1200" u="none" cap="none" strike="noStrike">
+                <a:solidFill>
+                  <a:srgbClr val="898989"/>
+                </a:solidFill>
+                <a:latin typeface="Calibri"/>
+                <a:ea typeface="Calibri"/>
+                <a:cs typeface="Calibri"/>
+                <a:sym typeface="Calibri"/>
+              </a:defRPr>
+            </a:lvl3pPr>
+            <a:lvl4pPr indent="0" lvl="3" marL="0" marR="0" rtl="0" algn="r">
+              <a:lnSpc>
+                <a:spcPct val="100000"/>
+              </a:lnSpc>
+              <a:spcBef>
+                <a:spcPts val="0"/>
+              </a:spcBef>
+              <a:spcAft>
+                <a:spcPts val="0"/>
+              </a:spcAft>
+              <a:buClr>
+                <a:srgbClr val="898989"/>
+              </a:buClr>
+              <a:buSzPts val="1200"/>
+              <a:buFont typeface="Calibri"/>
+              <a:buNone/>
+              <a:defRPr b="0" i="0" sz="1200" u="none" cap="none" strike="noStrike">
+                <a:solidFill>
+                  <a:srgbClr val="898989"/>
+                </a:solidFill>
+                <a:latin typeface="Calibri"/>
+                <a:ea typeface="Calibri"/>
+                <a:cs typeface="Calibri"/>
+                <a:sym typeface="Calibri"/>
+              </a:defRPr>
+            </a:lvl4pPr>
+            <a:lvl5pPr indent="0" lvl="4" marL="0" marR="0" rtl="0" algn="r">
+              <a:lnSpc>
+                <a:spcPct val="100000"/>
+              </a:lnSpc>
+              <a:spcBef>
+                <a:spcPts val="0"/>
+              </a:spcBef>
+              <a:spcAft>
+                <a:spcPts val="0"/>
+              </a:spcAft>
+              <a:buClr>
+                <a:srgbClr val="898989"/>
+              </a:buClr>
+              <a:buSzPts val="1200"/>
+              <a:buFont typeface="Calibri"/>
+              <a:buNone/>
+              <a:defRPr b="0" i="0" sz="1200" u="none" cap="none" strike="noStrike">
+                <a:solidFill>
+                  <a:srgbClr val="898989"/>
+                </a:solidFill>
+                <a:latin typeface="Calibri"/>
+                <a:ea typeface="Calibri"/>
+                <a:cs typeface="Calibri"/>
+                <a:sym typeface="Calibri"/>
+              </a:defRPr>
+            </a:lvl5pPr>
+            <a:lvl6pPr indent="0" lvl="5" marL="0" marR="0" rtl="0" algn="r">
+              <a:lnSpc>
+                <a:spcPct val="100000"/>
+              </a:lnSpc>
+              <a:spcBef>
+                <a:spcPts val="0"/>
+              </a:spcBef>
+              <a:spcAft>
+                <a:spcPts val="0"/>
+              </a:spcAft>
+              <a:buClr>
+                <a:srgbClr val="898989"/>
+              </a:buClr>
+              <a:buSzPts val="1200"/>
+              <a:buFont typeface="Calibri"/>
+              <a:buNone/>
+              <a:defRPr b="0" i="0" sz="1200" u="none" cap="none" strike="noStrike">
+                <a:solidFill>
+                  <a:srgbClr val="898989"/>
+                </a:solidFill>
+                <a:latin typeface="Calibri"/>
+                <a:ea typeface="Calibri"/>
+                <a:cs typeface="Calibri"/>
+                <a:sym typeface="Calibri"/>
+              </a:defRPr>
+            </a:lvl6pPr>
+            <a:lvl7pPr indent="0" lvl="6" marL="0" marR="0" rtl="0" algn="r">
+              <a:lnSpc>
+                <a:spcPct val="100000"/>
+              </a:lnSpc>
+              <a:spcBef>
+                <a:spcPts val="0"/>
+              </a:spcBef>
+              <a:spcAft>
+                <a:spcPts val="0"/>
+              </a:spcAft>
+              <a:buClr>
+                <a:srgbClr val="898989"/>
+              </a:buClr>
+              <a:buSzPts val="1200"/>
+              <a:buFont typeface="Calibri"/>
+              <a:buNone/>
+              <a:defRPr b="0" i="0" sz="1200" u="none" cap="none" strike="noStrike">
+                <a:solidFill>
+                  <a:srgbClr val="898989"/>
+                </a:solidFill>
+                <a:latin typeface="Calibri"/>
+                <a:ea typeface="Calibri"/>
+                <a:cs typeface="Calibri"/>
+                <a:sym typeface="Calibri"/>
+              </a:defRPr>
+            </a:lvl7pPr>
+            <a:lvl8pPr indent="0" lvl="7" marL="0" marR="0" rtl="0" algn="r">
+              <a:lnSpc>
+                <a:spcPct val="100000"/>
+              </a:lnSpc>
+              <a:spcBef>
+                <a:spcPts val="0"/>
+              </a:spcBef>
+              <a:spcAft>
+                <a:spcPts val="0"/>
+              </a:spcAft>
+              <a:buClr>
+                <a:srgbClr val="898989"/>
+              </a:buClr>
+              <a:buSzPts val="1200"/>
+              <a:buFont typeface="Calibri"/>
+              <a:buNone/>
+              <a:defRPr b="0" i="0" sz="1200" u="none" cap="none" strike="noStrike">
+                <a:solidFill>
+                  <a:srgbClr val="898989"/>
+                </a:solidFill>
+                <a:latin typeface="Calibri"/>
+                <a:ea typeface="Calibri"/>
+                <a:cs typeface="Calibri"/>
+                <a:sym typeface="Calibri"/>
+              </a:defRPr>
+            </a:lvl8pPr>
+            <a:lvl9pPr indent="0" lvl="8" marL="0" marR="0" rtl="0" algn="r">
+              <a:lnSpc>
+                <a:spcPct val="100000"/>
+              </a:lnSpc>
+              <a:spcBef>
+                <a:spcPts val="0"/>
+              </a:spcBef>
+              <a:spcAft>
+                <a:spcPts val="0"/>
+              </a:spcAft>
+              <a:buClr>
+                <a:srgbClr val="898989"/>
+              </a:buClr>
+              <a:buSzPts val="1200"/>
+              <a:buFont typeface="Calibri"/>
+              <a:buNone/>
+              <a:defRPr b="0" i="0" sz="1200" u="none" cap="none" strike="noStrike">
+                <a:solidFill>
+                  <a:srgbClr val="898989"/>
+                </a:solidFill>
+                <a:latin typeface="Calibri"/>
+                <a:ea typeface="Calibri"/>
+                <a:cs typeface="Calibri"/>
+                <a:sym typeface="Calibri"/>
+              </a:defRPr>
+            </a:lvl9pPr>
+          </a:lstStyle>
+          <a:p>
+            <a:pPr indent="0" lvl="0" marL="0">
+              <a:spcBef>
+                <a:spcPts val="0"/>
+              </a:spcBef>
+              <a:spcAft>
+                <a:spcPts val="0"/>
+              </a:spcAft>
+              <a:buNone/>
             </a:pPr>
             <a:fld id="{00000000-1234-1234-1234-123412341234}" type="slidenum">
-              <a:rPr b="0" i="0" lang="en-US" sz="1200" u="none" cap="none" strike="noStrike">
-                <a:solidFill>
-                  <a:srgbClr val="898989"/>
-                </a:solidFill>
-                <a:latin typeface="Calibri"/>
-                <a:ea typeface="Calibri"/>
-                <a:cs typeface="Calibri"/>
-                <a:sym typeface="Calibri"/>
-              </a:rPr>
+              <a:rPr lang="en-US"/>
               <a:t>‹#›</a:t>
             </a:fld>
-            <a:endParaRPr b="0" i="0" sz="1400" u="none" cap="none" strike="noStrike">
+            <a:endParaRPr sz="1400">
               <a:solidFill>
                 <a:srgbClr val="000000"/>
               </a:solidFill>
@@ -7385,8 +8736,8 @@
 </file>
 
 <file path=ppt/slideLayouts/slideLayout4.xml><?xml version="1.0" encoding="utf-8"?>
-<p:sldLayout xmlns:a="http://schemas.openxmlformats.org/drawingml/2006/main" xmlns:r="http://schemas.openxmlformats.org/officeDocument/2006/relationships" xmlns:mc="http://schemas.openxmlformats.org/markup-compatibility/2006" xmlns:mv="urn:schemas-microsoft-com:mac:vml" xmlns:p="http://schemas.openxmlformats.org/presentationml/2006/main" xmlns:c="http://schemas.openxmlformats.org/drawingml/2006/chart" xmlns:dgm="http://schemas.openxmlformats.org/drawingml/2006/diagram" xmlns:o="urn:schemas-microsoft-com:office:office" xmlns:v="urn:schemas-microsoft-com:vml" xmlns:pvml="urn:schemas-microsoft-com:office:powerpoint" xmlns:com="http://schemas.openxmlformats.org/drawingml/2006/compatibility" xmlns:p14="http://schemas.microsoft.com/office/powerpoint/2010/main" xmlns:p15="http://schemas.microsoft.com/office/powerpoint/2012/main" type="picTx">
-  <p:cSld name="Picture with Caption">
+<p:sldLayout xmlns:a="http://schemas.openxmlformats.org/drawingml/2006/main" xmlns:r="http://schemas.openxmlformats.org/officeDocument/2006/relationships" xmlns:mc="http://schemas.openxmlformats.org/markup-compatibility/2006" xmlns:mv="urn:schemas-microsoft-com:mac:vml" xmlns:p="http://schemas.openxmlformats.org/presentationml/2006/main" xmlns:c="http://schemas.openxmlformats.org/drawingml/2006/chart" xmlns:dgm="http://schemas.openxmlformats.org/drawingml/2006/diagram" xmlns:o="urn:schemas-microsoft-com:office:office" xmlns:v="urn:schemas-microsoft-com:vml" xmlns:pvml="urn:schemas-microsoft-com:office:powerpoint" xmlns:com="http://schemas.openxmlformats.org/drawingml/2006/compatibility" xmlns:p14="http://schemas.microsoft.com/office/powerpoint/2010/main" xmlns:p15="http://schemas.microsoft.com/office/powerpoint/2012/main" matchingName="Picture with Caption" type="picTx">
+  <p:cSld name="PICTURE_WITH_CAPTION_TEXT">
     <p:spTree>
       <p:nvGrpSpPr>
         <p:cNvPr id="29" name="Shape 29"/>
@@ -8712,9 +10063,8 @@
           <a:bodyPr anchorCtr="0" anchor="ctr" bIns="45675" lIns="91375" spcFirstLastPara="1" rIns="91375" wrap="square" tIns="45675">
             <a:noAutofit/>
           </a:bodyPr>
-          <a:lstStyle/>
-          <a:p>
-            <a:pPr indent="0" lvl="0" marL="0" marR="0" rtl="0" algn="r">
+          <a:lstStyle>
+            <a:lvl1pPr indent="0" lvl="0" marL="0" marR="0" rtl="0" algn="r">
               <a:lnSpc>
                 <a:spcPct val="100000"/>
               </a:lnSpc>
@@ -8730,20 +10080,240 @@
               <a:buSzPts val="1200"/>
               <a:buFont typeface="Calibri"/>
               <a:buNone/>
+              <a:defRPr b="0" i="0" sz="1200" u="none" cap="none" strike="noStrike">
+                <a:solidFill>
+                  <a:srgbClr val="898989"/>
+                </a:solidFill>
+                <a:latin typeface="Calibri"/>
+                <a:ea typeface="Calibri"/>
+                <a:cs typeface="Calibri"/>
+                <a:sym typeface="Calibri"/>
+              </a:defRPr>
+            </a:lvl1pPr>
+            <a:lvl2pPr indent="0" lvl="1" marL="0" marR="0" rtl="0" algn="r">
+              <a:lnSpc>
+                <a:spcPct val="100000"/>
+              </a:lnSpc>
+              <a:spcBef>
+                <a:spcPts val="0"/>
+              </a:spcBef>
+              <a:spcAft>
+                <a:spcPts val="0"/>
+              </a:spcAft>
+              <a:buClr>
+                <a:srgbClr val="898989"/>
+              </a:buClr>
+              <a:buSzPts val="1200"/>
+              <a:buFont typeface="Calibri"/>
+              <a:buNone/>
+              <a:defRPr b="0" i="0" sz="1200" u="none" cap="none" strike="noStrike">
+                <a:solidFill>
+                  <a:srgbClr val="898989"/>
+                </a:solidFill>
+                <a:latin typeface="Calibri"/>
+                <a:ea typeface="Calibri"/>
+                <a:cs typeface="Calibri"/>
+                <a:sym typeface="Calibri"/>
+              </a:defRPr>
+            </a:lvl2pPr>
+            <a:lvl3pPr indent="0" lvl="2" marL="0" marR="0" rtl="0" algn="r">
+              <a:lnSpc>
+                <a:spcPct val="100000"/>
+              </a:lnSpc>
+              <a:spcBef>
+                <a:spcPts val="0"/>
+              </a:spcBef>
+              <a:spcAft>
+                <a:spcPts val="0"/>
+              </a:spcAft>
+              <a:buClr>
+                <a:srgbClr val="898989"/>
+              </a:buClr>
+              <a:buSzPts val="1200"/>
+              <a:buFont typeface="Calibri"/>
+              <a:buNone/>
+              <a:defRPr b="0" i="0" sz="1200" u="none" cap="none" strike="noStrike">
+                <a:solidFill>
+                  <a:srgbClr val="898989"/>
+                </a:solidFill>
+                <a:latin typeface="Calibri"/>
+                <a:ea typeface="Calibri"/>
+                <a:cs typeface="Calibri"/>
+                <a:sym typeface="Calibri"/>
+              </a:defRPr>
+            </a:lvl3pPr>
+            <a:lvl4pPr indent="0" lvl="3" marL="0" marR="0" rtl="0" algn="r">
+              <a:lnSpc>
+                <a:spcPct val="100000"/>
+              </a:lnSpc>
+              <a:spcBef>
+                <a:spcPts val="0"/>
+              </a:spcBef>
+              <a:spcAft>
+                <a:spcPts val="0"/>
+              </a:spcAft>
+              <a:buClr>
+                <a:srgbClr val="898989"/>
+              </a:buClr>
+              <a:buSzPts val="1200"/>
+              <a:buFont typeface="Calibri"/>
+              <a:buNone/>
+              <a:defRPr b="0" i="0" sz="1200" u="none" cap="none" strike="noStrike">
+                <a:solidFill>
+                  <a:srgbClr val="898989"/>
+                </a:solidFill>
+                <a:latin typeface="Calibri"/>
+                <a:ea typeface="Calibri"/>
+                <a:cs typeface="Calibri"/>
+                <a:sym typeface="Calibri"/>
+              </a:defRPr>
+            </a:lvl4pPr>
+            <a:lvl5pPr indent="0" lvl="4" marL="0" marR="0" rtl="0" algn="r">
+              <a:lnSpc>
+                <a:spcPct val="100000"/>
+              </a:lnSpc>
+              <a:spcBef>
+                <a:spcPts val="0"/>
+              </a:spcBef>
+              <a:spcAft>
+                <a:spcPts val="0"/>
+              </a:spcAft>
+              <a:buClr>
+                <a:srgbClr val="898989"/>
+              </a:buClr>
+              <a:buSzPts val="1200"/>
+              <a:buFont typeface="Calibri"/>
+              <a:buNone/>
+              <a:defRPr b="0" i="0" sz="1200" u="none" cap="none" strike="noStrike">
+                <a:solidFill>
+                  <a:srgbClr val="898989"/>
+                </a:solidFill>
+                <a:latin typeface="Calibri"/>
+                <a:ea typeface="Calibri"/>
+                <a:cs typeface="Calibri"/>
+                <a:sym typeface="Calibri"/>
+              </a:defRPr>
+            </a:lvl5pPr>
+            <a:lvl6pPr indent="0" lvl="5" marL="0" marR="0" rtl="0" algn="r">
+              <a:lnSpc>
+                <a:spcPct val="100000"/>
+              </a:lnSpc>
+              <a:spcBef>
+                <a:spcPts val="0"/>
+              </a:spcBef>
+              <a:spcAft>
+                <a:spcPts val="0"/>
+              </a:spcAft>
+              <a:buClr>
+                <a:srgbClr val="898989"/>
+              </a:buClr>
+              <a:buSzPts val="1200"/>
+              <a:buFont typeface="Calibri"/>
+              <a:buNone/>
+              <a:defRPr b="0" i="0" sz="1200" u="none" cap="none" strike="noStrike">
+                <a:solidFill>
+                  <a:srgbClr val="898989"/>
+                </a:solidFill>
+                <a:latin typeface="Calibri"/>
+                <a:ea typeface="Calibri"/>
+                <a:cs typeface="Calibri"/>
+                <a:sym typeface="Calibri"/>
+              </a:defRPr>
+            </a:lvl6pPr>
+            <a:lvl7pPr indent="0" lvl="6" marL="0" marR="0" rtl="0" algn="r">
+              <a:lnSpc>
+                <a:spcPct val="100000"/>
+              </a:lnSpc>
+              <a:spcBef>
+                <a:spcPts val="0"/>
+              </a:spcBef>
+              <a:spcAft>
+                <a:spcPts val="0"/>
+              </a:spcAft>
+              <a:buClr>
+                <a:srgbClr val="898989"/>
+              </a:buClr>
+              <a:buSzPts val="1200"/>
+              <a:buFont typeface="Calibri"/>
+              <a:buNone/>
+              <a:defRPr b="0" i="0" sz="1200" u="none" cap="none" strike="noStrike">
+                <a:solidFill>
+                  <a:srgbClr val="898989"/>
+                </a:solidFill>
+                <a:latin typeface="Calibri"/>
+                <a:ea typeface="Calibri"/>
+                <a:cs typeface="Calibri"/>
+                <a:sym typeface="Calibri"/>
+              </a:defRPr>
+            </a:lvl7pPr>
+            <a:lvl8pPr indent="0" lvl="7" marL="0" marR="0" rtl="0" algn="r">
+              <a:lnSpc>
+                <a:spcPct val="100000"/>
+              </a:lnSpc>
+              <a:spcBef>
+                <a:spcPts val="0"/>
+              </a:spcBef>
+              <a:spcAft>
+                <a:spcPts val="0"/>
+              </a:spcAft>
+              <a:buClr>
+                <a:srgbClr val="898989"/>
+              </a:buClr>
+              <a:buSzPts val="1200"/>
+              <a:buFont typeface="Calibri"/>
+              <a:buNone/>
+              <a:defRPr b="0" i="0" sz="1200" u="none" cap="none" strike="noStrike">
+                <a:solidFill>
+                  <a:srgbClr val="898989"/>
+                </a:solidFill>
+                <a:latin typeface="Calibri"/>
+                <a:ea typeface="Calibri"/>
+                <a:cs typeface="Calibri"/>
+                <a:sym typeface="Calibri"/>
+              </a:defRPr>
+            </a:lvl8pPr>
+            <a:lvl9pPr indent="0" lvl="8" marL="0" marR="0" rtl="0" algn="r">
+              <a:lnSpc>
+                <a:spcPct val="100000"/>
+              </a:lnSpc>
+              <a:spcBef>
+                <a:spcPts val="0"/>
+              </a:spcBef>
+              <a:spcAft>
+                <a:spcPts val="0"/>
+              </a:spcAft>
+              <a:buClr>
+                <a:srgbClr val="898989"/>
+              </a:buClr>
+              <a:buSzPts val="1200"/>
+              <a:buFont typeface="Calibri"/>
+              <a:buNone/>
+              <a:defRPr b="0" i="0" sz="1200" u="none" cap="none" strike="noStrike">
+                <a:solidFill>
+                  <a:srgbClr val="898989"/>
+                </a:solidFill>
+                <a:latin typeface="Calibri"/>
+                <a:ea typeface="Calibri"/>
+                <a:cs typeface="Calibri"/>
+                <a:sym typeface="Calibri"/>
+              </a:defRPr>
+            </a:lvl9pPr>
+          </a:lstStyle>
+          <a:p>
+            <a:pPr indent="0" lvl="0" marL="0">
+              <a:spcBef>
+                <a:spcPts val="0"/>
+              </a:spcBef>
+              <a:spcAft>
+                <a:spcPts val="0"/>
+              </a:spcAft>
+              <a:buNone/>
             </a:pPr>
             <a:fld id="{00000000-1234-1234-1234-123412341234}" type="slidenum">
-              <a:rPr b="0" i="0" lang="en-US" sz="1200" u="none" cap="none" strike="noStrike">
-                <a:solidFill>
-                  <a:srgbClr val="898989"/>
-                </a:solidFill>
-                <a:latin typeface="Calibri"/>
-                <a:ea typeface="Calibri"/>
-                <a:cs typeface="Calibri"/>
-                <a:sym typeface="Calibri"/>
-              </a:rPr>
+              <a:rPr lang="en-US"/>
               <a:t>‹#›</a:t>
             </a:fld>
-            <a:endParaRPr b="0" i="0" sz="1400" u="none" cap="none" strike="noStrike">
+            <a:endParaRPr sz="1400">
               <a:solidFill>
                 <a:srgbClr val="000000"/>
               </a:solidFill>
@@ -8764,8 +10334,8 @@
 </file>
 
 <file path=ppt/slideLayouts/slideLayout5.xml><?xml version="1.0" encoding="utf-8"?>
-<p:sldLayout xmlns:a="http://schemas.openxmlformats.org/drawingml/2006/main" xmlns:r="http://schemas.openxmlformats.org/officeDocument/2006/relationships" xmlns:mc="http://schemas.openxmlformats.org/markup-compatibility/2006" xmlns:mv="urn:schemas-microsoft-com:mac:vml" xmlns:p="http://schemas.openxmlformats.org/presentationml/2006/main" xmlns:c="http://schemas.openxmlformats.org/drawingml/2006/chart" xmlns:dgm="http://schemas.openxmlformats.org/drawingml/2006/diagram" xmlns:o="urn:schemas-microsoft-com:office:office" xmlns:v="urn:schemas-microsoft-com:vml" xmlns:pvml="urn:schemas-microsoft-com:office:powerpoint" xmlns:com="http://schemas.openxmlformats.org/drawingml/2006/compatibility" xmlns:p14="http://schemas.microsoft.com/office/powerpoint/2010/main" xmlns:p15="http://schemas.microsoft.com/office/powerpoint/2012/main" type="objTx">
-  <p:cSld name="Content with Caption">
+<p:sldLayout xmlns:a="http://schemas.openxmlformats.org/drawingml/2006/main" xmlns:r="http://schemas.openxmlformats.org/officeDocument/2006/relationships" xmlns:mc="http://schemas.openxmlformats.org/markup-compatibility/2006" xmlns:mv="urn:schemas-microsoft-com:mac:vml" xmlns:p="http://schemas.openxmlformats.org/presentationml/2006/main" xmlns:c="http://schemas.openxmlformats.org/drawingml/2006/chart" xmlns:dgm="http://schemas.openxmlformats.org/drawingml/2006/diagram" xmlns:o="urn:schemas-microsoft-com:office:office" xmlns:v="urn:schemas-microsoft-com:vml" xmlns:pvml="urn:schemas-microsoft-com:office:powerpoint" xmlns:com="http://schemas.openxmlformats.org/drawingml/2006/compatibility" xmlns:p14="http://schemas.microsoft.com/office/powerpoint/2010/main" xmlns:p15="http://schemas.microsoft.com/office/powerpoint/2012/main" matchingName="Content with Caption" type="objTx">
+  <p:cSld name="OBJECT_WITH_CAPTION_TEXT">
     <p:spTree>
       <p:nvGrpSpPr>
         <p:cNvPr id="36" name="Shape 36"/>
@@ -10091,9 +11661,8 @@
           <a:bodyPr anchorCtr="0" anchor="ctr" bIns="45675" lIns="91375" spcFirstLastPara="1" rIns="91375" wrap="square" tIns="45675">
             <a:noAutofit/>
           </a:bodyPr>
-          <a:lstStyle/>
-          <a:p>
-            <a:pPr indent="0" lvl="0" marL="0" marR="0" rtl="0" algn="r">
+          <a:lstStyle>
+            <a:lvl1pPr indent="0" lvl="0" marL="0" marR="0" rtl="0" algn="r">
               <a:lnSpc>
                 <a:spcPct val="100000"/>
               </a:lnSpc>
@@ -10109,20 +11678,240 @@
               <a:buSzPts val="1200"/>
               <a:buFont typeface="Calibri"/>
               <a:buNone/>
+              <a:defRPr b="0" i="0" sz="1200" u="none" cap="none" strike="noStrike">
+                <a:solidFill>
+                  <a:srgbClr val="898989"/>
+                </a:solidFill>
+                <a:latin typeface="Calibri"/>
+                <a:ea typeface="Calibri"/>
+                <a:cs typeface="Calibri"/>
+                <a:sym typeface="Calibri"/>
+              </a:defRPr>
+            </a:lvl1pPr>
+            <a:lvl2pPr indent="0" lvl="1" marL="0" marR="0" rtl="0" algn="r">
+              <a:lnSpc>
+                <a:spcPct val="100000"/>
+              </a:lnSpc>
+              <a:spcBef>
+                <a:spcPts val="0"/>
+              </a:spcBef>
+              <a:spcAft>
+                <a:spcPts val="0"/>
+              </a:spcAft>
+              <a:buClr>
+                <a:srgbClr val="898989"/>
+              </a:buClr>
+              <a:buSzPts val="1200"/>
+              <a:buFont typeface="Calibri"/>
+              <a:buNone/>
+              <a:defRPr b="0" i="0" sz="1200" u="none" cap="none" strike="noStrike">
+                <a:solidFill>
+                  <a:srgbClr val="898989"/>
+                </a:solidFill>
+                <a:latin typeface="Calibri"/>
+                <a:ea typeface="Calibri"/>
+                <a:cs typeface="Calibri"/>
+                <a:sym typeface="Calibri"/>
+              </a:defRPr>
+            </a:lvl2pPr>
+            <a:lvl3pPr indent="0" lvl="2" marL="0" marR="0" rtl="0" algn="r">
+              <a:lnSpc>
+                <a:spcPct val="100000"/>
+              </a:lnSpc>
+              <a:spcBef>
+                <a:spcPts val="0"/>
+              </a:spcBef>
+              <a:spcAft>
+                <a:spcPts val="0"/>
+              </a:spcAft>
+              <a:buClr>
+                <a:srgbClr val="898989"/>
+              </a:buClr>
+              <a:buSzPts val="1200"/>
+              <a:buFont typeface="Calibri"/>
+              <a:buNone/>
+              <a:defRPr b="0" i="0" sz="1200" u="none" cap="none" strike="noStrike">
+                <a:solidFill>
+                  <a:srgbClr val="898989"/>
+                </a:solidFill>
+                <a:latin typeface="Calibri"/>
+                <a:ea typeface="Calibri"/>
+                <a:cs typeface="Calibri"/>
+                <a:sym typeface="Calibri"/>
+              </a:defRPr>
+            </a:lvl3pPr>
+            <a:lvl4pPr indent="0" lvl="3" marL="0" marR="0" rtl="0" algn="r">
+              <a:lnSpc>
+                <a:spcPct val="100000"/>
+              </a:lnSpc>
+              <a:spcBef>
+                <a:spcPts val="0"/>
+              </a:spcBef>
+              <a:spcAft>
+                <a:spcPts val="0"/>
+              </a:spcAft>
+              <a:buClr>
+                <a:srgbClr val="898989"/>
+              </a:buClr>
+              <a:buSzPts val="1200"/>
+              <a:buFont typeface="Calibri"/>
+              <a:buNone/>
+              <a:defRPr b="0" i="0" sz="1200" u="none" cap="none" strike="noStrike">
+                <a:solidFill>
+                  <a:srgbClr val="898989"/>
+                </a:solidFill>
+                <a:latin typeface="Calibri"/>
+                <a:ea typeface="Calibri"/>
+                <a:cs typeface="Calibri"/>
+                <a:sym typeface="Calibri"/>
+              </a:defRPr>
+            </a:lvl4pPr>
+            <a:lvl5pPr indent="0" lvl="4" marL="0" marR="0" rtl="0" algn="r">
+              <a:lnSpc>
+                <a:spcPct val="100000"/>
+              </a:lnSpc>
+              <a:spcBef>
+                <a:spcPts val="0"/>
+              </a:spcBef>
+              <a:spcAft>
+                <a:spcPts val="0"/>
+              </a:spcAft>
+              <a:buClr>
+                <a:srgbClr val="898989"/>
+              </a:buClr>
+              <a:buSzPts val="1200"/>
+              <a:buFont typeface="Calibri"/>
+              <a:buNone/>
+              <a:defRPr b="0" i="0" sz="1200" u="none" cap="none" strike="noStrike">
+                <a:solidFill>
+                  <a:srgbClr val="898989"/>
+                </a:solidFill>
+                <a:latin typeface="Calibri"/>
+                <a:ea typeface="Calibri"/>
+                <a:cs typeface="Calibri"/>
+                <a:sym typeface="Calibri"/>
+              </a:defRPr>
+            </a:lvl5pPr>
+            <a:lvl6pPr indent="0" lvl="5" marL="0" marR="0" rtl="0" algn="r">
+              <a:lnSpc>
+                <a:spcPct val="100000"/>
+              </a:lnSpc>
+              <a:spcBef>
+                <a:spcPts val="0"/>
+              </a:spcBef>
+              <a:spcAft>
+                <a:spcPts val="0"/>
+              </a:spcAft>
+              <a:buClr>
+                <a:srgbClr val="898989"/>
+              </a:buClr>
+              <a:buSzPts val="1200"/>
+              <a:buFont typeface="Calibri"/>
+              <a:buNone/>
+              <a:defRPr b="0" i="0" sz="1200" u="none" cap="none" strike="noStrike">
+                <a:solidFill>
+                  <a:srgbClr val="898989"/>
+                </a:solidFill>
+                <a:latin typeface="Calibri"/>
+                <a:ea typeface="Calibri"/>
+                <a:cs typeface="Calibri"/>
+                <a:sym typeface="Calibri"/>
+              </a:defRPr>
+            </a:lvl6pPr>
+            <a:lvl7pPr indent="0" lvl="6" marL="0" marR="0" rtl="0" algn="r">
+              <a:lnSpc>
+                <a:spcPct val="100000"/>
+              </a:lnSpc>
+              <a:spcBef>
+                <a:spcPts val="0"/>
+              </a:spcBef>
+              <a:spcAft>
+                <a:spcPts val="0"/>
+              </a:spcAft>
+              <a:buClr>
+                <a:srgbClr val="898989"/>
+              </a:buClr>
+              <a:buSzPts val="1200"/>
+              <a:buFont typeface="Calibri"/>
+              <a:buNone/>
+              <a:defRPr b="0" i="0" sz="1200" u="none" cap="none" strike="noStrike">
+                <a:solidFill>
+                  <a:srgbClr val="898989"/>
+                </a:solidFill>
+                <a:latin typeface="Calibri"/>
+                <a:ea typeface="Calibri"/>
+                <a:cs typeface="Calibri"/>
+                <a:sym typeface="Calibri"/>
+              </a:defRPr>
+            </a:lvl7pPr>
+            <a:lvl8pPr indent="0" lvl="7" marL="0" marR="0" rtl="0" algn="r">
+              <a:lnSpc>
+                <a:spcPct val="100000"/>
+              </a:lnSpc>
+              <a:spcBef>
+                <a:spcPts val="0"/>
+              </a:spcBef>
+              <a:spcAft>
+                <a:spcPts val="0"/>
+              </a:spcAft>
+              <a:buClr>
+                <a:srgbClr val="898989"/>
+              </a:buClr>
+              <a:buSzPts val="1200"/>
+              <a:buFont typeface="Calibri"/>
+              <a:buNone/>
+              <a:defRPr b="0" i="0" sz="1200" u="none" cap="none" strike="noStrike">
+                <a:solidFill>
+                  <a:srgbClr val="898989"/>
+                </a:solidFill>
+                <a:latin typeface="Calibri"/>
+                <a:ea typeface="Calibri"/>
+                <a:cs typeface="Calibri"/>
+                <a:sym typeface="Calibri"/>
+              </a:defRPr>
+            </a:lvl8pPr>
+            <a:lvl9pPr indent="0" lvl="8" marL="0" marR="0" rtl="0" algn="r">
+              <a:lnSpc>
+                <a:spcPct val="100000"/>
+              </a:lnSpc>
+              <a:spcBef>
+                <a:spcPts val="0"/>
+              </a:spcBef>
+              <a:spcAft>
+                <a:spcPts val="0"/>
+              </a:spcAft>
+              <a:buClr>
+                <a:srgbClr val="898989"/>
+              </a:buClr>
+              <a:buSzPts val="1200"/>
+              <a:buFont typeface="Calibri"/>
+              <a:buNone/>
+              <a:defRPr b="0" i="0" sz="1200" u="none" cap="none" strike="noStrike">
+                <a:solidFill>
+                  <a:srgbClr val="898989"/>
+                </a:solidFill>
+                <a:latin typeface="Calibri"/>
+                <a:ea typeface="Calibri"/>
+                <a:cs typeface="Calibri"/>
+                <a:sym typeface="Calibri"/>
+              </a:defRPr>
+            </a:lvl9pPr>
+          </a:lstStyle>
+          <a:p>
+            <a:pPr indent="0" lvl="0" marL="0">
+              <a:spcBef>
+                <a:spcPts val="0"/>
+              </a:spcBef>
+              <a:spcAft>
+                <a:spcPts val="0"/>
+              </a:spcAft>
+              <a:buNone/>
             </a:pPr>
             <a:fld id="{00000000-1234-1234-1234-123412341234}" type="slidenum">
-              <a:rPr b="0" i="0" lang="en-US" sz="1200" u="none" cap="none" strike="noStrike">
-                <a:solidFill>
-                  <a:srgbClr val="898989"/>
-                </a:solidFill>
-                <a:latin typeface="Calibri"/>
-                <a:ea typeface="Calibri"/>
-                <a:cs typeface="Calibri"/>
-                <a:sym typeface="Calibri"/>
-              </a:rPr>
+              <a:rPr lang="en-US"/>
               <a:t>‹#›</a:t>
             </a:fld>
-            <a:endParaRPr b="0" i="0" sz="1400" u="none" cap="none" strike="noStrike">
+            <a:endParaRPr sz="1400">
               <a:solidFill>
                 <a:srgbClr val="000000"/>
               </a:solidFill>
@@ -10143,8 +11932,8 @@
 </file>
 
 <file path=ppt/slideLayouts/slideLayout6.xml><?xml version="1.0" encoding="utf-8"?>
-<p:sldLayout xmlns:a="http://schemas.openxmlformats.org/drawingml/2006/main" xmlns:r="http://schemas.openxmlformats.org/officeDocument/2006/relationships" xmlns:mc="http://schemas.openxmlformats.org/markup-compatibility/2006" xmlns:mv="urn:schemas-microsoft-com:mac:vml" xmlns:p="http://schemas.openxmlformats.org/presentationml/2006/main" xmlns:c="http://schemas.openxmlformats.org/drawingml/2006/chart" xmlns:dgm="http://schemas.openxmlformats.org/drawingml/2006/diagram" xmlns:o="urn:schemas-microsoft-com:office:office" xmlns:v="urn:schemas-microsoft-com:vml" xmlns:pvml="urn:schemas-microsoft-com:office:powerpoint" xmlns:com="http://schemas.openxmlformats.org/drawingml/2006/compatibility" xmlns:p14="http://schemas.microsoft.com/office/powerpoint/2010/main" xmlns:p15="http://schemas.microsoft.com/office/powerpoint/2012/main" type="blank">
-  <p:cSld name="Blank">
+<p:sldLayout xmlns:a="http://schemas.openxmlformats.org/drawingml/2006/main" xmlns:r="http://schemas.openxmlformats.org/officeDocument/2006/relationships" xmlns:mc="http://schemas.openxmlformats.org/markup-compatibility/2006" xmlns:mv="urn:schemas-microsoft-com:mac:vml" xmlns:p="http://schemas.openxmlformats.org/presentationml/2006/main" xmlns:c="http://schemas.openxmlformats.org/drawingml/2006/chart" xmlns:dgm="http://schemas.openxmlformats.org/drawingml/2006/diagram" xmlns:o="urn:schemas-microsoft-com:office:office" xmlns:v="urn:schemas-microsoft-com:vml" xmlns:pvml="urn:schemas-microsoft-com:office:powerpoint" xmlns:com="http://schemas.openxmlformats.org/drawingml/2006/compatibility" xmlns:p14="http://schemas.microsoft.com/office/powerpoint/2010/main" xmlns:p15="http://schemas.microsoft.com/office/powerpoint/2012/main" matchingName="Blank" type="blank">
+  <p:cSld name="BLANK">
     <p:spTree>
       <p:nvGrpSpPr>
         <p:cNvPr id="43" name="Shape 43"/>
@@ -10708,9 +12497,8 @@
           <a:bodyPr anchorCtr="0" anchor="ctr" bIns="45675" lIns="91375" spcFirstLastPara="1" rIns="91375" wrap="square" tIns="45675">
             <a:noAutofit/>
           </a:bodyPr>
-          <a:lstStyle/>
-          <a:p>
-            <a:pPr indent="0" lvl="0" marL="0" marR="0" rtl="0" algn="r">
+          <a:lstStyle>
+            <a:lvl1pPr indent="0" lvl="0" marL="0" marR="0" rtl="0" algn="r">
               <a:lnSpc>
                 <a:spcPct val="100000"/>
               </a:lnSpc>
@@ -10726,20 +12514,240 @@
               <a:buSzPts val="1200"/>
               <a:buFont typeface="Calibri"/>
               <a:buNone/>
+              <a:defRPr b="0" i="0" sz="1200" u="none" cap="none" strike="noStrike">
+                <a:solidFill>
+                  <a:srgbClr val="898989"/>
+                </a:solidFill>
+                <a:latin typeface="Calibri"/>
+                <a:ea typeface="Calibri"/>
+                <a:cs typeface="Calibri"/>
+                <a:sym typeface="Calibri"/>
+              </a:defRPr>
+            </a:lvl1pPr>
+            <a:lvl2pPr indent="0" lvl="1" marL="0" marR="0" rtl="0" algn="r">
+              <a:lnSpc>
+                <a:spcPct val="100000"/>
+              </a:lnSpc>
+              <a:spcBef>
+                <a:spcPts val="0"/>
+              </a:spcBef>
+              <a:spcAft>
+                <a:spcPts val="0"/>
+              </a:spcAft>
+              <a:buClr>
+                <a:srgbClr val="898989"/>
+              </a:buClr>
+              <a:buSzPts val="1200"/>
+              <a:buFont typeface="Calibri"/>
+              <a:buNone/>
+              <a:defRPr b="0" i="0" sz="1200" u="none" cap="none" strike="noStrike">
+                <a:solidFill>
+                  <a:srgbClr val="898989"/>
+                </a:solidFill>
+                <a:latin typeface="Calibri"/>
+                <a:ea typeface="Calibri"/>
+                <a:cs typeface="Calibri"/>
+                <a:sym typeface="Calibri"/>
+              </a:defRPr>
+            </a:lvl2pPr>
+            <a:lvl3pPr indent="0" lvl="2" marL="0" marR="0" rtl="0" algn="r">
+              <a:lnSpc>
+                <a:spcPct val="100000"/>
+              </a:lnSpc>
+              <a:spcBef>
+                <a:spcPts val="0"/>
+              </a:spcBef>
+              <a:spcAft>
+                <a:spcPts val="0"/>
+              </a:spcAft>
+              <a:buClr>
+                <a:srgbClr val="898989"/>
+              </a:buClr>
+              <a:buSzPts val="1200"/>
+              <a:buFont typeface="Calibri"/>
+              <a:buNone/>
+              <a:defRPr b="0" i="0" sz="1200" u="none" cap="none" strike="noStrike">
+                <a:solidFill>
+                  <a:srgbClr val="898989"/>
+                </a:solidFill>
+                <a:latin typeface="Calibri"/>
+                <a:ea typeface="Calibri"/>
+                <a:cs typeface="Calibri"/>
+                <a:sym typeface="Calibri"/>
+              </a:defRPr>
+            </a:lvl3pPr>
+            <a:lvl4pPr indent="0" lvl="3" marL="0" marR="0" rtl="0" algn="r">
+              <a:lnSpc>
+                <a:spcPct val="100000"/>
+              </a:lnSpc>
+              <a:spcBef>
+                <a:spcPts val="0"/>
+              </a:spcBef>
+              <a:spcAft>
+                <a:spcPts val="0"/>
+              </a:spcAft>
+              <a:buClr>
+                <a:srgbClr val="898989"/>
+              </a:buClr>
+              <a:buSzPts val="1200"/>
+              <a:buFont typeface="Calibri"/>
+              <a:buNone/>
+              <a:defRPr b="0" i="0" sz="1200" u="none" cap="none" strike="noStrike">
+                <a:solidFill>
+                  <a:srgbClr val="898989"/>
+                </a:solidFill>
+                <a:latin typeface="Calibri"/>
+                <a:ea typeface="Calibri"/>
+                <a:cs typeface="Calibri"/>
+                <a:sym typeface="Calibri"/>
+              </a:defRPr>
+            </a:lvl4pPr>
+            <a:lvl5pPr indent="0" lvl="4" marL="0" marR="0" rtl="0" algn="r">
+              <a:lnSpc>
+                <a:spcPct val="100000"/>
+              </a:lnSpc>
+              <a:spcBef>
+                <a:spcPts val="0"/>
+              </a:spcBef>
+              <a:spcAft>
+                <a:spcPts val="0"/>
+              </a:spcAft>
+              <a:buClr>
+                <a:srgbClr val="898989"/>
+              </a:buClr>
+              <a:buSzPts val="1200"/>
+              <a:buFont typeface="Calibri"/>
+              <a:buNone/>
+              <a:defRPr b="0" i="0" sz="1200" u="none" cap="none" strike="noStrike">
+                <a:solidFill>
+                  <a:srgbClr val="898989"/>
+                </a:solidFill>
+                <a:latin typeface="Calibri"/>
+                <a:ea typeface="Calibri"/>
+                <a:cs typeface="Calibri"/>
+                <a:sym typeface="Calibri"/>
+              </a:defRPr>
+            </a:lvl5pPr>
+            <a:lvl6pPr indent="0" lvl="5" marL="0" marR="0" rtl="0" algn="r">
+              <a:lnSpc>
+                <a:spcPct val="100000"/>
+              </a:lnSpc>
+              <a:spcBef>
+                <a:spcPts val="0"/>
+              </a:spcBef>
+              <a:spcAft>
+                <a:spcPts val="0"/>
+              </a:spcAft>
+              <a:buClr>
+                <a:srgbClr val="898989"/>
+              </a:buClr>
+              <a:buSzPts val="1200"/>
+              <a:buFont typeface="Calibri"/>
+              <a:buNone/>
+              <a:defRPr b="0" i="0" sz="1200" u="none" cap="none" strike="noStrike">
+                <a:solidFill>
+                  <a:srgbClr val="898989"/>
+                </a:solidFill>
+                <a:latin typeface="Calibri"/>
+                <a:ea typeface="Calibri"/>
+                <a:cs typeface="Calibri"/>
+                <a:sym typeface="Calibri"/>
+              </a:defRPr>
+            </a:lvl6pPr>
+            <a:lvl7pPr indent="0" lvl="6" marL="0" marR="0" rtl="0" algn="r">
+              <a:lnSpc>
+                <a:spcPct val="100000"/>
+              </a:lnSpc>
+              <a:spcBef>
+                <a:spcPts val="0"/>
+              </a:spcBef>
+              <a:spcAft>
+                <a:spcPts val="0"/>
+              </a:spcAft>
+              <a:buClr>
+                <a:srgbClr val="898989"/>
+              </a:buClr>
+              <a:buSzPts val="1200"/>
+              <a:buFont typeface="Calibri"/>
+              <a:buNone/>
+              <a:defRPr b="0" i="0" sz="1200" u="none" cap="none" strike="noStrike">
+                <a:solidFill>
+                  <a:srgbClr val="898989"/>
+                </a:solidFill>
+                <a:latin typeface="Calibri"/>
+                <a:ea typeface="Calibri"/>
+                <a:cs typeface="Calibri"/>
+                <a:sym typeface="Calibri"/>
+              </a:defRPr>
+            </a:lvl7pPr>
+            <a:lvl8pPr indent="0" lvl="7" marL="0" marR="0" rtl="0" algn="r">
+              <a:lnSpc>
+                <a:spcPct val="100000"/>
+              </a:lnSpc>
+              <a:spcBef>
+                <a:spcPts val="0"/>
+              </a:spcBef>
+              <a:spcAft>
+                <a:spcPts val="0"/>
+              </a:spcAft>
+              <a:buClr>
+                <a:srgbClr val="898989"/>
+              </a:buClr>
+              <a:buSzPts val="1200"/>
+              <a:buFont typeface="Calibri"/>
+              <a:buNone/>
+              <a:defRPr b="0" i="0" sz="1200" u="none" cap="none" strike="noStrike">
+                <a:solidFill>
+                  <a:srgbClr val="898989"/>
+                </a:solidFill>
+                <a:latin typeface="Calibri"/>
+                <a:ea typeface="Calibri"/>
+                <a:cs typeface="Calibri"/>
+                <a:sym typeface="Calibri"/>
+              </a:defRPr>
+            </a:lvl8pPr>
+            <a:lvl9pPr indent="0" lvl="8" marL="0" marR="0" rtl="0" algn="r">
+              <a:lnSpc>
+                <a:spcPct val="100000"/>
+              </a:lnSpc>
+              <a:spcBef>
+                <a:spcPts val="0"/>
+              </a:spcBef>
+              <a:spcAft>
+                <a:spcPts val="0"/>
+              </a:spcAft>
+              <a:buClr>
+                <a:srgbClr val="898989"/>
+              </a:buClr>
+              <a:buSzPts val="1200"/>
+              <a:buFont typeface="Calibri"/>
+              <a:buNone/>
+              <a:defRPr b="0" i="0" sz="1200" u="none" cap="none" strike="noStrike">
+                <a:solidFill>
+                  <a:srgbClr val="898989"/>
+                </a:solidFill>
+                <a:latin typeface="Calibri"/>
+                <a:ea typeface="Calibri"/>
+                <a:cs typeface="Calibri"/>
+                <a:sym typeface="Calibri"/>
+              </a:defRPr>
+            </a:lvl9pPr>
+          </a:lstStyle>
+          <a:p>
+            <a:pPr indent="0" lvl="0" marL="0">
+              <a:spcBef>
+                <a:spcPts val="0"/>
+              </a:spcBef>
+              <a:spcAft>
+                <a:spcPts val="0"/>
+              </a:spcAft>
+              <a:buNone/>
             </a:pPr>
             <a:fld id="{00000000-1234-1234-1234-123412341234}" type="slidenum">
-              <a:rPr b="0" i="0" lang="en-US" sz="1200" u="none" cap="none" strike="noStrike">
-                <a:solidFill>
-                  <a:srgbClr val="898989"/>
-                </a:solidFill>
-                <a:latin typeface="Calibri"/>
-                <a:ea typeface="Calibri"/>
-                <a:cs typeface="Calibri"/>
-                <a:sym typeface="Calibri"/>
-              </a:rPr>
+              <a:rPr lang="en-US"/>
               <a:t>‹#›</a:t>
             </a:fld>
-            <a:endParaRPr b="0" i="0" sz="1400" u="none" cap="none" strike="noStrike">
+            <a:endParaRPr sz="1400">
               <a:solidFill>
                 <a:srgbClr val="000000"/>
               </a:solidFill>
@@ -10760,8 +12768,8 @@
 </file>
 
 <file path=ppt/slideLayouts/slideLayout7.xml><?xml version="1.0" encoding="utf-8"?>
-<p:sldLayout xmlns:a="http://schemas.openxmlformats.org/drawingml/2006/main" xmlns:r="http://schemas.openxmlformats.org/officeDocument/2006/relationships" xmlns:mc="http://schemas.openxmlformats.org/markup-compatibility/2006" xmlns:mv="urn:schemas-microsoft-com:mac:vml" xmlns:p="http://schemas.openxmlformats.org/presentationml/2006/main" xmlns:c="http://schemas.openxmlformats.org/drawingml/2006/chart" xmlns:dgm="http://schemas.openxmlformats.org/drawingml/2006/diagram" xmlns:o="urn:schemas-microsoft-com:office:office" xmlns:v="urn:schemas-microsoft-com:vml" xmlns:pvml="urn:schemas-microsoft-com:office:powerpoint" xmlns:com="http://schemas.openxmlformats.org/drawingml/2006/compatibility" xmlns:p14="http://schemas.microsoft.com/office/powerpoint/2010/main" xmlns:p15="http://schemas.microsoft.com/office/powerpoint/2012/main" type="titleOnly">
-  <p:cSld name="Title Only">
+<p:sldLayout xmlns:a="http://schemas.openxmlformats.org/drawingml/2006/main" xmlns:r="http://schemas.openxmlformats.org/officeDocument/2006/relationships" xmlns:mc="http://schemas.openxmlformats.org/markup-compatibility/2006" xmlns:mv="urn:schemas-microsoft-com:mac:vml" xmlns:p="http://schemas.openxmlformats.org/presentationml/2006/main" xmlns:c="http://schemas.openxmlformats.org/drawingml/2006/chart" xmlns:dgm="http://schemas.openxmlformats.org/drawingml/2006/diagram" xmlns:o="urn:schemas-microsoft-com:office:office" xmlns:v="urn:schemas-microsoft-com:vml" xmlns:pvml="urn:schemas-microsoft-com:office:powerpoint" xmlns:com="http://schemas.openxmlformats.org/drawingml/2006/compatibility" xmlns:p14="http://schemas.microsoft.com/office/powerpoint/2010/main" xmlns:p15="http://schemas.microsoft.com/office/powerpoint/2012/main" matchingName="Title Only" type="titleOnly">
+  <p:cSld name="TITLE_ONLY">
     <p:spTree>
       <p:nvGrpSpPr>
         <p:cNvPr id="47" name="Shape 47"/>
@@ -11563,9 +13571,8 @@
           <a:bodyPr anchorCtr="0" anchor="ctr" bIns="45675" lIns="91375" spcFirstLastPara="1" rIns="91375" wrap="square" tIns="45675">
             <a:noAutofit/>
           </a:bodyPr>
-          <a:lstStyle/>
-          <a:p>
-            <a:pPr indent="0" lvl="0" marL="0" marR="0" rtl="0" algn="r">
+          <a:lstStyle>
+            <a:lvl1pPr indent="0" lvl="0" marL="0" marR="0" rtl="0" algn="r">
               <a:lnSpc>
                 <a:spcPct val="100000"/>
               </a:lnSpc>
@@ -11581,20 +13588,240 @@
               <a:buSzPts val="1200"/>
               <a:buFont typeface="Calibri"/>
               <a:buNone/>
+              <a:defRPr b="0" i="0" sz="1200" u="none" cap="none" strike="noStrike">
+                <a:solidFill>
+                  <a:srgbClr val="898989"/>
+                </a:solidFill>
+                <a:latin typeface="Calibri"/>
+                <a:ea typeface="Calibri"/>
+                <a:cs typeface="Calibri"/>
+                <a:sym typeface="Calibri"/>
+              </a:defRPr>
+            </a:lvl1pPr>
+            <a:lvl2pPr indent="0" lvl="1" marL="0" marR="0" rtl="0" algn="r">
+              <a:lnSpc>
+                <a:spcPct val="100000"/>
+              </a:lnSpc>
+              <a:spcBef>
+                <a:spcPts val="0"/>
+              </a:spcBef>
+              <a:spcAft>
+                <a:spcPts val="0"/>
+              </a:spcAft>
+              <a:buClr>
+                <a:srgbClr val="898989"/>
+              </a:buClr>
+              <a:buSzPts val="1200"/>
+              <a:buFont typeface="Calibri"/>
+              <a:buNone/>
+              <a:defRPr b="0" i="0" sz="1200" u="none" cap="none" strike="noStrike">
+                <a:solidFill>
+                  <a:srgbClr val="898989"/>
+                </a:solidFill>
+                <a:latin typeface="Calibri"/>
+                <a:ea typeface="Calibri"/>
+                <a:cs typeface="Calibri"/>
+                <a:sym typeface="Calibri"/>
+              </a:defRPr>
+            </a:lvl2pPr>
+            <a:lvl3pPr indent="0" lvl="2" marL="0" marR="0" rtl="0" algn="r">
+              <a:lnSpc>
+                <a:spcPct val="100000"/>
+              </a:lnSpc>
+              <a:spcBef>
+                <a:spcPts val="0"/>
+              </a:spcBef>
+              <a:spcAft>
+                <a:spcPts val="0"/>
+              </a:spcAft>
+              <a:buClr>
+                <a:srgbClr val="898989"/>
+              </a:buClr>
+              <a:buSzPts val="1200"/>
+              <a:buFont typeface="Calibri"/>
+              <a:buNone/>
+              <a:defRPr b="0" i="0" sz="1200" u="none" cap="none" strike="noStrike">
+                <a:solidFill>
+                  <a:srgbClr val="898989"/>
+                </a:solidFill>
+                <a:latin typeface="Calibri"/>
+                <a:ea typeface="Calibri"/>
+                <a:cs typeface="Calibri"/>
+                <a:sym typeface="Calibri"/>
+              </a:defRPr>
+            </a:lvl3pPr>
+            <a:lvl4pPr indent="0" lvl="3" marL="0" marR="0" rtl="0" algn="r">
+              <a:lnSpc>
+                <a:spcPct val="100000"/>
+              </a:lnSpc>
+              <a:spcBef>
+                <a:spcPts val="0"/>
+              </a:spcBef>
+              <a:spcAft>
+                <a:spcPts val="0"/>
+              </a:spcAft>
+              <a:buClr>
+                <a:srgbClr val="898989"/>
+              </a:buClr>
+              <a:buSzPts val="1200"/>
+              <a:buFont typeface="Calibri"/>
+              <a:buNone/>
+              <a:defRPr b="0" i="0" sz="1200" u="none" cap="none" strike="noStrike">
+                <a:solidFill>
+                  <a:srgbClr val="898989"/>
+                </a:solidFill>
+                <a:latin typeface="Calibri"/>
+                <a:ea typeface="Calibri"/>
+                <a:cs typeface="Calibri"/>
+                <a:sym typeface="Calibri"/>
+              </a:defRPr>
+            </a:lvl4pPr>
+            <a:lvl5pPr indent="0" lvl="4" marL="0" marR="0" rtl="0" algn="r">
+              <a:lnSpc>
+                <a:spcPct val="100000"/>
+              </a:lnSpc>
+              <a:spcBef>
+                <a:spcPts val="0"/>
+              </a:spcBef>
+              <a:spcAft>
+                <a:spcPts val="0"/>
+              </a:spcAft>
+              <a:buClr>
+                <a:srgbClr val="898989"/>
+              </a:buClr>
+              <a:buSzPts val="1200"/>
+              <a:buFont typeface="Calibri"/>
+              <a:buNone/>
+              <a:defRPr b="0" i="0" sz="1200" u="none" cap="none" strike="noStrike">
+                <a:solidFill>
+                  <a:srgbClr val="898989"/>
+                </a:solidFill>
+                <a:latin typeface="Calibri"/>
+                <a:ea typeface="Calibri"/>
+                <a:cs typeface="Calibri"/>
+                <a:sym typeface="Calibri"/>
+              </a:defRPr>
+            </a:lvl5pPr>
+            <a:lvl6pPr indent="0" lvl="5" marL="0" marR="0" rtl="0" algn="r">
+              <a:lnSpc>
+                <a:spcPct val="100000"/>
+              </a:lnSpc>
+              <a:spcBef>
+                <a:spcPts val="0"/>
+              </a:spcBef>
+              <a:spcAft>
+                <a:spcPts val="0"/>
+              </a:spcAft>
+              <a:buClr>
+                <a:srgbClr val="898989"/>
+              </a:buClr>
+              <a:buSzPts val="1200"/>
+              <a:buFont typeface="Calibri"/>
+              <a:buNone/>
+              <a:defRPr b="0" i="0" sz="1200" u="none" cap="none" strike="noStrike">
+                <a:solidFill>
+                  <a:srgbClr val="898989"/>
+                </a:solidFill>
+                <a:latin typeface="Calibri"/>
+                <a:ea typeface="Calibri"/>
+                <a:cs typeface="Calibri"/>
+                <a:sym typeface="Calibri"/>
+              </a:defRPr>
+            </a:lvl6pPr>
+            <a:lvl7pPr indent="0" lvl="6" marL="0" marR="0" rtl="0" algn="r">
+              <a:lnSpc>
+                <a:spcPct val="100000"/>
+              </a:lnSpc>
+              <a:spcBef>
+                <a:spcPts val="0"/>
+              </a:spcBef>
+              <a:spcAft>
+                <a:spcPts val="0"/>
+              </a:spcAft>
+              <a:buClr>
+                <a:srgbClr val="898989"/>
+              </a:buClr>
+              <a:buSzPts val="1200"/>
+              <a:buFont typeface="Calibri"/>
+              <a:buNone/>
+              <a:defRPr b="0" i="0" sz="1200" u="none" cap="none" strike="noStrike">
+                <a:solidFill>
+                  <a:srgbClr val="898989"/>
+                </a:solidFill>
+                <a:latin typeface="Calibri"/>
+                <a:ea typeface="Calibri"/>
+                <a:cs typeface="Calibri"/>
+                <a:sym typeface="Calibri"/>
+              </a:defRPr>
+            </a:lvl7pPr>
+            <a:lvl8pPr indent="0" lvl="7" marL="0" marR="0" rtl="0" algn="r">
+              <a:lnSpc>
+                <a:spcPct val="100000"/>
+              </a:lnSpc>
+              <a:spcBef>
+                <a:spcPts val="0"/>
+              </a:spcBef>
+              <a:spcAft>
+                <a:spcPts val="0"/>
+              </a:spcAft>
+              <a:buClr>
+                <a:srgbClr val="898989"/>
+              </a:buClr>
+              <a:buSzPts val="1200"/>
+              <a:buFont typeface="Calibri"/>
+              <a:buNone/>
+              <a:defRPr b="0" i="0" sz="1200" u="none" cap="none" strike="noStrike">
+                <a:solidFill>
+                  <a:srgbClr val="898989"/>
+                </a:solidFill>
+                <a:latin typeface="Calibri"/>
+                <a:ea typeface="Calibri"/>
+                <a:cs typeface="Calibri"/>
+                <a:sym typeface="Calibri"/>
+              </a:defRPr>
+            </a:lvl8pPr>
+            <a:lvl9pPr indent="0" lvl="8" marL="0" marR="0" rtl="0" algn="r">
+              <a:lnSpc>
+                <a:spcPct val="100000"/>
+              </a:lnSpc>
+              <a:spcBef>
+                <a:spcPts val="0"/>
+              </a:spcBef>
+              <a:spcAft>
+                <a:spcPts val="0"/>
+              </a:spcAft>
+              <a:buClr>
+                <a:srgbClr val="898989"/>
+              </a:buClr>
+              <a:buSzPts val="1200"/>
+              <a:buFont typeface="Calibri"/>
+              <a:buNone/>
+              <a:defRPr b="0" i="0" sz="1200" u="none" cap="none" strike="noStrike">
+                <a:solidFill>
+                  <a:srgbClr val="898989"/>
+                </a:solidFill>
+                <a:latin typeface="Calibri"/>
+                <a:ea typeface="Calibri"/>
+                <a:cs typeface="Calibri"/>
+                <a:sym typeface="Calibri"/>
+              </a:defRPr>
+            </a:lvl9pPr>
+          </a:lstStyle>
+          <a:p>
+            <a:pPr indent="0" lvl="0" marL="0">
+              <a:spcBef>
+                <a:spcPts val="0"/>
+              </a:spcBef>
+              <a:spcAft>
+                <a:spcPts val="0"/>
+              </a:spcAft>
+              <a:buNone/>
             </a:pPr>
             <a:fld id="{00000000-1234-1234-1234-123412341234}" type="slidenum">
-              <a:rPr b="0" i="0" lang="en-US" sz="1200" u="none" cap="none" strike="noStrike">
-                <a:solidFill>
-                  <a:srgbClr val="898989"/>
-                </a:solidFill>
-                <a:latin typeface="Calibri"/>
-                <a:ea typeface="Calibri"/>
-                <a:cs typeface="Calibri"/>
-                <a:sym typeface="Calibri"/>
-              </a:rPr>
+              <a:rPr lang="en-US"/>
               <a:t>‹#›</a:t>
             </a:fld>
-            <a:endParaRPr b="0" i="0" sz="1400" u="none" cap="none" strike="noStrike">
+            <a:endParaRPr sz="1400">
               <a:solidFill>
                 <a:srgbClr val="000000"/>
               </a:solidFill>
@@ -11615,8 +13842,8 @@
 </file>
 
 <file path=ppt/slideLayouts/slideLayout8.xml><?xml version="1.0" encoding="utf-8"?>
-<p:sldLayout xmlns:a="http://schemas.openxmlformats.org/drawingml/2006/main" xmlns:r="http://schemas.openxmlformats.org/officeDocument/2006/relationships" xmlns:mc="http://schemas.openxmlformats.org/markup-compatibility/2006" xmlns:mv="urn:schemas-microsoft-com:mac:vml" xmlns:p="http://schemas.openxmlformats.org/presentationml/2006/main" xmlns:c="http://schemas.openxmlformats.org/drawingml/2006/chart" xmlns:dgm="http://schemas.openxmlformats.org/drawingml/2006/diagram" xmlns:o="urn:schemas-microsoft-com:office:office" xmlns:v="urn:schemas-microsoft-com:vml" xmlns:pvml="urn:schemas-microsoft-com:office:powerpoint" xmlns:com="http://schemas.openxmlformats.org/drawingml/2006/compatibility" xmlns:p14="http://schemas.microsoft.com/office/powerpoint/2010/main" xmlns:p15="http://schemas.microsoft.com/office/powerpoint/2012/main" type="twoTxTwoObj">
-  <p:cSld name="Comparison">
+<p:sldLayout xmlns:a="http://schemas.openxmlformats.org/drawingml/2006/main" xmlns:r="http://schemas.openxmlformats.org/officeDocument/2006/relationships" xmlns:mc="http://schemas.openxmlformats.org/markup-compatibility/2006" xmlns:mv="urn:schemas-microsoft-com:mac:vml" xmlns:p="http://schemas.openxmlformats.org/presentationml/2006/main" xmlns:c="http://schemas.openxmlformats.org/drawingml/2006/chart" xmlns:dgm="http://schemas.openxmlformats.org/drawingml/2006/diagram" xmlns:o="urn:schemas-microsoft-com:office:office" xmlns:v="urn:schemas-microsoft-com:vml" xmlns:pvml="urn:schemas-microsoft-com:office:powerpoint" xmlns:com="http://schemas.openxmlformats.org/drawingml/2006/compatibility" xmlns:p14="http://schemas.microsoft.com/office/powerpoint/2010/main" xmlns:p15="http://schemas.microsoft.com/office/powerpoint/2012/main" matchingName="Comparison" type="twoTxTwoObj">
+  <p:cSld name="TWO_OBJECTS_WITH_TEXT">
     <p:spTree>
       <p:nvGrpSpPr>
         <p:cNvPr id="52" name="Shape 52"/>
@@ -13466,9 +15693,8 @@
           <a:bodyPr anchorCtr="0" anchor="ctr" bIns="45675" lIns="91375" spcFirstLastPara="1" rIns="91375" wrap="square" tIns="45675">
             <a:noAutofit/>
           </a:bodyPr>
-          <a:lstStyle/>
-          <a:p>
-            <a:pPr indent="0" lvl="0" marL="0" marR="0" rtl="0" algn="r">
+          <a:lstStyle>
+            <a:lvl1pPr indent="0" lvl="0" marL="0" marR="0" rtl="0" algn="r">
               <a:lnSpc>
                 <a:spcPct val="100000"/>
               </a:lnSpc>
@@ -13484,20 +15710,240 @@
               <a:buSzPts val="1200"/>
               <a:buFont typeface="Calibri"/>
               <a:buNone/>
+              <a:defRPr b="0" i="0" sz="1200" u="none" cap="none" strike="noStrike">
+                <a:solidFill>
+                  <a:srgbClr val="898989"/>
+                </a:solidFill>
+                <a:latin typeface="Calibri"/>
+                <a:ea typeface="Calibri"/>
+                <a:cs typeface="Calibri"/>
+                <a:sym typeface="Calibri"/>
+              </a:defRPr>
+            </a:lvl1pPr>
+            <a:lvl2pPr indent="0" lvl="1" marL="0" marR="0" rtl="0" algn="r">
+              <a:lnSpc>
+                <a:spcPct val="100000"/>
+              </a:lnSpc>
+              <a:spcBef>
+                <a:spcPts val="0"/>
+              </a:spcBef>
+              <a:spcAft>
+                <a:spcPts val="0"/>
+              </a:spcAft>
+              <a:buClr>
+                <a:srgbClr val="898989"/>
+              </a:buClr>
+              <a:buSzPts val="1200"/>
+              <a:buFont typeface="Calibri"/>
+              <a:buNone/>
+              <a:defRPr b="0" i="0" sz="1200" u="none" cap="none" strike="noStrike">
+                <a:solidFill>
+                  <a:srgbClr val="898989"/>
+                </a:solidFill>
+                <a:latin typeface="Calibri"/>
+                <a:ea typeface="Calibri"/>
+                <a:cs typeface="Calibri"/>
+                <a:sym typeface="Calibri"/>
+              </a:defRPr>
+            </a:lvl2pPr>
+            <a:lvl3pPr indent="0" lvl="2" marL="0" marR="0" rtl="0" algn="r">
+              <a:lnSpc>
+                <a:spcPct val="100000"/>
+              </a:lnSpc>
+              <a:spcBef>
+                <a:spcPts val="0"/>
+              </a:spcBef>
+              <a:spcAft>
+                <a:spcPts val="0"/>
+              </a:spcAft>
+              <a:buClr>
+                <a:srgbClr val="898989"/>
+              </a:buClr>
+              <a:buSzPts val="1200"/>
+              <a:buFont typeface="Calibri"/>
+              <a:buNone/>
+              <a:defRPr b="0" i="0" sz="1200" u="none" cap="none" strike="noStrike">
+                <a:solidFill>
+                  <a:srgbClr val="898989"/>
+                </a:solidFill>
+                <a:latin typeface="Calibri"/>
+                <a:ea typeface="Calibri"/>
+                <a:cs typeface="Calibri"/>
+                <a:sym typeface="Calibri"/>
+              </a:defRPr>
+            </a:lvl3pPr>
+            <a:lvl4pPr indent="0" lvl="3" marL="0" marR="0" rtl="0" algn="r">
+              <a:lnSpc>
+                <a:spcPct val="100000"/>
+              </a:lnSpc>
+              <a:spcBef>
+                <a:spcPts val="0"/>
+              </a:spcBef>
+              <a:spcAft>
+                <a:spcPts val="0"/>
+              </a:spcAft>
+              <a:buClr>
+                <a:srgbClr val="898989"/>
+              </a:buClr>
+              <a:buSzPts val="1200"/>
+              <a:buFont typeface="Calibri"/>
+              <a:buNone/>
+              <a:defRPr b="0" i="0" sz="1200" u="none" cap="none" strike="noStrike">
+                <a:solidFill>
+                  <a:srgbClr val="898989"/>
+                </a:solidFill>
+                <a:latin typeface="Calibri"/>
+                <a:ea typeface="Calibri"/>
+                <a:cs typeface="Calibri"/>
+                <a:sym typeface="Calibri"/>
+              </a:defRPr>
+            </a:lvl4pPr>
+            <a:lvl5pPr indent="0" lvl="4" marL="0" marR="0" rtl="0" algn="r">
+              <a:lnSpc>
+                <a:spcPct val="100000"/>
+              </a:lnSpc>
+              <a:spcBef>
+                <a:spcPts val="0"/>
+              </a:spcBef>
+              <a:spcAft>
+                <a:spcPts val="0"/>
+              </a:spcAft>
+              <a:buClr>
+                <a:srgbClr val="898989"/>
+              </a:buClr>
+              <a:buSzPts val="1200"/>
+              <a:buFont typeface="Calibri"/>
+              <a:buNone/>
+              <a:defRPr b="0" i="0" sz="1200" u="none" cap="none" strike="noStrike">
+                <a:solidFill>
+                  <a:srgbClr val="898989"/>
+                </a:solidFill>
+                <a:latin typeface="Calibri"/>
+                <a:ea typeface="Calibri"/>
+                <a:cs typeface="Calibri"/>
+                <a:sym typeface="Calibri"/>
+              </a:defRPr>
+            </a:lvl5pPr>
+            <a:lvl6pPr indent="0" lvl="5" marL="0" marR="0" rtl="0" algn="r">
+              <a:lnSpc>
+                <a:spcPct val="100000"/>
+              </a:lnSpc>
+              <a:spcBef>
+                <a:spcPts val="0"/>
+              </a:spcBef>
+              <a:spcAft>
+                <a:spcPts val="0"/>
+              </a:spcAft>
+              <a:buClr>
+                <a:srgbClr val="898989"/>
+              </a:buClr>
+              <a:buSzPts val="1200"/>
+              <a:buFont typeface="Calibri"/>
+              <a:buNone/>
+              <a:defRPr b="0" i="0" sz="1200" u="none" cap="none" strike="noStrike">
+                <a:solidFill>
+                  <a:srgbClr val="898989"/>
+                </a:solidFill>
+                <a:latin typeface="Calibri"/>
+                <a:ea typeface="Calibri"/>
+                <a:cs typeface="Calibri"/>
+                <a:sym typeface="Calibri"/>
+              </a:defRPr>
+            </a:lvl6pPr>
+            <a:lvl7pPr indent="0" lvl="6" marL="0" marR="0" rtl="0" algn="r">
+              <a:lnSpc>
+                <a:spcPct val="100000"/>
+              </a:lnSpc>
+              <a:spcBef>
+                <a:spcPts val="0"/>
+              </a:spcBef>
+              <a:spcAft>
+                <a:spcPts val="0"/>
+              </a:spcAft>
+              <a:buClr>
+                <a:srgbClr val="898989"/>
+              </a:buClr>
+              <a:buSzPts val="1200"/>
+              <a:buFont typeface="Calibri"/>
+              <a:buNone/>
+              <a:defRPr b="0" i="0" sz="1200" u="none" cap="none" strike="noStrike">
+                <a:solidFill>
+                  <a:srgbClr val="898989"/>
+                </a:solidFill>
+                <a:latin typeface="Calibri"/>
+                <a:ea typeface="Calibri"/>
+                <a:cs typeface="Calibri"/>
+                <a:sym typeface="Calibri"/>
+              </a:defRPr>
+            </a:lvl7pPr>
+            <a:lvl8pPr indent="0" lvl="7" marL="0" marR="0" rtl="0" algn="r">
+              <a:lnSpc>
+                <a:spcPct val="100000"/>
+              </a:lnSpc>
+              <a:spcBef>
+                <a:spcPts val="0"/>
+              </a:spcBef>
+              <a:spcAft>
+                <a:spcPts val="0"/>
+              </a:spcAft>
+              <a:buClr>
+                <a:srgbClr val="898989"/>
+              </a:buClr>
+              <a:buSzPts val="1200"/>
+              <a:buFont typeface="Calibri"/>
+              <a:buNone/>
+              <a:defRPr b="0" i="0" sz="1200" u="none" cap="none" strike="noStrike">
+                <a:solidFill>
+                  <a:srgbClr val="898989"/>
+                </a:solidFill>
+                <a:latin typeface="Calibri"/>
+                <a:ea typeface="Calibri"/>
+                <a:cs typeface="Calibri"/>
+                <a:sym typeface="Calibri"/>
+              </a:defRPr>
+            </a:lvl8pPr>
+            <a:lvl9pPr indent="0" lvl="8" marL="0" marR="0" rtl="0" algn="r">
+              <a:lnSpc>
+                <a:spcPct val="100000"/>
+              </a:lnSpc>
+              <a:spcBef>
+                <a:spcPts val="0"/>
+              </a:spcBef>
+              <a:spcAft>
+                <a:spcPts val="0"/>
+              </a:spcAft>
+              <a:buClr>
+                <a:srgbClr val="898989"/>
+              </a:buClr>
+              <a:buSzPts val="1200"/>
+              <a:buFont typeface="Calibri"/>
+              <a:buNone/>
+              <a:defRPr b="0" i="0" sz="1200" u="none" cap="none" strike="noStrike">
+                <a:solidFill>
+                  <a:srgbClr val="898989"/>
+                </a:solidFill>
+                <a:latin typeface="Calibri"/>
+                <a:ea typeface="Calibri"/>
+                <a:cs typeface="Calibri"/>
+                <a:sym typeface="Calibri"/>
+              </a:defRPr>
+            </a:lvl9pPr>
+          </a:lstStyle>
+          <a:p>
+            <a:pPr indent="0" lvl="0" marL="0">
+              <a:spcBef>
+                <a:spcPts val="0"/>
+              </a:spcBef>
+              <a:spcAft>
+                <a:spcPts val="0"/>
+              </a:spcAft>
+              <a:buNone/>
             </a:pPr>
             <a:fld id="{00000000-1234-1234-1234-123412341234}" type="slidenum">
-              <a:rPr b="0" i="0" lang="en-US" sz="1200" u="none" cap="none" strike="noStrike">
-                <a:solidFill>
-                  <a:srgbClr val="898989"/>
-                </a:solidFill>
-                <a:latin typeface="Calibri"/>
-                <a:ea typeface="Calibri"/>
-                <a:cs typeface="Calibri"/>
-                <a:sym typeface="Calibri"/>
-              </a:rPr>
+              <a:rPr lang="en-US"/>
               <a:t>‹#›</a:t>
             </a:fld>
-            <a:endParaRPr b="0" i="0" sz="1400" u="none" cap="none" strike="noStrike">
+            <a:endParaRPr sz="1400">
               <a:solidFill>
                 <a:srgbClr val="000000"/>
               </a:solidFill>
@@ -13518,8 +15964,8 @@
 </file>
 
 <file path=ppt/slideLayouts/slideLayout9.xml><?xml version="1.0" encoding="utf-8"?>
-<p:sldLayout xmlns:a="http://schemas.openxmlformats.org/drawingml/2006/main" xmlns:r="http://schemas.openxmlformats.org/officeDocument/2006/relationships" xmlns:mc="http://schemas.openxmlformats.org/markup-compatibility/2006" xmlns:mv="urn:schemas-microsoft-com:mac:vml" xmlns:p="http://schemas.openxmlformats.org/presentationml/2006/main" xmlns:c="http://schemas.openxmlformats.org/drawingml/2006/chart" xmlns:dgm="http://schemas.openxmlformats.org/drawingml/2006/diagram" xmlns:o="urn:schemas-microsoft-com:office:office" xmlns:v="urn:schemas-microsoft-com:vml" xmlns:pvml="urn:schemas-microsoft-com:office:powerpoint" xmlns:com="http://schemas.openxmlformats.org/drawingml/2006/compatibility" xmlns:p14="http://schemas.microsoft.com/office/powerpoint/2010/main" xmlns:p15="http://schemas.microsoft.com/office/powerpoint/2012/main" type="twoObj">
-  <p:cSld name="Two Content">
+<p:sldLayout xmlns:a="http://schemas.openxmlformats.org/drawingml/2006/main" xmlns:r="http://schemas.openxmlformats.org/officeDocument/2006/relationships" xmlns:mc="http://schemas.openxmlformats.org/markup-compatibility/2006" xmlns:mv="urn:schemas-microsoft-com:mac:vml" xmlns:p="http://schemas.openxmlformats.org/presentationml/2006/main" xmlns:c="http://schemas.openxmlformats.org/drawingml/2006/chart" xmlns:dgm="http://schemas.openxmlformats.org/drawingml/2006/diagram" xmlns:o="urn:schemas-microsoft-com:office:office" xmlns:v="urn:schemas-microsoft-com:vml" xmlns:pvml="urn:schemas-microsoft-com:office:powerpoint" xmlns:com="http://schemas.openxmlformats.org/drawingml/2006/compatibility" xmlns:p14="http://schemas.microsoft.com/office/powerpoint/2010/main" xmlns:p15="http://schemas.microsoft.com/office/powerpoint/2012/main" matchingName="Two Content" type="twoObj">
+  <p:cSld name="TWO_OBJECTS">
     <p:spTree>
       <p:nvGrpSpPr>
         <p:cNvPr id="61" name="Shape 61"/>
@@ -14845,9 +17291,8 @@
           <a:bodyPr anchorCtr="0" anchor="ctr" bIns="45675" lIns="91375" spcFirstLastPara="1" rIns="91375" wrap="square" tIns="45675">
             <a:noAutofit/>
           </a:bodyPr>
-          <a:lstStyle/>
-          <a:p>
-            <a:pPr indent="0" lvl="0" marL="0" marR="0" rtl="0" algn="r">
+          <a:lstStyle>
+            <a:lvl1pPr indent="0" lvl="0" marL="0" marR="0" rtl="0" algn="r">
               <a:lnSpc>
                 <a:spcPct val="100000"/>
               </a:lnSpc>
@@ -14863,20 +17308,240 @@
               <a:buSzPts val="1200"/>
               <a:buFont typeface="Calibri"/>
               <a:buNone/>
+              <a:defRPr b="0" i="0" sz="1200" u="none" cap="none" strike="noStrike">
+                <a:solidFill>
+                  <a:srgbClr val="898989"/>
+                </a:solidFill>
+                <a:latin typeface="Calibri"/>
+                <a:ea typeface="Calibri"/>
+                <a:cs typeface="Calibri"/>
+                <a:sym typeface="Calibri"/>
+              </a:defRPr>
+            </a:lvl1pPr>
+            <a:lvl2pPr indent="0" lvl="1" marL="0" marR="0" rtl="0" algn="r">
+              <a:lnSpc>
+                <a:spcPct val="100000"/>
+              </a:lnSpc>
+              <a:spcBef>
+                <a:spcPts val="0"/>
+              </a:spcBef>
+              <a:spcAft>
+                <a:spcPts val="0"/>
+              </a:spcAft>
+              <a:buClr>
+                <a:srgbClr val="898989"/>
+              </a:buClr>
+              <a:buSzPts val="1200"/>
+              <a:buFont typeface="Calibri"/>
+              <a:buNone/>
+              <a:defRPr b="0" i="0" sz="1200" u="none" cap="none" strike="noStrike">
+                <a:solidFill>
+                  <a:srgbClr val="898989"/>
+                </a:solidFill>
+                <a:latin typeface="Calibri"/>
+                <a:ea typeface="Calibri"/>
+                <a:cs typeface="Calibri"/>
+                <a:sym typeface="Calibri"/>
+              </a:defRPr>
+            </a:lvl2pPr>
+            <a:lvl3pPr indent="0" lvl="2" marL="0" marR="0" rtl="0" algn="r">
+              <a:lnSpc>
+                <a:spcPct val="100000"/>
+              </a:lnSpc>
+              <a:spcBef>
+                <a:spcPts val="0"/>
+              </a:spcBef>
+              <a:spcAft>
+                <a:spcPts val="0"/>
+              </a:spcAft>
+              <a:buClr>
+                <a:srgbClr val="898989"/>
+              </a:buClr>
+              <a:buSzPts val="1200"/>
+              <a:buFont typeface="Calibri"/>
+              <a:buNone/>
+              <a:defRPr b="0" i="0" sz="1200" u="none" cap="none" strike="noStrike">
+                <a:solidFill>
+                  <a:srgbClr val="898989"/>
+                </a:solidFill>
+                <a:latin typeface="Calibri"/>
+                <a:ea typeface="Calibri"/>
+                <a:cs typeface="Calibri"/>
+                <a:sym typeface="Calibri"/>
+              </a:defRPr>
+            </a:lvl3pPr>
+            <a:lvl4pPr indent="0" lvl="3" marL="0" marR="0" rtl="0" algn="r">
+              <a:lnSpc>
+                <a:spcPct val="100000"/>
+              </a:lnSpc>
+              <a:spcBef>
+                <a:spcPts val="0"/>
+              </a:spcBef>
+              <a:spcAft>
+                <a:spcPts val="0"/>
+              </a:spcAft>
+              <a:buClr>
+                <a:srgbClr val="898989"/>
+              </a:buClr>
+              <a:buSzPts val="1200"/>
+              <a:buFont typeface="Calibri"/>
+              <a:buNone/>
+              <a:defRPr b="0" i="0" sz="1200" u="none" cap="none" strike="noStrike">
+                <a:solidFill>
+                  <a:srgbClr val="898989"/>
+                </a:solidFill>
+                <a:latin typeface="Calibri"/>
+                <a:ea typeface="Calibri"/>
+                <a:cs typeface="Calibri"/>
+                <a:sym typeface="Calibri"/>
+              </a:defRPr>
+            </a:lvl4pPr>
+            <a:lvl5pPr indent="0" lvl="4" marL="0" marR="0" rtl="0" algn="r">
+              <a:lnSpc>
+                <a:spcPct val="100000"/>
+              </a:lnSpc>
+              <a:spcBef>
+                <a:spcPts val="0"/>
+              </a:spcBef>
+              <a:spcAft>
+                <a:spcPts val="0"/>
+              </a:spcAft>
+              <a:buClr>
+                <a:srgbClr val="898989"/>
+              </a:buClr>
+              <a:buSzPts val="1200"/>
+              <a:buFont typeface="Calibri"/>
+              <a:buNone/>
+              <a:defRPr b="0" i="0" sz="1200" u="none" cap="none" strike="noStrike">
+                <a:solidFill>
+                  <a:srgbClr val="898989"/>
+                </a:solidFill>
+                <a:latin typeface="Calibri"/>
+                <a:ea typeface="Calibri"/>
+                <a:cs typeface="Calibri"/>
+                <a:sym typeface="Calibri"/>
+              </a:defRPr>
+            </a:lvl5pPr>
+            <a:lvl6pPr indent="0" lvl="5" marL="0" marR="0" rtl="0" algn="r">
+              <a:lnSpc>
+                <a:spcPct val="100000"/>
+              </a:lnSpc>
+              <a:spcBef>
+                <a:spcPts val="0"/>
+              </a:spcBef>
+              <a:spcAft>
+                <a:spcPts val="0"/>
+              </a:spcAft>
+              <a:buClr>
+                <a:srgbClr val="898989"/>
+              </a:buClr>
+              <a:buSzPts val="1200"/>
+              <a:buFont typeface="Calibri"/>
+              <a:buNone/>
+              <a:defRPr b="0" i="0" sz="1200" u="none" cap="none" strike="noStrike">
+                <a:solidFill>
+                  <a:srgbClr val="898989"/>
+                </a:solidFill>
+                <a:latin typeface="Calibri"/>
+                <a:ea typeface="Calibri"/>
+                <a:cs typeface="Calibri"/>
+                <a:sym typeface="Calibri"/>
+              </a:defRPr>
+            </a:lvl6pPr>
+            <a:lvl7pPr indent="0" lvl="6" marL="0" marR="0" rtl="0" algn="r">
+              <a:lnSpc>
+                <a:spcPct val="100000"/>
+              </a:lnSpc>
+              <a:spcBef>
+                <a:spcPts val="0"/>
+              </a:spcBef>
+              <a:spcAft>
+                <a:spcPts val="0"/>
+              </a:spcAft>
+              <a:buClr>
+                <a:srgbClr val="898989"/>
+              </a:buClr>
+              <a:buSzPts val="1200"/>
+              <a:buFont typeface="Calibri"/>
+              <a:buNone/>
+              <a:defRPr b="0" i="0" sz="1200" u="none" cap="none" strike="noStrike">
+                <a:solidFill>
+                  <a:srgbClr val="898989"/>
+                </a:solidFill>
+                <a:latin typeface="Calibri"/>
+                <a:ea typeface="Calibri"/>
+                <a:cs typeface="Calibri"/>
+                <a:sym typeface="Calibri"/>
+              </a:defRPr>
+            </a:lvl7pPr>
+            <a:lvl8pPr indent="0" lvl="7" marL="0" marR="0" rtl="0" algn="r">
+              <a:lnSpc>
+                <a:spcPct val="100000"/>
+              </a:lnSpc>
+              <a:spcBef>
+                <a:spcPts val="0"/>
+              </a:spcBef>
+              <a:spcAft>
+                <a:spcPts val="0"/>
+              </a:spcAft>
+              <a:buClr>
+                <a:srgbClr val="898989"/>
+              </a:buClr>
+              <a:buSzPts val="1200"/>
+              <a:buFont typeface="Calibri"/>
+              <a:buNone/>
+              <a:defRPr b="0" i="0" sz="1200" u="none" cap="none" strike="noStrike">
+                <a:solidFill>
+                  <a:srgbClr val="898989"/>
+                </a:solidFill>
+                <a:latin typeface="Calibri"/>
+                <a:ea typeface="Calibri"/>
+                <a:cs typeface="Calibri"/>
+                <a:sym typeface="Calibri"/>
+              </a:defRPr>
+            </a:lvl8pPr>
+            <a:lvl9pPr indent="0" lvl="8" marL="0" marR="0" rtl="0" algn="r">
+              <a:lnSpc>
+                <a:spcPct val="100000"/>
+              </a:lnSpc>
+              <a:spcBef>
+                <a:spcPts val="0"/>
+              </a:spcBef>
+              <a:spcAft>
+                <a:spcPts val="0"/>
+              </a:spcAft>
+              <a:buClr>
+                <a:srgbClr val="898989"/>
+              </a:buClr>
+              <a:buSzPts val="1200"/>
+              <a:buFont typeface="Calibri"/>
+              <a:buNone/>
+              <a:defRPr b="0" i="0" sz="1200" u="none" cap="none" strike="noStrike">
+                <a:solidFill>
+                  <a:srgbClr val="898989"/>
+                </a:solidFill>
+                <a:latin typeface="Calibri"/>
+                <a:ea typeface="Calibri"/>
+                <a:cs typeface="Calibri"/>
+                <a:sym typeface="Calibri"/>
+              </a:defRPr>
+            </a:lvl9pPr>
+          </a:lstStyle>
+          <a:p>
+            <a:pPr indent="0" lvl="0" marL="0">
+              <a:spcBef>
+                <a:spcPts val="0"/>
+              </a:spcBef>
+              <a:spcAft>
+                <a:spcPts val="0"/>
+              </a:spcAft>
+              <a:buNone/>
             </a:pPr>
             <a:fld id="{00000000-1234-1234-1234-123412341234}" type="slidenum">
-              <a:rPr b="0" i="0" lang="en-US" sz="1200" u="none" cap="none" strike="noStrike">
-                <a:solidFill>
-                  <a:srgbClr val="898989"/>
-                </a:solidFill>
-                <a:latin typeface="Calibri"/>
-                <a:ea typeface="Calibri"/>
-                <a:cs typeface="Calibri"/>
-                <a:sym typeface="Calibri"/>
-              </a:rPr>
+              <a:rPr lang="en-US"/>
               <a:t>‹#›</a:t>
             </a:fld>
-            <a:endParaRPr b="0" i="0" sz="1400" u="none" cap="none" strike="noStrike">
+            <a:endParaRPr sz="1400">
               <a:solidFill>
                 <a:srgbClr val="000000"/>
               </a:solidFill>
@@ -15969,9 +18634,8 @@
           <a:bodyPr anchorCtr="0" anchor="ctr" bIns="45675" lIns="91375" spcFirstLastPara="1" rIns="91375" wrap="square" tIns="45675">
             <a:noAutofit/>
           </a:bodyPr>
-          <a:lstStyle/>
-          <a:p>
-            <a:pPr indent="0" lvl="0" marL="0" marR="0" rtl="0" algn="r">
+          <a:lstStyle>
+            <a:lvl1pPr indent="0" lvl="0" marL="0" marR="0" rtl="0" algn="r">
               <a:lnSpc>
                 <a:spcPct val="100000"/>
               </a:lnSpc>
@@ -15987,20 +18651,240 @@
               <a:buSzPts val="1200"/>
               <a:buFont typeface="Calibri"/>
               <a:buNone/>
+              <a:defRPr b="0" i="0" sz="1200" u="none" cap="none" strike="noStrike">
+                <a:solidFill>
+                  <a:srgbClr val="898989"/>
+                </a:solidFill>
+                <a:latin typeface="Calibri"/>
+                <a:ea typeface="Calibri"/>
+                <a:cs typeface="Calibri"/>
+                <a:sym typeface="Calibri"/>
+              </a:defRPr>
+            </a:lvl1pPr>
+            <a:lvl2pPr indent="0" lvl="1" marL="0" marR="0" rtl="0" algn="r">
+              <a:lnSpc>
+                <a:spcPct val="100000"/>
+              </a:lnSpc>
+              <a:spcBef>
+                <a:spcPts val="0"/>
+              </a:spcBef>
+              <a:spcAft>
+                <a:spcPts val="0"/>
+              </a:spcAft>
+              <a:buClr>
+                <a:srgbClr val="898989"/>
+              </a:buClr>
+              <a:buSzPts val="1200"/>
+              <a:buFont typeface="Calibri"/>
+              <a:buNone/>
+              <a:defRPr b="0" i="0" sz="1200" u="none" cap="none" strike="noStrike">
+                <a:solidFill>
+                  <a:srgbClr val="898989"/>
+                </a:solidFill>
+                <a:latin typeface="Calibri"/>
+                <a:ea typeface="Calibri"/>
+                <a:cs typeface="Calibri"/>
+                <a:sym typeface="Calibri"/>
+              </a:defRPr>
+            </a:lvl2pPr>
+            <a:lvl3pPr indent="0" lvl="2" marL="0" marR="0" rtl="0" algn="r">
+              <a:lnSpc>
+                <a:spcPct val="100000"/>
+              </a:lnSpc>
+              <a:spcBef>
+                <a:spcPts val="0"/>
+              </a:spcBef>
+              <a:spcAft>
+                <a:spcPts val="0"/>
+              </a:spcAft>
+              <a:buClr>
+                <a:srgbClr val="898989"/>
+              </a:buClr>
+              <a:buSzPts val="1200"/>
+              <a:buFont typeface="Calibri"/>
+              <a:buNone/>
+              <a:defRPr b="0" i="0" sz="1200" u="none" cap="none" strike="noStrike">
+                <a:solidFill>
+                  <a:srgbClr val="898989"/>
+                </a:solidFill>
+                <a:latin typeface="Calibri"/>
+                <a:ea typeface="Calibri"/>
+                <a:cs typeface="Calibri"/>
+                <a:sym typeface="Calibri"/>
+              </a:defRPr>
+            </a:lvl3pPr>
+            <a:lvl4pPr indent="0" lvl="3" marL="0" marR="0" rtl="0" algn="r">
+              <a:lnSpc>
+                <a:spcPct val="100000"/>
+              </a:lnSpc>
+              <a:spcBef>
+                <a:spcPts val="0"/>
+              </a:spcBef>
+              <a:spcAft>
+                <a:spcPts val="0"/>
+              </a:spcAft>
+              <a:buClr>
+                <a:srgbClr val="898989"/>
+              </a:buClr>
+              <a:buSzPts val="1200"/>
+              <a:buFont typeface="Calibri"/>
+              <a:buNone/>
+              <a:defRPr b="0" i="0" sz="1200" u="none" cap="none" strike="noStrike">
+                <a:solidFill>
+                  <a:srgbClr val="898989"/>
+                </a:solidFill>
+                <a:latin typeface="Calibri"/>
+                <a:ea typeface="Calibri"/>
+                <a:cs typeface="Calibri"/>
+                <a:sym typeface="Calibri"/>
+              </a:defRPr>
+            </a:lvl4pPr>
+            <a:lvl5pPr indent="0" lvl="4" marL="0" marR="0" rtl="0" algn="r">
+              <a:lnSpc>
+                <a:spcPct val="100000"/>
+              </a:lnSpc>
+              <a:spcBef>
+                <a:spcPts val="0"/>
+              </a:spcBef>
+              <a:spcAft>
+                <a:spcPts val="0"/>
+              </a:spcAft>
+              <a:buClr>
+                <a:srgbClr val="898989"/>
+              </a:buClr>
+              <a:buSzPts val="1200"/>
+              <a:buFont typeface="Calibri"/>
+              <a:buNone/>
+              <a:defRPr b="0" i="0" sz="1200" u="none" cap="none" strike="noStrike">
+                <a:solidFill>
+                  <a:srgbClr val="898989"/>
+                </a:solidFill>
+                <a:latin typeface="Calibri"/>
+                <a:ea typeface="Calibri"/>
+                <a:cs typeface="Calibri"/>
+                <a:sym typeface="Calibri"/>
+              </a:defRPr>
+            </a:lvl5pPr>
+            <a:lvl6pPr indent="0" lvl="5" marL="0" marR="0" rtl="0" algn="r">
+              <a:lnSpc>
+                <a:spcPct val="100000"/>
+              </a:lnSpc>
+              <a:spcBef>
+                <a:spcPts val="0"/>
+              </a:spcBef>
+              <a:spcAft>
+                <a:spcPts val="0"/>
+              </a:spcAft>
+              <a:buClr>
+                <a:srgbClr val="898989"/>
+              </a:buClr>
+              <a:buSzPts val="1200"/>
+              <a:buFont typeface="Calibri"/>
+              <a:buNone/>
+              <a:defRPr b="0" i="0" sz="1200" u="none" cap="none" strike="noStrike">
+                <a:solidFill>
+                  <a:srgbClr val="898989"/>
+                </a:solidFill>
+                <a:latin typeface="Calibri"/>
+                <a:ea typeface="Calibri"/>
+                <a:cs typeface="Calibri"/>
+                <a:sym typeface="Calibri"/>
+              </a:defRPr>
+            </a:lvl6pPr>
+            <a:lvl7pPr indent="0" lvl="6" marL="0" marR="0" rtl="0" algn="r">
+              <a:lnSpc>
+                <a:spcPct val="100000"/>
+              </a:lnSpc>
+              <a:spcBef>
+                <a:spcPts val="0"/>
+              </a:spcBef>
+              <a:spcAft>
+                <a:spcPts val="0"/>
+              </a:spcAft>
+              <a:buClr>
+                <a:srgbClr val="898989"/>
+              </a:buClr>
+              <a:buSzPts val="1200"/>
+              <a:buFont typeface="Calibri"/>
+              <a:buNone/>
+              <a:defRPr b="0" i="0" sz="1200" u="none" cap="none" strike="noStrike">
+                <a:solidFill>
+                  <a:srgbClr val="898989"/>
+                </a:solidFill>
+                <a:latin typeface="Calibri"/>
+                <a:ea typeface="Calibri"/>
+                <a:cs typeface="Calibri"/>
+                <a:sym typeface="Calibri"/>
+              </a:defRPr>
+            </a:lvl7pPr>
+            <a:lvl8pPr indent="0" lvl="7" marL="0" marR="0" rtl="0" algn="r">
+              <a:lnSpc>
+                <a:spcPct val="100000"/>
+              </a:lnSpc>
+              <a:spcBef>
+                <a:spcPts val="0"/>
+              </a:spcBef>
+              <a:spcAft>
+                <a:spcPts val="0"/>
+              </a:spcAft>
+              <a:buClr>
+                <a:srgbClr val="898989"/>
+              </a:buClr>
+              <a:buSzPts val="1200"/>
+              <a:buFont typeface="Calibri"/>
+              <a:buNone/>
+              <a:defRPr b="0" i="0" sz="1200" u="none" cap="none" strike="noStrike">
+                <a:solidFill>
+                  <a:srgbClr val="898989"/>
+                </a:solidFill>
+                <a:latin typeface="Calibri"/>
+                <a:ea typeface="Calibri"/>
+                <a:cs typeface="Calibri"/>
+                <a:sym typeface="Calibri"/>
+              </a:defRPr>
+            </a:lvl8pPr>
+            <a:lvl9pPr indent="0" lvl="8" marL="0" marR="0" rtl="0" algn="r">
+              <a:lnSpc>
+                <a:spcPct val="100000"/>
+              </a:lnSpc>
+              <a:spcBef>
+                <a:spcPts val="0"/>
+              </a:spcBef>
+              <a:spcAft>
+                <a:spcPts val="0"/>
+              </a:spcAft>
+              <a:buClr>
+                <a:srgbClr val="898989"/>
+              </a:buClr>
+              <a:buSzPts val="1200"/>
+              <a:buFont typeface="Calibri"/>
+              <a:buNone/>
+              <a:defRPr b="0" i="0" sz="1200" u="none" cap="none" strike="noStrike">
+                <a:solidFill>
+                  <a:srgbClr val="898989"/>
+                </a:solidFill>
+                <a:latin typeface="Calibri"/>
+                <a:ea typeface="Calibri"/>
+                <a:cs typeface="Calibri"/>
+                <a:sym typeface="Calibri"/>
+              </a:defRPr>
+            </a:lvl9pPr>
+          </a:lstStyle>
+          <a:p>
+            <a:pPr indent="0" lvl="0" marL="0">
+              <a:spcBef>
+                <a:spcPts val="0"/>
+              </a:spcBef>
+              <a:spcAft>
+                <a:spcPts val="0"/>
+              </a:spcAft>
+              <a:buNone/>
             </a:pPr>
             <a:fld id="{00000000-1234-1234-1234-123412341234}" type="slidenum">
-              <a:rPr b="0" i="0" lang="en-US" sz="1200" u="none" cap="none" strike="noStrike">
-                <a:solidFill>
-                  <a:srgbClr val="898989"/>
-                </a:solidFill>
-                <a:latin typeface="Calibri"/>
-                <a:ea typeface="Calibri"/>
-                <a:cs typeface="Calibri"/>
-                <a:sym typeface="Calibri"/>
-              </a:rPr>
+              <a:rPr lang="en-US"/>
               <a:t>‹#›</a:t>
             </a:fld>
-            <a:endParaRPr b="0" i="0" sz="1400" u="none" cap="none" strike="noStrike">
+            <a:endParaRPr sz="1400">
               <a:solidFill>
                 <a:srgbClr val="000000"/>
               </a:solidFill>
@@ -16052,7 +18936,10 @@
         <a:spcAft>
           <a:spcPts val="0"/>
         </a:spcAft>
-        <a:buNone/>
+        <a:buClr>
+          <a:srgbClr val="000000"/>
+        </a:buClr>
+        <a:buFont typeface="Arial"/>
         <a:defRPr b="0" i="0" sz="1400" u="none" cap="none" strike="noStrike">
           <a:solidFill>
             <a:srgbClr val="000000"/>
@@ -16063,6 +18950,198 @@
           <a:sym typeface="Arial"/>
         </a:defRPr>
       </a:lvl1pPr>
+      <a:lvl2pPr lvl="1" marR="0" rtl="0" algn="l">
+        <a:lnSpc>
+          <a:spcPct val="100000"/>
+        </a:lnSpc>
+        <a:spcBef>
+          <a:spcPts val="0"/>
+        </a:spcBef>
+        <a:spcAft>
+          <a:spcPts val="0"/>
+        </a:spcAft>
+        <a:buClr>
+          <a:srgbClr val="000000"/>
+        </a:buClr>
+        <a:buFont typeface="Arial"/>
+        <a:defRPr b="0" i="0" sz="1400" u="none" cap="none" strike="noStrike">
+          <a:solidFill>
+            <a:srgbClr val="000000"/>
+          </a:solidFill>
+          <a:latin typeface="Arial"/>
+          <a:ea typeface="Arial"/>
+          <a:cs typeface="Arial"/>
+          <a:sym typeface="Arial"/>
+        </a:defRPr>
+      </a:lvl2pPr>
+      <a:lvl3pPr lvl="2" marR="0" rtl="0" algn="l">
+        <a:lnSpc>
+          <a:spcPct val="100000"/>
+        </a:lnSpc>
+        <a:spcBef>
+          <a:spcPts val="0"/>
+        </a:spcBef>
+        <a:spcAft>
+          <a:spcPts val="0"/>
+        </a:spcAft>
+        <a:buClr>
+          <a:srgbClr val="000000"/>
+        </a:buClr>
+        <a:buFont typeface="Arial"/>
+        <a:defRPr b="0" i="0" sz="1400" u="none" cap="none" strike="noStrike">
+          <a:solidFill>
+            <a:srgbClr val="000000"/>
+          </a:solidFill>
+          <a:latin typeface="Arial"/>
+          <a:ea typeface="Arial"/>
+          <a:cs typeface="Arial"/>
+          <a:sym typeface="Arial"/>
+        </a:defRPr>
+      </a:lvl3pPr>
+      <a:lvl4pPr lvl="3" marR="0" rtl="0" algn="l">
+        <a:lnSpc>
+          <a:spcPct val="100000"/>
+        </a:lnSpc>
+        <a:spcBef>
+          <a:spcPts val="0"/>
+        </a:spcBef>
+        <a:spcAft>
+          <a:spcPts val="0"/>
+        </a:spcAft>
+        <a:buClr>
+          <a:srgbClr val="000000"/>
+        </a:buClr>
+        <a:buFont typeface="Arial"/>
+        <a:defRPr b="0" i="0" sz="1400" u="none" cap="none" strike="noStrike">
+          <a:solidFill>
+            <a:srgbClr val="000000"/>
+          </a:solidFill>
+          <a:latin typeface="Arial"/>
+          <a:ea typeface="Arial"/>
+          <a:cs typeface="Arial"/>
+          <a:sym typeface="Arial"/>
+        </a:defRPr>
+      </a:lvl4pPr>
+      <a:lvl5pPr lvl="4" marR="0" rtl="0" algn="l">
+        <a:lnSpc>
+          <a:spcPct val="100000"/>
+        </a:lnSpc>
+        <a:spcBef>
+          <a:spcPts val="0"/>
+        </a:spcBef>
+        <a:spcAft>
+          <a:spcPts val="0"/>
+        </a:spcAft>
+        <a:buClr>
+          <a:srgbClr val="000000"/>
+        </a:buClr>
+        <a:buFont typeface="Arial"/>
+        <a:defRPr b="0" i="0" sz="1400" u="none" cap="none" strike="noStrike">
+          <a:solidFill>
+            <a:srgbClr val="000000"/>
+          </a:solidFill>
+          <a:latin typeface="Arial"/>
+          <a:ea typeface="Arial"/>
+          <a:cs typeface="Arial"/>
+          <a:sym typeface="Arial"/>
+        </a:defRPr>
+      </a:lvl5pPr>
+      <a:lvl6pPr lvl="5" marR="0" rtl="0" algn="l">
+        <a:lnSpc>
+          <a:spcPct val="100000"/>
+        </a:lnSpc>
+        <a:spcBef>
+          <a:spcPts val="0"/>
+        </a:spcBef>
+        <a:spcAft>
+          <a:spcPts val="0"/>
+        </a:spcAft>
+        <a:buClr>
+          <a:srgbClr val="000000"/>
+        </a:buClr>
+        <a:buFont typeface="Arial"/>
+        <a:defRPr b="0" i="0" sz="1400" u="none" cap="none" strike="noStrike">
+          <a:solidFill>
+            <a:srgbClr val="000000"/>
+          </a:solidFill>
+          <a:latin typeface="Arial"/>
+          <a:ea typeface="Arial"/>
+          <a:cs typeface="Arial"/>
+          <a:sym typeface="Arial"/>
+        </a:defRPr>
+      </a:lvl6pPr>
+      <a:lvl7pPr lvl="6" marR="0" rtl="0" algn="l">
+        <a:lnSpc>
+          <a:spcPct val="100000"/>
+        </a:lnSpc>
+        <a:spcBef>
+          <a:spcPts val="0"/>
+        </a:spcBef>
+        <a:spcAft>
+          <a:spcPts val="0"/>
+        </a:spcAft>
+        <a:buClr>
+          <a:srgbClr val="000000"/>
+        </a:buClr>
+        <a:buFont typeface="Arial"/>
+        <a:defRPr b="0" i="0" sz="1400" u="none" cap="none" strike="noStrike">
+          <a:solidFill>
+            <a:srgbClr val="000000"/>
+          </a:solidFill>
+          <a:latin typeface="Arial"/>
+          <a:ea typeface="Arial"/>
+          <a:cs typeface="Arial"/>
+          <a:sym typeface="Arial"/>
+        </a:defRPr>
+      </a:lvl7pPr>
+      <a:lvl8pPr lvl="7" marR="0" rtl="0" algn="l">
+        <a:lnSpc>
+          <a:spcPct val="100000"/>
+        </a:lnSpc>
+        <a:spcBef>
+          <a:spcPts val="0"/>
+        </a:spcBef>
+        <a:spcAft>
+          <a:spcPts val="0"/>
+        </a:spcAft>
+        <a:buClr>
+          <a:srgbClr val="000000"/>
+        </a:buClr>
+        <a:buFont typeface="Arial"/>
+        <a:defRPr b="0" i="0" sz="1400" u="none" cap="none" strike="noStrike">
+          <a:solidFill>
+            <a:srgbClr val="000000"/>
+          </a:solidFill>
+          <a:latin typeface="Arial"/>
+          <a:ea typeface="Arial"/>
+          <a:cs typeface="Arial"/>
+          <a:sym typeface="Arial"/>
+        </a:defRPr>
+      </a:lvl8pPr>
+      <a:lvl9pPr lvl="8" marR="0" rtl="0" algn="l">
+        <a:lnSpc>
+          <a:spcPct val="100000"/>
+        </a:lnSpc>
+        <a:spcBef>
+          <a:spcPts val="0"/>
+        </a:spcBef>
+        <a:spcAft>
+          <a:spcPts val="0"/>
+        </a:spcAft>
+        <a:buClr>
+          <a:srgbClr val="000000"/>
+        </a:buClr>
+        <a:buFont typeface="Arial"/>
+        <a:defRPr b="0" i="0" sz="1400" u="none" cap="none" strike="noStrike">
+          <a:solidFill>
+            <a:srgbClr val="000000"/>
+          </a:solidFill>
+          <a:latin typeface="Arial"/>
+          <a:ea typeface="Arial"/>
+          <a:cs typeface="Arial"/>
+          <a:sym typeface="Arial"/>
+        </a:defRPr>
+      </a:lvl9pPr>
     </p:titleStyle>
     <p:bodyStyle>
       <a:defPPr lvl="0" marR="0" rtl="0" algn="l">
@@ -16086,7 +19165,10 @@
         <a:spcAft>
           <a:spcPts val="0"/>
         </a:spcAft>
-        <a:buNone/>
+        <a:buClr>
+          <a:srgbClr val="000000"/>
+        </a:buClr>
+        <a:buFont typeface="Arial"/>
         <a:defRPr b="0" i="0" sz="1400" u="none" cap="none" strike="noStrike">
           <a:solidFill>
             <a:srgbClr val="000000"/>
@@ -16107,7 +19189,10 @@
         <a:spcAft>
           <a:spcPts val="0"/>
         </a:spcAft>
-        <a:buNone/>
+        <a:buClr>
+          <a:srgbClr val="000000"/>
+        </a:buClr>
+        <a:buFont typeface="Arial"/>
         <a:defRPr b="0" i="0" sz="1400" u="none" cap="none" strike="noStrike">
           <a:solidFill>
             <a:srgbClr val="000000"/>
@@ -16128,7 +19213,10 @@
         <a:spcAft>
           <a:spcPts val="0"/>
         </a:spcAft>
-        <a:buNone/>
+        <a:buClr>
+          <a:srgbClr val="000000"/>
+        </a:buClr>
+        <a:buFont typeface="Arial"/>
         <a:defRPr b="0" i="0" sz="1400" u="none" cap="none" strike="noStrike">
           <a:solidFill>
             <a:srgbClr val="000000"/>
@@ -16149,7 +19237,10 @@
         <a:spcAft>
           <a:spcPts val="0"/>
         </a:spcAft>
-        <a:buNone/>
+        <a:buClr>
+          <a:srgbClr val="000000"/>
+        </a:buClr>
+        <a:buFont typeface="Arial"/>
         <a:defRPr b="0" i="0" sz="1400" u="none" cap="none" strike="noStrike">
           <a:solidFill>
             <a:srgbClr val="000000"/>
@@ -16170,7 +19261,10 @@
         <a:spcAft>
           <a:spcPts val="0"/>
         </a:spcAft>
-        <a:buNone/>
+        <a:buClr>
+          <a:srgbClr val="000000"/>
+        </a:buClr>
+        <a:buFont typeface="Arial"/>
         <a:defRPr b="0" i="0" sz="1400" u="none" cap="none" strike="noStrike">
           <a:solidFill>
             <a:srgbClr val="000000"/>
@@ -16191,7 +19285,10 @@
         <a:spcAft>
           <a:spcPts val="0"/>
         </a:spcAft>
-        <a:buNone/>
+        <a:buClr>
+          <a:srgbClr val="000000"/>
+        </a:buClr>
+        <a:buFont typeface="Arial"/>
         <a:defRPr b="0" i="0" sz="1400" u="none" cap="none" strike="noStrike">
           <a:solidFill>
             <a:srgbClr val="000000"/>
@@ -16212,7 +19309,10 @@
         <a:spcAft>
           <a:spcPts val="0"/>
         </a:spcAft>
-        <a:buNone/>
+        <a:buClr>
+          <a:srgbClr val="000000"/>
+        </a:buClr>
+        <a:buFont typeface="Arial"/>
         <a:defRPr b="0" i="0" sz="1400" u="none" cap="none" strike="noStrike">
           <a:solidFill>
             <a:srgbClr val="000000"/>
@@ -16233,7 +19333,10 @@
         <a:spcAft>
           <a:spcPts val="0"/>
         </a:spcAft>
-        <a:buNone/>
+        <a:buClr>
+          <a:srgbClr val="000000"/>
+        </a:buClr>
+        <a:buFont typeface="Arial"/>
         <a:defRPr b="0" i="0" sz="1400" u="none" cap="none" strike="noStrike">
           <a:solidFill>
             <a:srgbClr val="000000"/>
@@ -16254,7 +19357,10 @@
         <a:spcAft>
           <a:spcPts val="0"/>
         </a:spcAft>
-        <a:buNone/>
+        <a:buClr>
+          <a:srgbClr val="000000"/>
+        </a:buClr>
+        <a:buFont typeface="Arial"/>
         <a:defRPr b="0" i="0" sz="1400" u="none" cap="none" strike="noStrike">
           <a:solidFill>
             <a:srgbClr val="000000"/>
@@ -16288,7 +19394,10 @@
         <a:spcAft>
           <a:spcPts val="0"/>
         </a:spcAft>
-        <a:buNone/>
+        <a:buClr>
+          <a:srgbClr val="000000"/>
+        </a:buClr>
+        <a:buFont typeface="Arial"/>
         <a:defRPr b="0" i="0" sz="1400" u="none" cap="none" strike="noStrike">
           <a:solidFill>
             <a:srgbClr val="000000"/>
@@ -16309,7 +19418,10 @@
         <a:spcAft>
           <a:spcPts val="0"/>
         </a:spcAft>
-        <a:buNone/>
+        <a:buClr>
+          <a:srgbClr val="000000"/>
+        </a:buClr>
+        <a:buFont typeface="Arial"/>
         <a:defRPr b="0" i="0" sz="1400" u="none" cap="none" strike="noStrike">
           <a:solidFill>
             <a:srgbClr val="000000"/>
@@ -16330,7 +19442,10 @@
         <a:spcAft>
           <a:spcPts val="0"/>
         </a:spcAft>
-        <a:buNone/>
+        <a:buClr>
+          <a:srgbClr val="000000"/>
+        </a:buClr>
+        <a:buFont typeface="Arial"/>
         <a:defRPr b="0" i="0" sz="1400" u="none" cap="none" strike="noStrike">
           <a:solidFill>
             <a:srgbClr val="000000"/>
@@ -16351,7 +19466,10 @@
         <a:spcAft>
           <a:spcPts val="0"/>
         </a:spcAft>
-        <a:buNone/>
+        <a:buClr>
+          <a:srgbClr val="000000"/>
+        </a:buClr>
+        <a:buFont typeface="Arial"/>
         <a:defRPr b="0" i="0" sz="1400" u="none" cap="none" strike="noStrike">
           <a:solidFill>
             <a:srgbClr val="000000"/>
@@ -16372,7 +19490,10 @@
         <a:spcAft>
           <a:spcPts val="0"/>
         </a:spcAft>
-        <a:buNone/>
+        <a:buClr>
+          <a:srgbClr val="000000"/>
+        </a:buClr>
+        <a:buFont typeface="Arial"/>
         <a:defRPr b="0" i="0" sz="1400" u="none" cap="none" strike="noStrike">
           <a:solidFill>
             <a:srgbClr val="000000"/>
@@ -16393,7 +19514,10 @@
         <a:spcAft>
           <a:spcPts val="0"/>
         </a:spcAft>
-        <a:buNone/>
+        <a:buClr>
+          <a:srgbClr val="000000"/>
+        </a:buClr>
+        <a:buFont typeface="Arial"/>
         <a:defRPr b="0" i="0" sz="1400" u="none" cap="none" strike="noStrike">
           <a:solidFill>
             <a:srgbClr val="000000"/>
@@ -16414,7 +19538,10 @@
         <a:spcAft>
           <a:spcPts val="0"/>
         </a:spcAft>
-        <a:buNone/>
+        <a:buClr>
+          <a:srgbClr val="000000"/>
+        </a:buClr>
+        <a:buFont typeface="Arial"/>
         <a:defRPr b="0" i="0" sz="1400" u="none" cap="none" strike="noStrike">
           <a:solidFill>
             <a:srgbClr val="000000"/>
@@ -16435,7 +19562,10 @@
         <a:spcAft>
           <a:spcPts val="0"/>
         </a:spcAft>
-        <a:buNone/>
+        <a:buClr>
+          <a:srgbClr val="000000"/>
+        </a:buClr>
+        <a:buFont typeface="Arial"/>
         <a:defRPr b="0" i="0" sz="1400" u="none" cap="none" strike="noStrike">
           <a:solidFill>
             <a:srgbClr val="000000"/>
@@ -16456,7 +19586,10 @@
         <a:spcAft>
           <a:spcPts val="0"/>
         </a:spcAft>
-        <a:buNone/>
+        <a:buClr>
+          <a:srgbClr val="000000"/>
+        </a:buClr>
+        <a:buFont typeface="Arial"/>
         <a:defRPr b="0" i="0" sz="1400" u="none" cap="none" strike="noStrike">
           <a:solidFill>
             <a:srgbClr val="000000"/>
@@ -16912,52 +20045,6 @@
               <a:t>Srijitha Somangili</a:t>
             </a:r>
             <a:endParaRPr b="0" i="0" sz="2400" u="none" cap="none" strike="noStrike">
-              <a:solidFill>
-                <a:srgbClr val="222222"/>
-              </a:solidFill>
-              <a:highlight>
-                <a:srgbClr val="FFFFFF"/>
-              </a:highlight>
-              <a:latin typeface="Times New Roman"/>
-              <a:ea typeface="Times New Roman"/>
-              <a:cs typeface="Times New Roman"/>
-              <a:sym typeface="Times New Roman"/>
-            </a:endParaRPr>
-          </a:p>
-          <a:p>
-            <a:pPr indent="-381000" lvl="0" marL="457200" marR="0" rtl="0" algn="l">
-              <a:lnSpc>
-                <a:spcPct val="100000"/>
-              </a:lnSpc>
-              <a:spcBef>
-                <a:spcPts val="0"/>
-              </a:spcBef>
-              <a:spcAft>
-                <a:spcPts val="0"/>
-              </a:spcAft>
-              <a:buClr>
-                <a:srgbClr val="222222"/>
-              </a:buClr>
-              <a:buSzPts val="2400"/>
-              <a:buFont typeface="Times New Roman"/>
-              <a:buChar char="•"/>
-            </a:pPr>
-            <a:r>
-              <a:rPr lang="en-US" sz="2400">
-                <a:solidFill>
-                  <a:srgbClr val="222222"/>
-                </a:solidFill>
-                <a:highlight>
-                  <a:srgbClr val="FFFFFF"/>
-                </a:highlight>
-                <a:latin typeface="Times New Roman"/>
-                <a:ea typeface="Times New Roman"/>
-                <a:cs typeface="Times New Roman"/>
-                <a:sym typeface="Times New Roman"/>
-              </a:rPr>
-              <a:t>Evan Blank</a:t>
-            </a:r>
-            <a:endParaRPr sz="2400">
               <a:solidFill>
                 <a:srgbClr val="222222"/>
               </a:solidFill>
@@ -17961,7 +21048,7 @@
             </a:endParaRPr>
           </a:p>
           <a:p>
-            <a:pPr indent="-163511" lvl="0" marL="341312" marR="0" rtl="0" algn="l">
+            <a:pPr indent="-163510" lvl="0" marL="341312" marR="0" rtl="0" algn="l">
               <a:lnSpc>
                 <a:spcPct val="100000"/>
               </a:lnSpc>
@@ -18493,7 +21580,7 @@
             </a:endParaRPr>
           </a:p>
           <a:p>
-            <a:pPr indent="-163511" lvl="0" marL="341312" marR="0" rtl="0" algn="l">
+            <a:pPr indent="-163510" lvl="0" marL="341312" marR="0" rtl="0" algn="l">
               <a:lnSpc>
                 <a:spcPct val="100000"/>
               </a:lnSpc>
@@ -19058,7 +22145,7 @@
             </a:endParaRPr>
           </a:p>
           <a:p>
-            <a:pPr indent="-252412" lvl="0" marL="341312" marR="0" rtl="0" algn="l">
+            <a:pPr indent="-252411" lvl="0" marL="341312" marR="0" rtl="0" algn="l">
               <a:lnSpc>
                 <a:spcPct val="100000"/>
               </a:lnSpc>
@@ -19087,41 +22174,10 @@
               </a:rPr>
               <a:t>High level goal(s):</a:t>
             </a:r>
-            <a:endParaRPr b="1" sz="1800">
-              <a:latin typeface="Times New Roman"/>
-              <a:ea typeface="Times New Roman"/>
-              <a:cs typeface="Times New Roman"/>
-              <a:sym typeface="Times New Roman"/>
-            </a:endParaRPr>
-          </a:p>
-          <a:p>
-            <a:pPr indent="-182562" lvl="1" marL="741362" rtl="0">
-              <a:lnSpc>
-                <a:spcPct val="115000"/>
-              </a:lnSpc>
-              <a:spcBef>
-                <a:spcPts val="0"/>
-              </a:spcBef>
-              <a:spcAft>
-                <a:spcPts val="0"/>
-              </a:spcAft>
-              <a:buClr>
-                <a:schemeClr val="dk1"/>
-              </a:buClr>
-              <a:buSzPts val="1200"/>
-              <a:buFont typeface="Times New Roman"/>
-              <a:buChar char="–"/>
-            </a:pPr>
-            <a:r>
-              <a:rPr lang="en-US" sz="1200">
-                <a:latin typeface="Times New Roman"/>
-                <a:ea typeface="Times New Roman"/>
-                <a:cs typeface="Times New Roman"/>
-                <a:sym typeface="Times New Roman"/>
-              </a:rPr>
-              <a:t>Be able to display paths that were created over time by UC Santa Cruz people</a:t>
-            </a:r>
-            <a:endParaRPr sz="1200">
+            <a:endParaRPr b="1" i="0" sz="1800" u="none" cap="none" strike="noStrike">
+              <a:solidFill>
+                <a:schemeClr val="dk1"/>
+              </a:solidFill>
               <a:latin typeface="Times New Roman"/>
               <a:ea typeface="Times New Roman"/>
               <a:cs typeface="Times New Roman"/>
@@ -19156,9 +22212,52 @@
                 <a:cs typeface="Times New Roman"/>
                 <a:sym typeface="Times New Roman"/>
               </a:rPr>
+              <a:t>Be able to display paths that were created over time by UC Santa Cruz people</a:t>
+            </a:r>
+            <a:endParaRPr b="0" i="0" sz="1200" u="none" cap="none" strike="noStrike">
+              <a:solidFill>
+                <a:schemeClr val="dk1"/>
+              </a:solidFill>
+              <a:latin typeface="Times New Roman"/>
+              <a:ea typeface="Times New Roman"/>
+              <a:cs typeface="Times New Roman"/>
+              <a:sym typeface="Times New Roman"/>
+            </a:endParaRPr>
+          </a:p>
+          <a:p>
+            <a:pPr indent="-182562" lvl="1" marL="741362" marR="0" rtl="0" algn="l">
+              <a:lnSpc>
+                <a:spcPct val="115000"/>
+              </a:lnSpc>
+              <a:spcBef>
+                <a:spcPts val="0"/>
+              </a:spcBef>
+              <a:spcAft>
+                <a:spcPts val="0"/>
+              </a:spcAft>
+              <a:buClr>
+                <a:schemeClr val="dk1"/>
+              </a:buClr>
+              <a:buSzPts val="1200"/>
+              <a:buFont typeface="Times New Roman"/>
+              <a:buChar char="–"/>
+            </a:pPr>
+            <a:r>
+              <a:rPr b="0" i="0" lang="en-US" sz="1200" u="none" cap="none" strike="noStrike">
+                <a:solidFill>
+                  <a:schemeClr val="dk1"/>
+                </a:solidFill>
+                <a:latin typeface="Times New Roman"/>
+                <a:ea typeface="Times New Roman"/>
+                <a:cs typeface="Times New Roman"/>
+                <a:sym typeface="Times New Roman"/>
+              </a:rPr>
               <a:t>Be able to represent graph data as a readable file</a:t>
             </a:r>
-            <a:endParaRPr sz="1200">
+            <a:endParaRPr b="0" i="0" sz="1200" u="none" cap="none" strike="noStrike">
+              <a:solidFill>
+                <a:schemeClr val="dk1"/>
+              </a:solidFill>
               <a:latin typeface="Times New Roman"/>
               <a:ea typeface="Times New Roman"/>
               <a:cs typeface="Times New Roman"/>
@@ -19344,7 +22443,10 @@
               <a:buChar char="–"/>
             </a:pPr>
             <a:r>
-              <a:rPr lang="en-US" sz="1200">
+              <a:rPr b="0" i="0" lang="en-US" sz="1200" u="none" cap="none" strike="noStrike">
+                <a:solidFill>
+                  <a:schemeClr val="dk1"/>
+                </a:solidFill>
                 <a:latin typeface="Times New Roman"/>
                 <a:ea typeface="Times New Roman"/>
                 <a:cs typeface="Times New Roman"/>
@@ -19352,7 +22454,10 @@
               </a:rPr>
               <a:t>Be able to display building maps for every building on campus</a:t>
             </a:r>
-            <a:endParaRPr sz="1200">
+            <a:endParaRPr b="0" i="0" sz="1200" u="none" cap="none" strike="noStrike">
+              <a:solidFill>
+                <a:schemeClr val="dk1"/>
+              </a:solidFill>
               <a:latin typeface="Times New Roman"/>
               <a:ea typeface="Times New Roman"/>
               <a:cs typeface="Times New Roman"/>
@@ -20515,7 +23620,7 @@
             </a:endParaRPr>
           </a:p>
           <a:p>
-            <a:pPr indent="-163511" lvl="0" marL="341312" marR="0" rtl="0" algn="l">
+            <a:pPr indent="-163510" lvl="0" marL="341312" marR="0" rtl="0" algn="l">
               <a:lnSpc>
                 <a:spcPct val="100000"/>
               </a:lnSpc>
@@ -20990,7 +24095,7 @@
             </a:endParaRPr>
           </a:p>
           <a:p>
-            <a:pPr indent="-163511" lvl="0" marL="341312" marR="0" rtl="0" algn="l">
+            <a:pPr indent="-163510" lvl="0" marL="341312" marR="0" rtl="0" algn="l">
               <a:lnSpc>
                 <a:spcPct val="100000"/>
               </a:lnSpc>
@@ -21600,7 +24705,7 @@
             </a:endParaRPr>
           </a:p>
           <a:p>
-            <a:pPr indent="-163511" lvl="0" marL="341312" marR="0" rtl="0" algn="l">
+            <a:pPr indent="-163510" lvl="0" marL="341312" marR="0" rtl="0" algn="l">
               <a:lnSpc>
                 <a:spcPct val="100000"/>
               </a:lnSpc>
@@ -21995,7 +25100,7 @@
             </a:endParaRPr>
           </a:p>
           <a:p>
-            <a:pPr indent="-163511" lvl="0" marL="341312" marR="0" rtl="0" algn="l">
+            <a:pPr indent="-163510" lvl="0" marL="341312" marR="0" rtl="0" algn="l">
               <a:lnSpc>
                 <a:spcPct val="100000"/>
               </a:lnSpc>
@@ -22390,7 +25495,7 @@
             </a:endParaRPr>
           </a:p>
           <a:p>
-            <a:pPr indent="-163511" lvl="0" marL="341312" marR="0" rtl="0" algn="l">
+            <a:pPr indent="-163510" lvl="0" marL="341312" marR="0" rtl="0" algn="l">
               <a:lnSpc>
                 <a:spcPct val="100000"/>
               </a:lnSpc>
@@ -22501,6 +25606,285 @@
 </file>
 
 <file path=ppt/theme/theme1.xml><?xml version="1.0" encoding="utf-8"?>
+<a:theme xmlns:a="http://schemas.openxmlformats.org/drawingml/2006/main" xmlns:r="http://schemas.openxmlformats.org/officeDocument/2006/relationships" name="Custom Theme">
+  <a:themeElements>
+    <a:clrScheme name="Default">
+      <a:dk1>
+        <a:srgbClr val="000000"/>
+      </a:dk1>
+      <a:lt1>
+        <a:srgbClr val="FFFFFF"/>
+      </a:lt1>
+      <a:dk2>
+        <a:srgbClr val="158158"/>
+      </a:dk2>
+      <a:lt2>
+        <a:srgbClr val="F3F3F3"/>
+      </a:lt2>
+      <a:accent1>
+        <a:srgbClr val="058DC7"/>
+      </a:accent1>
+      <a:accent2>
+        <a:srgbClr val="50B432"/>
+      </a:accent2>
+      <a:accent3>
+        <a:srgbClr val="ED561B"/>
+      </a:accent3>
+      <a:accent4>
+        <a:srgbClr val="EDEF00"/>
+      </a:accent4>
+      <a:accent5>
+        <a:srgbClr val="24CBE5"/>
+      </a:accent5>
+      <a:accent6>
+        <a:srgbClr val="64E572"/>
+      </a:accent6>
+      <a:hlink>
+        <a:srgbClr val="2200CC"/>
+      </a:hlink>
+      <a:folHlink>
+        <a:srgbClr val="551A8B"/>
+      </a:folHlink>
+    </a:clrScheme>
+    <a:fontScheme name="Office">
+      <a:majorFont>
+        <a:latin typeface="Arial"/>
+        <a:ea typeface=""/>
+        <a:cs typeface=""/>
+        <a:font script="Jpan" typeface="ＭＳ Ｐゴシック"/>
+        <a:font script="Hang" typeface="맑은 고딕"/>
+        <a:font script="Hans" typeface="宋体"/>
+        <a:font script="Hant" typeface="新細明體"/>
+        <a:font script="Arab" typeface="Times New Roman"/>
+        <a:font script="Hebr" typeface="Times New Roman"/>
+        <a:font script="Thai" typeface="Angsana New"/>
+        <a:font script="Ethi" typeface="Nyala"/>
+        <a:font script="Beng" typeface="Vrinda"/>
+        <a:font script="Gujr" typeface="Shruti"/>
+        <a:font script="Khmr" typeface="MoolBoran"/>
+        <a:font script="Knda" typeface="Tunga"/>
+        <a:font script="Guru" typeface="Raavi"/>
+        <a:font script="Cans" typeface="Euphemia"/>
+        <a:font script="Cher" typeface="Plantagenet Cherokee"/>
+        <a:font script="Yiii" typeface="Microsoft Yi Baiti"/>
+        <a:font script="Tibt" typeface="Microsoft Himalaya"/>
+        <a:font script="Thaa" typeface="MV Boli"/>
+        <a:font script="Deva" typeface="Mangal"/>
+        <a:font script="Telu" typeface="Gautami"/>
+        <a:font script="Taml" typeface="Latha"/>
+        <a:font script="Syrc" typeface="Estrangelo Edessa"/>
+        <a:font script="Orya" typeface="Kalinga"/>
+        <a:font script="Mlym" typeface="Kartika"/>
+        <a:font script="Laoo" typeface="DokChampa"/>
+        <a:font script="Sinh" typeface="Iskoola Pota"/>
+        <a:font script="Mong" typeface="Mongolian Baiti"/>
+        <a:font script="Viet" typeface="Times New Roman"/>
+        <a:font script="Uigh" typeface="Microsoft Uighur"/>
+        <a:font script="Geor" typeface="Sylfaen"/>
+      </a:majorFont>
+      <a:minorFont>
+        <a:latin typeface="Arial"/>
+        <a:ea typeface=""/>
+        <a:cs typeface=""/>
+        <a:font script="Jpan" typeface="ＭＳ Ｐゴシック"/>
+        <a:font script="Hang" typeface="맑은 고딕"/>
+        <a:font script="Hans" typeface="宋体"/>
+        <a:font script="Hant" typeface="新細明體"/>
+        <a:font script="Arab" typeface="Arial"/>
+        <a:font script="Hebr" typeface="Arial"/>
+        <a:font script="Thai" typeface="Cordia New"/>
+        <a:font script="Ethi" typeface="Nyala"/>
+        <a:font script="Beng" typeface="Vrinda"/>
+        <a:font script="Gujr" typeface="Shruti"/>
+        <a:font script="Khmr" typeface="DaunPenh"/>
+        <a:font script="Knda" typeface="Tunga"/>
+        <a:font script="Guru" typeface="Raavi"/>
+        <a:font script="Cans" typeface="Euphemia"/>
+        <a:font script="Cher" typeface="Plantagenet Cherokee"/>
+        <a:font script="Yiii" typeface="Microsoft Yi Baiti"/>
+        <a:font script="Tibt" typeface="Microsoft Himalaya"/>
+        <a:font script="Thaa" typeface="MV Boli"/>
+        <a:font script="Deva" typeface="Mangal"/>
+        <a:font script="Telu" typeface="Gautami"/>
+        <a:font script="Taml" typeface="Latha"/>
+        <a:font script="Syrc" typeface="Estrangelo Edessa"/>
+        <a:font script="Orya" typeface="Kalinga"/>
+        <a:font script="Mlym" typeface="Kartika"/>
+        <a:font script="Laoo" typeface="DokChampa"/>
+        <a:font script="Sinh" typeface="Iskoola Pota"/>
+        <a:font script="Mong" typeface="Mongolian Baiti"/>
+        <a:font script="Viet" typeface="Arial"/>
+        <a:font script="Uigh" typeface="Microsoft Uighur"/>
+        <a:font script="Geor" typeface="Sylfaen"/>
+      </a:minorFont>
+    </a:fontScheme>
+    <a:fmtScheme name="Office">
+      <a:fillStyleLst>
+        <a:solidFill>
+          <a:schemeClr val="phClr"/>
+        </a:solidFill>
+        <a:gradFill rotWithShape="1">
+          <a:gsLst>
+            <a:gs pos="0">
+              <a:schemeClr val="phClr">
+                <a:tint val="50000"/>
+                <a:satMod val="300000"/>
+              </a:schemeClr>
+            </a:gs>
+            <a:gs pos="35000">
+              <a:schemeClr val="phClr">
+                <a:tint val="37000"/>
+                <a:satMod val="300000"/>
+              </a:schemeClr>
+            </a:gs>
+            <a:gs pos="100000">
+              <a:schemeClr val="phClr">
+                <a:tint val="15000"/>
+                <a:satMod val="350000"/>
+              </a:schemeClr>
+            </a:gs>
+          </a:gsLst>
+          <a:lin ang="16200000" scaled="1"/>
+        </a:gradFill>
+        <a:gradFill rotWithShape="1">
+          <a:gsLst>
+            <a:gs pos="0">
+              <a:schemeClr val="phClr">
+                <a:tint val="100000"/>
+                <a:shade val="100000"/>
+                <a:satMod val="130000"/>
+              </a:schemeClr>
+            </a:gs>
+            <a:gs pos="100000">
+              <a:schemeClr val="phClr">
+                <a:tint val="50000"/>
+                <a:shade val="100000"/>
+                <a:satMod val="350000"/>
+              </a:schemeClr>
+            </a:gs>
+          </a:gsLst>
+          <a:lin ang="16200000" scaled="0"/>
+        </a:gradFill>
+      </a:fillStyleLst>
+      <a:lnStyleLst>
+        <a:ln w="9525" cap="flat" cmpd="sng" algn="ctr">
+          <a:solidFill>
+            <a:schemeClr val="phClr">
+              <a:shade val="95000"/>
+              <a:satMod val="105000"/>
+            </a:schemeClr>
+          </a:solidFill>
+          <a:prstDash val="solid"/>
+        </a:ln>
+        <a:ln w="25400" cap="flat" cmpd="sng" algn="ctr">
+          <a:solidFill>
+            <a:schemeClr val="phClr"/>
+          </a:solidFill>
+          <a:prstDash val="solid"/>
+        </a:ln>
+        <a:ln w="38100" cap="flat" cmpd="sng" algn="ctr">
+          <a:solidFill>
+            <a:schemeClr val="phClr"/>
+          </a:solidFill>
+          <a:prstDash val="solid"/>
+        </a:ln>
+      </a:lnStyleLst>
+      <a:effectStyleLst>
+        <a:effectStyle>
+          <a:effectLst>
+            <a:outerShdw blurRad="40000" dist="20000" dir="5400000" rotWithShape="0">
+              <a:srgbClr val="000000">
+                <a:alpha val="38000"/>
+              </a:srgbClr>
+            </a:outerShdw>
+          </a:effectLst>
+        </a:effectStyle>
+        <a:effectStyle>
+          <a:effectLst>
+            <a:outerShdw blurRad="40000" dist="23000" dir="5400000" rotWithShape="0">
+              <a:srgbClr val="000000">
+                <a:alpha val="35000"/>
+              </a:srgbClr>
+            </a:outerShdw>
+          </a:effectLst>
+        </a:effectStyle>
+        <a:effectStyle>
+          <a:effectLst>
+            <a:outerShdw blurRad="40000" dist="23000" dir="5400000" rotWithShape="0">
+              <a:srgbClr val="000000">
+                <a:alpha val="35000"/>
+              </a:srgbClr>
+            </a:outerShdw>
+          </a:effectLst>
+          <a:scene3d>
+            <a:camera prst="orthographicFront">
+              <a:rot lat="0" lon="0" rev="0"/>
+            </a:camera>
+            <a:lightRig rig="threePt" dir="t">
+              <a:rot lat="0" lon="0" rev="1200000"/>
+            </a:lightRig>
+          </a:scene3d>
+          <a:sp3d>
+            <a:bevelT w="63500" h="25400"/>
+          </a:sp3d>
+        </a:effectStyle>
+      </a:effectStyleLst>
+      <a:bgFillStyleLst>
+        <a:solidFill>
+          <a:schemeClr val="phClr"/>
+        </a:solidFill>
+        <a:gradFill rotWithShape="1">
+          <a:gsLst>
+            <a:gs pos="0">
+              <a:schemeClr val="phClr">
+                <a:tint val="40000"/>
+                <a:satMod val="350000"/>
+              </a:schemeClr>
+            </a:gs>
+            <a:gs pos="40000">
+              <a:schemeClr val="phClr">
+                <a:tint val="45000"/>
+                <a:shade val="99000"/>
+                <a:satMod val="350000"/>
+              </a:schemeClr>
+            </a:gs>
+            <a:gs pos="100000">
+              <a:schemeClr val="phClr">
+                <a:shade val="20000"/>
+                <a:satMod val="255000"/>
+              </a:schemeClr>
+            </a:gs>
+          </a:gsLst>
+          <a:path path="circle">
+            <a:fillToRect l="50000" t="-80000" r="50000" b="180000"/>
+          </a:path>
+        </a:gradFill>
+        <a:gradFill rotWithShape="1">
+          <a:gsLst>
+            <a:gs pos="0">
+              <a:schemeClr val="phClr">
+                <a:tint val="80000"/>
+                <a:satMod val="300000"/>
+              </a:schemeClr>
+            </a:gs>
+            <a:gs pos="100000">
+              <a:schemeClr val="phClr">
+                <a:shade val="30000"/>
+                <a:satMod val="200000"/>
+              </a:schemeClr>
+            </a:gs>
+          </a:gsLst>
+          <a:path path="circle">
+            <a:fillToRect l="50000" t="50000" r="50000" b="50000"/>
+          </a:path>
+        </a:gradFill>
+      </a:bgFillStyleLst>
+    </a:fmtScheme>
+  </a:themeElements>
+</a:theme>
+</file>
+
+<file path=ppt/theme/theme2.xml><?xml version="1.0" encoding="utf-8"?>
 <a:theme xmlns:a="http://schemas.openxmlformats.org/drawingml/2006/main" xmlns:r="http://schemas.openxmlformats.org/officeDocument/2006/relationships" name="Office Theme">
   <a:themeElements>
     <a:clrScheme name="Office">
@@ -22777,283 +26161,4 @@
     </a:fmtScheme>
   </a:themeElements>
 </a:theme>
-</file>
-
-<file path=ppt/theme/theme2.xml><?xml version="1.0" encoding="utf-8"?>
-<a:theme xmlns:a="http://schemas.openxmlformats.org/drawingml/2006/main" xmlns:r="http://schemas.openxmlformats.org/officeDocument/2006/relationships" name="Custom Theme">
-  <a:themeElements>
-    <a:clrScheme name="Default">
-      <a:dk1>
-        <a:srgbClr val="000000"/>
-      </a:dk1>
-      <a:lt1>
-        <a:srgbClr val="FFFFFF"/>
-      </a:lt1>
-      <a:dk2>
-        <a:srgbClr val="158158"/>
-      </a:dk2>
-      <a:lt2>
-        <a:srgbClr val="F3F3F3"/>
-      </a:lt2>
-      <a:accent1>
-        <a:srgbClr val="058DC7"/>
-      </a:accent1>
-      <a:accent2>
-        <a:srgbClr val="50B432"/>
-      </a:accent2>
-      <a:accent3>
-        <a:srgbClr val="ED561B"/>
-      </a:accent3>
-      <a:accent4>
-        <a:srgbClr val="EDEF00"/>
-      </a:accent4>
-      <a:accent5>
-        <a:srgbClr val="24CBE5"/>
-      </a:accent5>
-      <a:accent6>
-        <a:srgbClr val="64E572"/>
-      </a:accent6>
-      <a:hlink>
-        <a:srgbClr val="2200CC"/>
-      </a:hlink>
-      <a:folHlink>
-        <a:srgbClr val="551A8B"/>
-      </a:folHlink>
-    </a:clrScheme>
-    <a:fontScheme name="Office">
-      <a:majorFont>
-        <a:latin typeface="Arial"/>
-        <a:ea typeface=""/>
-        <a:cs typeface=""/>
-        <a:font script="Jpan" typeface="ＭＳ Ｐゴシック"/>
-        <a:font script="Hang" typeface="맑은 고딕"/>
-        <a:font script="Hans" typeface="宋体"/>
-        <a:font script="Hant" typeface="新細明體"/>
-        <a:font script="Arab" typeface="Times New Roman"/>
-        <a:font script="Hebr" typeface="Times New Roman"/>
-        <a:font script="Thai" typeface="Angsana New"/>
-        <a:font script="Ethi" typeface="Nyala"/>
-        <a:font script="Beng" typeface="Vrinda"/>
-        <a:font script="Gujr" typeface="Shruti"/>
-        <a:font script="Khmr" typeface="MoolBoran"/>
-        <a:font script="Knda" typeface="Tunga"/>
-        <a:font script="Guru" typeface="Raavi"/>
-        <a:font script="Cans" typeface="Euphemia"/>
-        <a:font script="Cher" typeface="Plantagenet Cherokee"/>
-        <a:font script="Yiii" typeface="Microsoft Yi Baiti"/>
-        <a:font script="Tibt" typeface="Microsoft Himalaya"/>
-        <a:font script="Thaa" typeface="MV Boli"/>
-        <a:font script="Deva" typeface="Mangal"/>
-        <a:font script="Telu" typeface="Gautami"/>
-        <a:font script="Taml" typeface="Latha"/>
-        <a:font script="Syrc" typeface="Estrangelo Edessa"/>
-        <a:font script="Orya" typeface="Kalinga"/>
-        <a:font script="Mlym" typeface="Kartika"/>
-        <a:font script="Laoo" typeface="DokChampa"/>
-        <a:font script="Sinh" typeface="Iskoola Pota"/>
-        <a:font script="Mong" typeface="Mongolian Baiti"/>
-        <a:font script="Viet" typeface="Times New Roman"/>
-        <a:font script="Uigh" typeface="Microsoft Uighur"/>
-        <a:font script="Geor" typeface="Sylfaen"/>
-      </a:majorFont>
-      <a:minorFont>
-        <a:latin typeface="Arial"/>
-        <a:ea typeface=""/>
-        <a:cs typeface=""/>
-        <a:font script="Jpan" typeface="ＭＳ Ｐゴシック"/>
-        <a:font script="Hang" typeface="맑은 고딕"/>
-        <a:font script="Hans" typeface="宋体"/>
-        <a:font script="Hant" typeface="新細明體"/>
-        <a:font script="Arab" typeface="Arial"/>
-        <a:font script="Hebr" typeface="Arial"/>
-        <a:font script="Thai" typeface="Cordia New"/>
-        <a:font script="Ethi" typeface="Nyala"/>
-        <a:font script="Beng" typeface="Vrinda"/>
-        <a:font script="Gujr" typeface="Shruti"/>
-        <a:font script="Khmr" typeface="DaunPenh"/>
-        <a:font script="Knda" typeface="Tunga"/>
-        <a:font script="Guru" typeface="Raavi"/>
-        <a:font script="Cans" typeface="Euphemia"/>
-        <a:font script="Cher" typeface="Plantagenet Cherokee"/>
-        <a:font script="Yiii" typeface="Microsoft Yi Baiti"/>
-        <a:font script="Tibt" typeface="Microsoft Himalaya"/>
-        <a:font script="Thaa" typeface="MV Boli"/>
-        <a:font script="Deva" typeface="Mangal"/>
-        <a:font script="Telu" typeface="Gautami"/>
-        <a:font script="Taml" typeface="Latha"/>
-        <a:font script="Syrc" typeface="Estrangelo Edessa"/>
-        <a:font script="Orya" typeface="Kalinga"/>
-        <a:font script="Mlym" typeface="Kartika"/>
-        <a:font script="Laoo" typeface="DokChampa"/>
-        <a:font script="Sinh" typeface="Iskoola Pota"/>
-        <a:font script="Mong" typeface="Mongolian Baiti"/>
-        <a:font script="Viet" typeface="Arial"/>
-        <a:font script="Uigh" typeface="Microsoft Uighur"/>
-        <a:font script="Geor" typeface="Sylfaen"/>
-      </a:minorFont>
-    </a:fontScheme>
-    <a:fmtScheme name="Office">
-      <a:fillStyleLst>
-        <a:solidFill>
-          <a:schemeClr val="phClr"/>
-        </a:solidFill>
-        <a:gradFill rotWithShape="1">
-          <a:gsLst>
-            <a:gs pos="0">
-              <a:schemeClr val="phClr">
-                <a:tint val="50000"/>
-                <a:satMod val="300000"/>
-              </a:schemeClr>
-            </a:gs>
-            <a:gs pos="35000">
-              <a:schemeClr val="phClr">
-                <a:tint val="37000"/>
-                <a:satMod val="300000"/>
-              </a:schemeClr>
-            </a:gs>
-            <a:gs pos="100000">
-              <a:schemeClr val="phClr">
-                <a:tint val="15000"/>
-                <a:satMod val="350000"/>
-              </a:schemeClr>
-            </a:gs>
-          </a:gsLst>
-          <a:lin ang="16200000" scaled="1"/>
-        </a:gradFill>
-        <a:gradFill rotWithShape="1">
-          <a:gsLst>
-            <a:gs pos="0">
-              <a:schemeClr val="phClr">
-                <a:tint val="100000"/>
-                <a:shade val="100000"/>
-                <a:satMod val="130000"/>
-              </a:schemeClr>
-            </a:gs>
-            <a:gs pos="100000">
-              <a:schemeClr val="phClr">
-                <a:tint val="50000"/>
-                <a:shade val="100000"/>
-                <a:satMod val="350000"/>
-              </a:schemeClr>
-            </a:gs>
-          </a:gsLst>
-          <a:lin ang="16200000" scaled="0"/>
-        </a:gradFill>
-      </a:fillStyleLst>
-      <a:lnStyleLst>
-        <a:ln w="9525" cap="flat" cmpd="sng" algn="ctr">
-          <a:solidFill>
-            <a:schemeClr val="phClr">
-              <a:shade val="95000"/>
-              <a:satMod val="105000"/>
-            </a:schemeClr>
-          </a:solidFill>
-          <a:prstDash val="solid"/>
-        </a:ln>
-        <a:ln w="25400" cap="flat" cmpd="sng" algn="ctr">
-          <a:solidFill>
-            <a:schemeClr val="phClr"/>
-          </a:solidFill>
-          <a:prstDash val="solid"/>
-        </a:ln>
-        <a:ln w="38100" cap="flat" cmpd="sng" algn="ctr">
-          <a:solidFill>
-            <a:schemeClr val="phClr"/>
-          </a:solidFill>
-          <a:prstDash val="solid"/>
-        </a:ln>
-      </a:lnStyleLst>
-      <a:effectStyleLst>
-        <a:effectStyle>
-          <a:effectLst>
-            <a:outerShdw blurRad="40000" dist="20000" dir="5400000" rotWithShape="0">
-              <a:srgbClr val="000000">
-                <a:alpha val="38000"/>
-              </a:srgbClr>
-            </a:outerShdw>
-          </a:effectLst>
-        </a:effectStyle>
-        <a:effectStyle>
-          <a:effectLst>
-            <a:outerShdw blurRad="40000" dist="23000" dir="5400000" rotWithShape="0">
-              <a:srgbClr val="000000">
-                <a:alpha val="35000"/>
-              </a:srgbClr>
-            </a:outerShdw>
-          </a:effectLst>
-        </a:effectStyle>
-        <a:effectStyle>
-          <a:effectLst>
-            <a:outerShdw blurRad="40000" dist="23000" dir="5400000" rotWithShape="0">
-              <a:srgbClr val="000000">
-                <a:alpha val="35000"/>
-              </a:srgbClr>
-            </a:outerShdw>
-          </a:effectLst>
-          <a:scene3d>
-            <a:camera prst="orthographicFront">
-              <a:rot lat="0" lon="0" rev="0"/>
-            </a:camera>
-            <a:lightRig rig="threePt" dir="t">
-              <a:rot lat="0" lon="0" rev="1200000"/>
-            </a:lightRig>
-          </a:scene3d>
-          <a:sp3d>
-            <a:bevelT w="63500" h="25400"/>
-          </a:sp3d>
-        </a:effectStyle>
-      </a:effectStyleLst>
-      <a:bgFillStyleLst>
-        <a:solidFill>
-          <a:schemeClr val="phClr"/>
-        </a:solidFill>
-        <a:gradFill rotWithShape="1">
-          <a:gsLst>
-            <a:gs pos="0">
-              <a:schemeClr val="phClr">
-                <a:tint val="40000"/>
-                <a:satMod val="350000"/>
-              </a:schemeClr>
-            </a:gs>
-            <a:gs pos="40000">
-              <a:schemeClr val="phClr">
-                <a:tint val="45000"/>
-                <a:shade val="99000"/>
-                <a:satMod val="350000"/>
-              </a:schemeClr>
-            </a:gs>
-            <a:gs pos="100000">
-              <a:schemeClr val="phClr">
-                <a:shade val="20000"/>
-                <a:satMod val="255000"/>
-              </a:schemeClr>
-            </a:gs>
-          </a:gsLst>
-          <a:path path="circle">
-            <a:fillToRect l="50000" t="-80000" r="50000" b="180000"/>
-          </a:path>
-        </a:gradFill>
-        <a:gradFill rotWithShape="1">
-          <a:gsLst>
-            <a:gs pos="0">
-              <a:schemeClr val="phClr">
-                <a:tint val="80000"/>
-                <a:satMod val="300000"/>
-              </a:schemeClr>
-            </a:gs>
-            <a:gs pos="100000">
-              <a:schemeClr val="phClr">
-                <a:shade val="30000"/>
-                <a:satMod val="200000"/>
-              </a:schemeClr>
-            </a:gs>
-          </a:gsLst>
-          <a:path path="circle">
-            <a:fillToRect l="50000" t="50000" r="50000" b="50000"/>
-          </a:path>
-        </a:gradFill>
-      </a:bgFillStyleLst>
-    </a:fmtScheme>
-  </a:themeElements>
-</a:theme>
 </file>
</xml_diff>